<commit_message>
continue working on 3. Integration tests
</commit_message>
<xml_diff>
--- a/Test Driven Development/materials/pptx/3. TDD-Integration.pptx
+++ b/Test Driven Development/materials/pptx/3. TDD-Integration.pptx
@@ -7,14 +7,23 @@
     <p:sldMasterId id="2147483694" r:id="rId3"/>
   </p:sldMasterIdLst>
   <p:notesMasterIdLst>
-    <p:notesMasterId r:id="rId9"/>
+    <p:notesMasterId r:id="rId18"/>
   </p:notesMasterIdLst>
   <p:sldIdLst>
     <p:sldId id="355" r:id="rId4"/>
     <p:sldId id="257" r:id="rId5"/>
     <p:sldId id="375" r:id="rId6"/>
-    <p:sldId id="357" r:id="rId7"/>
-    <p:sldId id="356" r:id="rId8"/>
+    <p:sldId id="376" r:id="rId7"/>
+    <p:sldId id="377" r:id="rId8"/>
+    <p:sldId id="380" r:id="rId9"/>
+    <p:sldId id="378" r:id="rId10"/>
+    <p:sldId id="379" r:id="rId11"/>
+    <p:sldId id="381" r:id="rId12"/>
+    <p:sldId id="382" r:id="rId13"/>
+    <p:sldId id="383" r:id="rId14"/>
+    <p:sldId id="384" r:id="rId15"/>
+    <p:sldId id="357" r:id="rId16"/>
+    <p:sldId id="356" r:id="rId17"/>
   </p:sldIdLst>
   <p:sldSz cx="9144000" cy="6858000" type="screen4x3"/>
   <p:notesSz cx="6858000" cy="9144000"/>
@@ -198,7 +207,7 @@
           <a:p>
             <a:fld id="{B946ECE3-FD69-FE4C-B5B3-E9526994F809}" type="datetimeFigureOut">
               <a:rPr lang="en-US" smtClean="0"/>
-              <a:t>8/4/12</a:t>
+              <a:t>10/7/12</a:t>
             </a:fld>
             <a:endParaRPr lang="en-US"/>
           </a:p>
@@ -748,7 +757,7 @@
           <a:p>
             <a:fld id="{7793EDCB-5B64-3143-AFED-AA1357A092FA}" type="datetimeFigureOut">
               <a:rPr lang="en-US" smtClean="0"/>
-              <a:t>8/4/12</a:t>
+              <a:t>10/7/12</a:t>
             </a:fld>
             <a:endParaRPr lang="en-US"/>
           </a:p>
@@ -918,7 +927,7 @@
           <a:p>
             <a:fld id="{7793EDCB-5B64-3143-AFED-AA1357A092FA}" type="datetimeFigureOut">
               <a:rPr lang="en-US" smtClean="0"/>
-              <a:t>8/4/12</a:t>
+              <a:t>10/7/12</a:t>
             </a:fld>
             <a:endParaRPr lang="en-US"/>
           </a:p>
@@ -1098,7 +1107,7 @@
           <a:p>
             <a:fld id="{7793EDCB-5B64-3143-AFED-AA1357A092FA}" type="datetimeFigureOut">
               <a:rPr lang="en-US" smtClean="0"/>
-              <a:t>8/4/12</a:t>
+              <a:t>10/7/12</a:t>
             </a:fld>
             <a:endParaRPr lang="en-US"/>
           </a:p>
@@ -4141,7 +4150,7 @@
           <a:p>
             <a:fld id="{7793EDCB-5B64-3143-AFED-AA1357A092FA}" type="datetimeFigureOut">
               <a:rPr lang="en-US" smtClean="0"/>
-              <a:t>8/4/12</a:t>
+              <a:t>10/7/12</a:t>
             </a:fld>
             <a:endParaRPr lang="en-US"/>
           </a:p>
@@ -6833,7 +6842,7 @@
                   <a:spcPct val="0"/>
                 </a:spcAft>
               </a:pPr>
-              <a:t>8/4/12</a:t>
+              <a:t>10/7/12</a:t>
             </a:fld>
             <a:endParaRPr lang="ru-RU">
               <a:solidFill>
@@ -7194,7 +7203,7 @@
           <a:p>
             <a:fld id="{7793EDCB-5B64-3143-AFED-AA1357A092FA}" type="datetimeFigureOut">
               <a:rPr lang="en-US" smtClean="0"/>
-              <a:t>8/4/12</a:t>
+              <a:t>10/7/12</a:t>
             </a:fld>
             <a:endParaRPr lang="en-US"/>
           </a:p>
@@ -12164,7 +12173,7 @@
           <a:p>
             <a:fld id="{7793EDCB-5B64-3143-AFED-AA1357A092FA}" type="datetimeFigureOut">
               <a:rPr lang="en-US" smtClean="0"/>
-              <a:t>8/4/12</a:t>
+              <a:t>10/7/12</a:t>
             </a:fld>
             <a:endParaRPr lang="en-US"/>
           </a:p>
@@ -13651,7 +13660,7 @@
           <a:p>
             <a:fld id="{7793EDCB-5B64-3143-AFED-AA1357A092FA}" type="datetimeFigureOut">
               <a:rPr lang="en-US" smtClean="0"/>
-              <a:t>8/4/12</a:t>
+              <a:t>10/7/12</a:t>
             </a:fld>
             <a:endParaRPr lang="en-US"/>
           </a:p>
@@ -13769,7 +13778,7 @@
           <a:p>
             <a:fld id="{7793EDCB-5B64-3143-AFED-AA1357A092FA}" type="datetimeFigureOut">
               <a:rPr lang="en-US" smtClean="0"/>
-              <a:t>8/4/12</a:t>
+              <a:t>10/7/12</a:t>
             </a:fld>
             <a:endParaRPr lang="en-US"/>
           </a:p>
@@ -13864,7 +13873,7 @@
           <a:p>
             <a:fld id="{7793EDCB-5B64-3143-AFED-AA1357A092FA}" type="datetimeFigureOut">
               <a:rPr lang="en-US" smtClean="0"/>
-              <a:t>8/4/12</a:t>
+              <a:t>10/7/12</a:t>
             </a:fld>
             <a:endParaRPr lang="en-US"/>
           </a:p>
@@ -14141,7 +14150,7 @@
           <a:p>
             <a:fld id="{7793EDCB-5B64-3143-AFED-AA1357A092FA}" type="datetimeFigureOut">
               <a:rPr lang="en-US" smtClean="0"/>
-              <a:t>8/4/12</a:t>
+              <a:t>10/7/12</a:t>
             </a:fld>
             <a:endParaRPr lang="en-US"/>
           </a:p>
@@ -14394,7 +14403,7 @@
           <a:p>
             <a:fld id="{7793EDCB-5B64-3143-AFED-AA1357A092FA}" type="datetimeFigureOut">
               <a:rPr lang="en-US" smtClean="0"/>
-              <a:t>8/4/12</a:t>
+              <a:t>10/7/12</a:t>
             </a:fld>
             <a:endParaRPr lang="en-US"/>
           </a:p>
@@ -14607,7 +14616,7 @@
           <a:p>
             <a:fld id="{7793EDCB-5B64-3143-AFED-AA1357A092FA}" type="datetimeFigureOut">
               <a:rPr lang="en-US" smtClean="0"/>
-              <a:t>8/4/12</a:t>
+              <a:t>10/7/12</a:t>
             </a:fld>
             <a:endParaRPr lang="en-US"/>
           </a:p>
@@ -17270,6 +17279,1178 @@
 </p:sld>
 </file>
 
+<file path=ppt/slides/slide10.xml><?xml version="1.0" encoding="utf-8"?>
+<p:sld xmlns:a="http://schemas.openxmlformats.org/drawingml/2006/main" xmlns:r="http://schemas.openxmlformats.org/officeDocument/2006/relationships" xmlns:p="http://schemas.openxmlformats.org/presentationml/2006/main">
+  <p:cSld>
+    <p:spTree>
+      <p:nvGrpSpPr>
+        <p:cNvPr id="1" name=""/>
+        <p:cNvGrpSpPr/>
+        <p:nvPr/>
+      </p:nvGrpSpPr>
+      <p:grpSpPr>
+        <a:xfrm>
+          <a:off x="0" y="0"/>
+          <a:ext cx="0" cy="0"/>
+          <a:chOff x="0" y="0"/>
+          <a:chExt cx="0" cy="0"/>
+        </a:xfrm>
+      </p:grpSpPr>
+      <p:sp>
+        <p:nvSpPr>
+          <p:cNvPr id="3" name="Title 2"/>
+          <p:cNvSpPr>
+            <a:spLocks noGrp="1"/>
+          </p:cNvSpPr>
+          <p:nvPr>
+            <p:ph type="title"/>
+          </p:nvPr>
+        </p:nvSpPr>
+        <p:spPr/>
+        <p:txBody>
+          <a:bodyPr/>
+          <a:lstStyle/>
+          <a:p>
+            <a:r>
+              <a:rPr lang="en-US" dirty="0" smtClean="0"/>
+              <a:t>Test-driving DB layer</a:t>
+            </a:r>
+            <a:endParaRPr lang="en-US" dirty="0"/>
+          </a:p>
+        </p:txBody>
+      </p:sp>
+      <p:sp>
+        <p:nvSpPr>
+          <p:cNvPr id="5" name="Rectangle 4"/>
+          <p:cNvSpPr>
+            <a:spLocks noChangeArrowheads="1"/>
+          </p:cNvSpPr>
+          <p:nvPr>
+            <p:custDataLst>
+              <p:tags r:id="rId1"/>
+            </p:custDataLst>
+          </p:nvPr>
+        </p:nvSpPr>
+        <p:spPr bwMode="auto">
+          <a:xfrm>
+            <a:off x="1465263" y="2667000"/>
+            <a:ext cx="6213475" cy="1624608"/>
+          </a:xfrm>
+          <a:prstGeom prst="rect">
+            <a:avLst/>
+          </a:prstGeom>
+          <a:noFill/>
+          <a:ln w="19050">
+            <a:noFill/>
+            <a:miter lim="800000"/>
+            <a:headEnd/>
+            <a:tailEnd/>
+          </a:ln>
+        </p:spPr>
+        <p:txBody>
+          <a:bodyPr wrap="square" lIns="93296" tIns="144000" rIns="93296" bIns="93296">
+            <a:spAutoFit/>
+          </a:bodyPr>
+          <a:lstStyle/>
+          <a:p>
+            <a:pPr marL="287338" indent="-287338" defTabSz="803275">
+              <a:buClr>
+                <a:srgbClr val="FF6600"/>
+              </a:buClr>
+              <a:buSzPct val="125000"/>
+              <a:buFont typeface="Wingdings" charset="0"/>
+              <a:buChar char="§"/>
+            </a:pPr>
+            <a:r>
+              <a:rPr lang="ru-RU" dirty="0" smtClean="0">
+                <a:solidFill>
+                  <a:srgbClr val="004080"/>
+                </a:solidFill>
+                <a:cs typeface="Tahoma" charset="0"/>
+              </a:rPr>
+              <a:t>Взаимодействие </a:t>
+            </a:r>
+            <a:r>
+              <a:rPr lang="ru-RU" dirty="0">
+                <a:solidFill>
+                  <a:srgbClr val="004080"/>
+                </a:solidFill>
+                <a:cs typeface="Tahoma" charset="0"/>
+              </a:rPr>
+              <a:t>с источниками </a:t>
+            </a:r>
+            <a:r>
+              <a:rPr lang="ru-RU" dirty="0" smtClean="0">
+                <a:solidFill>
+                  <a:srgbClr val="004080"/>
+                </a:solidFill>
+                <a:cs typeface="Tahoma" charset="0"/>
+              </a:rPr>
+              <a:t>данных</a:t>
+            </a:r>
+          </a:p>
+          <a:p>
+            <a:pPr marL="287338" indent="-287338" defTabSz="803275">
+              <a:buClr>
+                <a:srgbClr val="FF6600"/>
+              </a:buClr>
+              <a:buSzPct val="125000"/>
+              <a:buFont typeface="Wingdings" charset="0"/>
+              <a:buChar char="§"/>
+            </a:pPr>
+            <a:endParaRPr lang="ru-RU" dirty="0">
+              <a:solidFill>
+                <a:srgbClr val="004080"/>
+              </a:solidFill>
+              <a:cs typeface="Tahoma" charset="0"/>
+            </a:endParaRPr>
+          </a:p>
+          <a:p>
+            <a:pPr marL="287338" indent="-287338" defTabSz="803275">
+              <a:buClr>
+                <a:srgbClr val="FF6600"/>
+              </a:buClr>
+              <a:buSzPct val="125000"/>
+              <a:buFont typeface="Wingdings" charset="0"/>
+              <a:buChar char="§"/>
+            </a:pPr>
+            <a:r>
+              <a:rPr lang="ru-RU" dirty="0">
+                <a:solidFill>
+                  <a:srgbClr val="004080"/>
+                </a:solidFill>
+                <a:cs typeface="Tahoma" charset="0"/>
+              </a:rPr>
+              <a:t>Интеграционные тесты на базу данных</a:t>
+            </a:r>
+          </a:p>
+          <a:p>
+            <a:pPr marL="287338" indent="-287338" defTabSz="803275">
+              <a:buClr>
+                <a:srgbClr val="FF6600"/>
+              </a:buClr>
+              <a:buSzPct val="125000"/>
+              <a:buFont typeface="Wingdings" charset="0"/>
+              <a:buChar char="§"/>
+            </a:pPr>
+            <a:endParaRPr lang="en-US" dirty="0">
+              <a:solidFill>
+                <a:srgbClr val="004080"/>
+              </a:solidFill>
+              <a:cs typeface="Tahoma" charset="0"/>
+            </a:endParaRPr>
+          </a:p>
+          <a:p>
+            <a:pPr marL="287338" indent="-287338" defTabSz="803275">
+              <a:buClr>
+                <a:srgbClr val="FF6600"/>
+              </a:buClr>
+              <a:buSzPct val="125000"/>
+              <a:buFont typeface="Wingdings" charset="0"/>
+              <a:buChar char="§"/>
+            </a:pPr>
+            <a:r>
+              <a:rPr lang="ru-RU" dirty="0">
+                <a:solidFill>
+                  <a:srgbClr val="004080"/>
+                </a:solidFill>
+                <a:cs typeface="Tahoma" charset="0"/>
+              </a:rPr>
+              <a:t>Транзакции в тестировании</a:t>
+            </a:r>
+            <a:endParaRPr lang="ru-RU" dirty="0">
+              <a:solidFill>
+                <a:srgbClr val="004080"/>
+              </a:solidFill>
+              <a:cs typeface="Tahoma" charset="0"/>
+            </a:endParaRPr>
+          </a:p>
+        </p:txBody>
+      </p:sp>
+    </p:spTree>
+    <p:extLst>
+      <p:ext uri="{BB962C8B-B14F-4D97-AF65-F5344CB8AC3E}">
+        <p14:creationId xmlns:p14="http://schemas.microsoft.com/office/powerpoint/2010/main" val="3816391942"/>
+      </p:ext>
+    </p:extLst>
+  </p:cSld>
+  <p:clrMapOvr>
+    <a:masterClrMapping/>
+  </p:clrMapOvr>
+  <p:transition xmlns:p14="http://schemas.microsoft.com/office/powerpoint/2010/main">
+    <p:zoom/>
+  </p:transition>
+</p:sld>
+</file>
+
+<file path=ppt/slides/slide11.xml><?xml version="1.0" encoding="utf-8"?>
+<p:sld xmlns:a="http://schemas.openxmlformats.org/drawingml/2006/main" xmlns:r="http://schemas.openxmlformats.org/officeDocument/2006/relationships" xmlns:p="http://schemas.openxmlformats.org/presentationml/2006/main">
+  <p:cSld>
+    <p:spTree>
+      <p:nvGrpSpPr>
+        <p:cNvPr id="1" name=""/>
+        <p:cNvGrpSpPr/>
+        <p:nvPr/>
+      </p:nvGrpSpPr>
+      <p:grpSpPr>
+        <a:xfrm>
+          <a:off x="0" y="0"/>
+          <a:ext cx="0" cy="0"/>
+          <a:chOff x="0" y="0"/>
+          <a:chExt cx="0" cy="0"/>
+        </a:xfrm>
+      </p:grpSpPr>
+      <p:sp>
+        <p:nvSpPr>
+          <p:cNvPr id="3" name="Title 2"/>
+          <p:cNvSpPr>
+            <a:spLocks noGrp="1"/>
+          </p:cNvSpPr>
+          <p:nvPr>
+            <p:ph type="title"/>
+          </p:nvPr>
+        </p:nvSpPr>
+        <p:spPr/>
+        <p:txBody>
+          <a:bodyPr/>
+          <a:lstStyle/>
+          <a:p>
+            <a:r>
+              <a:rPr lang="ru-RU" dirty="0"/>
+              <a:t>Взаимодействие с источниками </a:t>
+            </a:r>
+            <a:r>
+              <a:rPr lang="ru-RU" dirty="0" smtClean="0"/>
+              <a:t/>
+            </a:r>
+            <a:br>
+              <a:rPr lang="ru-RU" dirty="0" smtClean="0"/>
+            </a:br>
+            <a:r>
+              <a:rPr lang="ru-RU" dirty="0" smtClean="0"/>
+              <a:t>данных</a:t>
+            </a:r>
+            <a:endParaRPr lang="en-US" dirty="0"/>
+          </a:p>
+        </p:txBody>
+      </p:sp>
+      <p:sp>
+        <p:nvSpPr>
+          <p:cNvPr id="4" name="Rectangle 3"/>
+          <p:cNvSpPr>
+            <a:spLocks noChangeArrowheads="1"/>
+          </p:cNvSpPr>
+          <p:nvPr>
+            <p:custDataLst>
+              <p:tags r:id="rId1"/>
+            </p:custDataLst>
+          </p:nvPr>
+        </p:nvSpPr>
+        <p:spPr bwMode="auto">
+          <a:xfrm>
+            <a:off x="381000" y="1219200"/>
+            <a:ext cx="8458200" cy="1624608"/>
+          </a:xfrm>
+          <a:prstGeom prst="rect">
+            <a:avLst/>
+          </a:prstGeom>
+          <a:noFill/>
+          <a:ln w="19050">
+            <a:noFill/>
+            <a:miter lim="800000"/>
+            <a:headEnd/>
+            <a:tailEnd/>
+          </a:ln>
+        </p:spPr>
+        <p:txBody>
+          <a:bodyPr wrap="square" lIns="93296" tIns="144000" rIns="93296" bIns="93296">
+            <a:spAutoFit/>
+          </a:bodyPr>
+          <a:lstStyle/>
+          <a:p>
+            <a:pPr defTabSz="803275">
+              <a:buClr>
+                <a:srgbClr val="FF6600"/>
+              </a:buClr>
+              <a:buSzPct val="125000"/>
+            </a:pPr>
+            <a:r>
+              <a:rPr lang="ru-RU" dirty="0">
+                <a:solidFill>
+                  <a:srgbClr val="004080"/>
+                </a:solidFill>
+                <a:cs typeface="Tahoma" charset="0"/>
+              </a:rPr>
+              <a:t>Интеграционные тесты, которые изменяют данные в базе данных, должны откатывать состоянии базы данных к тому, которое было до запуска теста, даже если тест не прошёл. </a:t>
+            </a:r>
+            <a:endParaRPr lang="ru-RU" dirty="0" smtClean="0">
+              <a:solidFill>
+                <a:srgbClr val="004080"/>
+              </a:solidFill>
+              <a:cs typeface="Tahoma" charset="0"/>
+            </a:endParaRPr>
+          </a:p>
+          <a:p>
+            <a:pPr defTabSz="803275">
+              <a:buClr>
+                <a:srgbClr val="FF6600"/>
+              </a:buClr>
+              <a:buSzPct val="125000"/>
+            </a:pPr>
+            <a:endParaRPr lang="ru-RU" dirty="0">
+              <a:solidFill>
+                <a:srgbClr val="004080"/>
+              </a:solidFill>
+              <a:cs typeface="Tahoma" charset="0"/>
+            </a:endParaRPr>
+          </a:p>
+          <a:p>
+            <a:pPr defTabSz="803275">
+              <a:buClr>
+                <a:srgbClr val="FF6600"/>
+              </a:buClr>
+              <a:buSzPct val="125000"/>
+            </a:pPr>
+            <a:r>
+              <a:rPr lang="ru-RU" dirty="0" smtClean="0">
+                <a:solidFill>
+                  <a:srgbClr val="004080"/>
+                </a:solidFill>
+                <a:cs typeface="Tahoma" charset="0"/>
+              </a:rPr>
+              <a:t>Для </a:t>
+            </a:r>
+            <a:r>
+              <a:rPr lang="ru-RU" dirty="0">
+                <a:solidFill>
+                  <a:srgbClr val="004080"/>
+                </a:solidFill>
+                <a:cs typeface="Tahoma" charset="0"/>
+              </a:rPr>
+              <a:t>этого часто применяются следующие техники</a:t>
+            </a:r>
+            <a:r>
+              <a:rPr lang="ru-RU" dirty="0" smtClean="0">
+                <a:solidFill>
+                  <a:srgbClr val="004080"/>
+                </a:solidFill>
+                <a:cs typeface="Tahoma" charset="0"/>
+              </a:rPr>
+              <a:t>:</a:t>
+            </a:r>
+            <a:endParaRPr lang="ru-RU" dirty="0">
+              <a:solidFill>
+                <a:srgbClr val="004080"/>
+              </a:solidFill>
+              <a:cs typeface="Tahoma" charset="0"/>
+            </a:endParaRPr>
+          </a:p>
+        </p:txBody>
+      </p:sp>
+      <p:sp>
+        <p:nvSpPr>
+          <p:cNvPr id="5" name="Rectangle 4"/>
+          <p:cNvSpPr>
+            <a:spLocks noChangeArrowheads="1"/>
+          </p:cNvSpPr>
+          <p:nvPr>
+            <p:custDataLst>
+              <p:tags r:id="rId2"/>
+            </p:custDataLst>
+          </p:nvPr>
+        </p:nvSpPr>
+        <p:spPr bwMode="auto">
+          <a:xfrm>
+            <a:off x="381000" y="3124200"/>
+            <a:ext cx="8534400" cy="3563601"/>
+          </a:xfrm>
+          <a:prstGeom prst="rect">
+            <a:avLst/>
+          </a:prstGeom>
+          <a:noFill/>
+          <a:ln w="19050">
+            <a:noFill/>
+            <a:miter lim="800000"/>
+            <a:headEnd/>
+            <a:tailEnd/>
+          </a:ln>
+        </p:spPr>
+        <p:txBody>
+          <a:bodyPr wrap="square" lIns="93296" tIns="144000" rIns="93296" bIns="93296">
+            <a:spAutoFit/>
+          </a:bodyPr>
+          <a:lstStyle/>
+          <a:p>
+            <a:pPr marL="287338" indent="-287338" defTabSz="803275">
+              <a:buClr>
+                <a:srgbClr val="FF6600"/>
+              </a:buClr>
+              <a:buSzPct val="125000"/>
+              <a:buFont typeface="Wingdings" charset="0"/>
+              <a:buChar char="§"/>
+            </a:pPr>
+            <a:r>
+              <a:rPr lang="ru-RU" dirty="0">
+                <a:solidFill>
+                  <a:srgbClr val="004080"/>
+                </a:solidFill>
+                <a:cs typeface="Tahoma" charset="0"/>
+              </a:rPr>
+              <a:t>Метод </a:t>
+            </a:r>
+            <a:r>
+              <a:rPr lang="ru-RU" dirty="0" err="1">
+                <a:solidFill>
+                  <a:srgbClr val="004080"/>
+                </a:solidFill>
+                <a:cs typeface="Tahoma" charset="0"/>
+              </a:rPr>
+              <a:t>TearDown</a:t>
+            </a:r>
+            <a:r>
+              <a:rPr lang="ru-RU" dirty="0">
+                <a:solidFill>
+                  <a:srgbClr val="004080"/>
+                </a:solidFill>
+                <a:cs typeface="Tahoma" charset="0"/>
+              </a:rPr>
+              <a:t>, присутствующий в большинстве библиотек для тестирования</a:t>
+            </a:r>
+            <a:r>
+              <a:rPr lang="ru-RU" dirty="0" smtClean="0">
+                <a:solidFill>
+                  <a:srgbClr val="004080"/>
+                </a:solidFill>
+                <a:cs typeface="Tahoma" charset="0"/>
+              </a:rPr>
+              <a:t>.</a:t>
+            </a:r>
+          </a:p>
+          <a:p>
+            <a:pPr marL="287338" indent="-287338" defTabSz="803275">
+              <a:buClr>
+                <a:srgbClr val="FF6600"/>
+              </a:buClr>
+              <a:buSzPct val="125000"/>
+              <a:buFont typeface="Wingdings" charset="0"/>
+              <a:buChar char="§"/>
+            </a:pPr>
+            <a:endParaRPr lang="ru-RU" dirty="0">
+              <a:solidFill>
+                <a:srgbClr val="004080"/>
+              </a:solidFill>
+              <a:cs typeface="Tahoma" charset="0"/>
+            </a:endParaRPr>
+          </a:p>
+          <a:p>
+            <a:pPr marL="287338" indent="-287338" defTabSz="803275">
+              <a:buClr>
+                <a:srgbClr val="FF6600"/>
+              </a:buClr>
+              <a:buSzPct val="125000"/>
+              <a:buFont typeface="Wingdings" charset="0"/>
+              <a:buChar char="§"/>
+            </a:pPr>
+            <a:r>
+              <a:rPr lang="en-US" dirty="0" smtClean="0">
+                <a:solidFill>
+                  <a:srgbClr val="004080"/>
+                </a:solidFill>
+                <a:cs typeface="Tahoma" charset="0"/>
+              </a:rPr>
+              <a:t>T</a:t>
+            </a:r>
+            <a:r>
+              <a:rPr lang="ru-RU" dirty="0" err="1" smtClean="0">
+                <a:solidFill>
+                  <a:srgbClr val="004080"/>
+                </a:solidFill>
+                <a:cs typeface="Tahoma" charset="0"/>
+              </a:rPr>
+              <a:t>ry</a:t>
+            </a:r>
+            <a:r>
+              <a:rPr lang="ru-RU" dirty="0" smtClean="0">
+                <a:solidFill>
+                  <a:srgbClr val="004080"/>
+                </a:solidFill>
+                <a:cs typeface="Tahoma" charset="0"/>
+              </a:rPr>
+              <a:t> </a:t>
+            </a:r>
+            <a:r>
+              <a:rPr lang="en-US" dirty="0" smtClean="0">
+                <a:solidFill>
+                  <a:srgbClr val="004080"/>
+                </a:solidFill>
+                <a:cs typeface="Tahoma" charset="0"/>
+              </a:rPr>
+              <a:t>–</a:t>
+            </a:r>
+            <a:r>
+              <a:rPr lang="ru-RU" dirty="0" smtClean="0">
+                <a:solidFill>
+                  <a:srgbClr val="004080"/>
+                </a:solidFill>
+                <a:cs typeface="Tahoma" charset="0"/>
+              </a:rPr>
+              <a:t> </a:t>
+            </a:r>
+            <a:r>
+              <a:rPr lang="ru-RU" dirty="0" err="1" smtClean="0">
+                <a:solidFill>
+                  <a:srgbClr val="004080"/>
+                </a:solidFill>
+                <a:cs typeface="Tahoma" charset="0"/>
+              </a:rPr>
+              <a:t>catch</a:t>
+            </a:r>
+            <a:r>
+              <a:rPr lang="ru-RU" dirty="0" smtClean="0">
+                <a:solidFill>
+                  <a:srgbClr val="004080"/>
+                </a:solidFill>
+                <a:cs typeface="Tahoma" charset="0"/>
+              </a:rPr>
+              <a:t> - </a:t>
+            </a:r>
+            <a:r>
+              <a:rPr lang="ru-RU" dirty="0" err="1" smtClean="0">
+                <a:solidFill>
+                  <a:srgbClr val="004080"/>
+                </a:solidFill>
+                <a:cs typeface="Tahoma" charset="0"/>
+              </a:rPr>
+              <a:t>finally</a:t>
+            </a:r>
+            <a:r>
+              <a:rPr lang="ru-RU" dirty="0" smtClean="0">
+                <a:solidFill>
+                  <a:srgbClr val="004080"/>
+                </a:solidFill>
+                <a:cs typeface="Tahoma" charset="0"/>
+              </a:rPr>
+              <a:t> </a:t>
+            </a:r>
+            <a:r>
+              <a:rPr lang="ru-RU" dirty="0">
+                <a:solidFill>
+                  <a:srgbClr val="004080"/>
+                </a:solidFill>
+                <a:cs typeface="Tahoma" charset="0"/>
+              </a:rPr>
+              <a:t>структуры обработки исключений, там где они доступны</a:t>
+            </a:r>
+            <a:r>
+              <a:rPr lang="ru-RU" dirty="0" smtClean="0">
+                <a:solidFill>
+                  <a:srgbClr val="004080"/>
+                </a:solidFill>
+                <a:cs typeface="Tahoma" charset="0"/>
+              </a:rPr>
+              <a:t>.</a:t>
+            </a:r>
+          </a:p>
+          <a:p>
+            <a:pPr marL="287338" indent="-287338" defTabSz="803275">
+              <a:buClr>
+                <a:srgbClr val="FF6600"/>
+              </a:buClr>
+              <a:buSzPct val="125000"/>
+              <a:buFont typeface="Wingdings" charset="0"/>
+              <a:buChar char="§"/>
+            </a:pPr>
+            <a:endParaRPr lang="ru-RU" dirty="0">
+              <a:solidFill>
+                <a:srgbClr val="004080"/>
+              </a:solidFill>
+              <a:cs typeface="Tahoma" charset="0"/>
+            </a:endParaRPr>
+          </a:p>
+          <a:p>
+            <a:pPr marL="287338" indent="-287338" defTabSz="803275">
+              <a:buClr>
+                <a:srgbClr val="FF6600"/>
+              </a:buClr>
+              <a:buSzPct val="125000"/>
+              <a:buFont typeface="Wingdings" charset="0"/>
+              <a:buChar char="§"/>
+            </a:pPr>
+            <a:r>
+              <a:rPr lang="ru-RU" dirty="0">
+                <a:solidFill>
+                  <a:srgbClr val="004080"/>
+                </a:solidFill>
+                <a:cs typeface="Tahoma" charset="0"/>
+              </a:rPr>
+              <a:t>Транзакции баз данных</a:t>
+            </a:r>
+            <a:r>
+              <a:rPr lang="ru-RU" dirty="0" smtClean="0">
+                <a:solidFill>
+                  <a:srgbClr val="004080"/>
+                </a:solidFill>
+                <a:cs typeface="Tahoma" charset="0"/>
+              </a:rPr>
+              <a:t>.</a:t>
+            </a:r>
+          </a:p>
+          <a:p>
+            <a:pPr marL="287338" indent="-287338" defTabSz="803275">
+              <a:buClr>
+                <a:srgbClr val="FF6600"/>
+              </a:buClr>
+              <a:buSzPct val="125000"/>
+              <a:buFont typeface="Wingdings" charset="0"/>
+              <a:buChar char="§"/>
+            </a:pPr>
+            <a:endParaRPr lang="ru-RU" dirty="0">
+              <a:solidFill>
+                <a:srgbClr val="004080"/>
+              </a:solidFill>
+              <a:cs typeface="Tahoma" charset="0"/>
+            </a:endParaRPr>
+          </a:p>
+          <a:p>
+            <a:pPr marL="287338" indent="-287338" defTabSz="803275">
+              <a:buClr>
+                <a:srgbClr val="FF6600"/>
+              </a:buClr>
+              <a:buSzPct val="125000"/>
+              <a:buFont typeface="Wingdings" charset="0"/>
+              <a:buChar char="§"/>
+            </a:pPr>
+            <a:r>
+              <a:rPr lang="ru-RU" dirty="0">
+                <a:solidFill>
+                  <a:srgbClr val="004080"/>
+                </a:solidFill>
+                <a:cs typeface="Tahoma" charset="0"/>
+              </a:rPr>
+              <a:t>Создание снимка (англ. </a:t>
+            </a:r>
+            <a:r>
+              <a:rPr lang="ru-RU" dirty="0" err="1">
+                <a:solidFill>
+                  <a:srgbClr val="004080"/>
+                </a:solidFill>
+                <a:cs typeface="Tahoma" charset="0"/>
+              </a:rPr>
+              <a:t>snapshot</a:t>
+            </a:r>
+            <a:r>
+              <a:rPr lang="ru-RU" dirty="0">
+                <a:solidFill>
+                  <a:srgbClr val="004080"/>
+                </a:solidFill>
+                <a:cs typeface="Tahoma" charset="0"/>
+              </a:rPr>
+              <a:t>) базы данных перед запуском тестов и откат к нему после окончания тестирования</a:t>
+            </a:r>
+            <a:r>
+              <a:rPr lang="ru-RU" dirty="0" smtClean="0">
+                <a:solidFill>
+                  <a:srgbClr val="004080"/>
+                </a:solidFill>
+                <a:cs typeface="Tahoma" charset="0"/>
+              </a:rPr>
+              <a:t>.</a:t>
+            </a:r>
+          </a:p>
+          <a:p>
+            <a:pPr marL="287338" indent="-287338" defTabSz="803275">
+              <a:buClr>
+                <a:srgbClr val="FF6600"/>
+              </a:buClr>
+              <a:buSzPct val="125000"/>
+              <a:buFont typeface="Wingdings" charset="0"/>
+              <a:buChar char="§"/>
+            </a:pPr>
+            <a:endParaRPr lang="ru-RU" dirty="0">
+              <a:solidFill>
+                <a:srgbClr val="004080"/>
+              </a:solidFill>
+              <a:cs typeface="Tahoma" charset="0"/>
+            </a:endParaRPr>
+          </a:p>
+          <a:p>
+            <a:pPr marL="287338" indent="-287338" defTabSz="803275">
+              <a:buClr>
+                <a:srgbClr val="FF6600"/>
+              </a:buClr>
+              <a:buSzPct val="125000"/>
+              <a:buFont typeface="Wingdings" charset="0"/>
+              <a:buChar char="§"/>
+            </a:pPr>
+            <a:r>
+              <a:rPr lang="ru-RU" dirty="0">
+                <a:solidFill>
+                  <a:srgbClr val="004080"/>
+                </a:solidFill>
+                <a:cs typeface="Tahoma" charset="0"/>
+              </a:rPr>
+              <a:t>Сброс базы данных в чистое состояние перед тестом, а не после них. Это может быть удобно, если интересно посмотреть состояние базы данных, оставшееся после не прошедшего теста.</a:t>
+            </a:r>
+          </a:p>
+        </p:txBody>
+      </p:sp>
+    </p:spTree>
+    <p:extLst>
+      <p:ext uri="{BB962C8B-B14F-4D97-AF65-F5344CB8AC3E}">
+        <p14:creationId xmlns:p14="http://schemas.microsoft.com/office/powerpoint/2010/main" val="2894662985"/>
+      </p:ext>
+    </p:extLst>
+  </p:cSld>
+  <p:clrMapOvr>
+    <a:masterClrMapping/>
+  </p:clrMapOvr>
+  <p:transition xmlns:p14="http://schemas.microsoft.com/office/powerpoint/2010/main">
+    <p:zoom/>
+  </p:transition>
+</p:sld>
+</file>
+
+<file path=ppt/slides/slide12.xml><?xml version="1.0" encoding="utf-8"?>
+<p:sld xmlns:a="http://schemas.openxmlformats.org/drawingml/2006/main" xmlns:r="http://schemas.openxmlformats.org/officeDocument/2006/relationships" xmlns:p="http://schemas.openxmlformats.org/presentationml/2006/main">
+  <p:cSld>
+    <p:spTree>
+      <p:nvGrpSpPr>
+        <p:cNvPr id="1" name=""/>
+        <p:cNvGrpSpPr/>
+        <p:nvPr/>
+      </p:nvGrpSpPr>
+      <p:grpSpPr>
+        <a:xfrm>
+          <a:off x="0" y="0"/>
+          <a:ext cx="0" cy="0"/>
+          <a:chOff x="0" y="0"/>
+          <a:chExt cx="0" cy="0"/>
+        </a:xfrm>
+      </p:grpSpPr>
+      <p:sp>
+        <p:nvSpPr>
+          <p:cNvPr id="3" name="Title 2"/>
+          <p:cNvSpPr>
+            <a:spLocks noGrp="1"/>
+          </p:cNvSpPr>
+          <p:nvPr>
+            <p:ph type="title"/>
+          </p:nvPr>
+        </p:nvSpPr>
+        <p:spPr/>
+        <p:txBody>
+          <a:bodyPr/>
+          <a:lstStyle/>
+          <a:p>
+            <a:r>
+              <a:rPr lang="en-US" dirty="0" smtClean="0"/>
+              <a:t>Test </a:t>
+            </a:r>
+            <a:r>
+              <a:rPr lang="en-US" dirty="0"/>
+              <a:t>asynchronous processes</a:t>
+            </a:r>
+            <a:endParaRPr lang="en-US" dirty="0"/>
+          </a:p>
+        </p:txBody>
+      </p:sp>
+      <p:sp>
+        <p:nvSpPr>
+          <p:cNvPr id="4" name="Rectangle 3"/>
+          <p:cNvSpPr>
+            <a:spLocks noChangeArrowheads="1"/>
+          </p:cNvSpPr>
+          <p:nvPr>
+            <p:custDataLst>
+              <p:tags r:id="rId1"/>
+            </p:custDataLst>
+          </p:nvPr>
+        </p:nvSpPr>
+        <p:spPr bwMode="auto">
+          <a:xfrm>
+            <a:off x="955174" y="2654082"/>
+            <a:ext cx="7252368" cy="793611"/>
+          </a:xfrm>
+          <a:prstGeom prst="rect">
+            <a:avLst/>
+          </a:prstGeom>
+          <a:noFill/>
+          <a:ln w="19050">
+            <a:noFill/>
+            <a:miter lim="800000"/>
+            <a:headEnd/>
+            <a:tailEnd/>
+          </a:ln>
+        </p:spPr>
+        <p:txBody>
+          <a:bodyPr wrap="square" lIns="93296" tIns="144000" rIns="93296" bIns="93296">
+            <a:spAutoFit/>
+          </a:bodyPr>
+          <a:lstStyle/>
+          <a:p>
+            <a:pPr algn="ctr" defTabSz="803275">
+              <a:buClr>
+                <a:srgbClr val="FF6600"/>
+              </a:buClr>
+              <a:buSzPct val="125000"/>
+            </a:pPr>
+            <a:r>
+              <a:rPr lang="en-US" dirty="0">
+                <a:solidFill>
+                  <a:srgbClr val="004080"/>
+                </a:solidFill>
+                <a:cs typeface="Tahoma" charset="0"/>
+              </a:rPr>
+              <a:t>http://</a:t>
+            </a:r>
+            <a:r>
+              <a:rPr lang="en-US" dirty="0" err="1">
+                <a:solidFill>
+                  <a:srgbClr val="004080"/>
+                </a:solidFill>
+                <a:cs typeface="Tahoma" charset="0"/>
+              </a:rPr>
+              <a:t>stackoverflow.com</a:t>
+            </a:r>
+            <a:r>
+              <a:rPr lang="en-US" dirty="0">
+                <a:solidFill>
+                  <a:srgbClr val="004080"/>
+                </a:solidFill>
+                <a:cs typeface="Tahoma" charset="0"/>
+              </a:rPr>
+              <a:t>/questions/631598/how-to-use-</a:t>
+            </a:r>
+            <a:r>
+              <a:rPr lang="en-US" dirty="0" err="1">
+                <a:solidFill>
+                  <a:srgbClr val="004080"/>
+                </a:solidFill>
+                <a:cs typeface="Tahoma" charset="0"/>
+              </a:rPr>
+              <a:t>junit</a:t>
+            </a:r>
+            <a:r>
+              <a:rPr lang="en-US" dirty="0">
+                <a:solidFill>
+                  <a:srgbClr val="004080"/>
+                </a:solidFill>
+                <a:cs typeface="Tahoma" charset="0"/>
+              </a:rPr>
+              <a:t>-to-test-asynchronous-processes</a:t>
+            </a:r>
+            <a:endParaRPr lang="ru-RU" dirty="0">
+              <a:solidFill>
+                <a:srgbClr val="004080"/>
+              </a:solidFill>
+              <a:cs typeface="Tahoma" charset="0"/>
+            </a:endParaRPr>
+          </a:p>
+        </p:txBody>
+      </p:sp>
+    </p:spTree>
+    <p:extLst>
+      <p:ext uri="{BB962C8B-B14F-4D97-AF65-F5344CB8AC3E}">
+        <p14:creationId xmlns:p14="http://schemas.microsoft.com/office/powerpoint/2010/main" val="3446970300"/>
+      </p:ext>
+    </p:extLst>
+  </p:cSld>
+  <p:clrMapOvr>
+    <a:masterClrMapping/>
+  </p:clrMapOvr>
+  <p:transition xmlns:p14="http://schemas.microsoft.com/office/powerpoint/2010/main">
+    <p:zoom/>
+  </p:transition>
+</p:sld>
+</file>
+
+<file path=ppt/slides/slide13.xml><?xml version="1.0" encoding="utf-8"?>
+<p:sld xmlns:a="http://schemas.openxmlformats.org/drawingml/2006/main" xmlns:r="http://schemas.openxmlformats.org/officeDocument/2006/relationships" xmlns:p="http://schemas.openxmlformats.org/presentationml/2006/main">
+  <p:cSld>
+    <p:spTree>
+      <p:nvGrpSpPr>
+        <p:cNvPr id="1" name=""/>
+        <p:cNvGrpSpPr/>
+        <p:nvPr/>
+      </p:nvGrpSpPr>
+      <p:grpSpPr>
+        <a:xfrm>
+          <a:off x="0" y="0"/>
+          <a:ext cx="0" cy="0"/>
+          <a:chOff x="0" y="0"/>
+          <a:chExt cx="0" cy="0"/>
+        </a:xfrm>
+      </p:grpSpPr>
+      <p:sp>
+        <p:nvSpPr>
+          <p:cNvPr id="7" name="Text Placeholder 6"/>
+          <p:cNvSpPr>
+            <a:spLocks noGrp="1"/>
+          </p:cNvSpPr>
+          <p:nvPr>
+            <p:ph type="body" sz="quarter" idx="20"/>
+          </p:nvPr>
+        </p:nvSpPr>
+        <p:spPr>
+          <a:xfrm>
+            <a:off x="2127250" y="2432649"/>
+            <a:ext cx="6467476" cy="576293"/>
+          </a:xfrm>
+        </p:spPr>
+        <p:txBody>
+          <a:bodyPr/>
+          <a:lstStyle/>
+          <a:p>
+            <a:r>
+              <a:rPr lang="ru-RU" dirty="0" smtClean="0"/>
+              <a:t>Вопросы ?</a:t>
+            </a:r>
+            <a:endParaRPr lang="en-US" dirty="0"/>
+          </a:p>
+        </p:txBody>
+      </p:sp>
+    </p:spTree>
+    <p:extLst>
+      <p:ext uri="{BB962C8B-B14F-4D97-AF65-F5344CB8AC3E}">
+        <p14:creationId xmlns:p14="http://schemas.microsoft.com/office/powerpoint/2010/main" val="2964007123"/>
+      </p:ext>
+    </p:extLst>
+  </p:cSld>
+  <p:clrMapOvr>
+    <a:masterClrMapping/>
+  </p:clrMapOvr>
+  <p:transition xmlns:p14="http://schemas.microsoft.com/office/powerpoint/2010/main">
+    <p:zoom/>
+  </p:transition>
+  <p:timing>
+    <p:tnLst>
+      <p:par>
+        <p:cTn xmlns:p14="http://schemas.microsoft.com/office/powerpoint/2010/main" id="1" dur="indefinite" restart="never" nodeType="tmRoot"/>
+      </p:par>
+    </p:tnLst>
+  </p:timing>
+</p:sld>
+</file>
+
+<file path=ppt/slides/slide14.xml><?xml version="1.0" encoding="utf-8"?>
+<p:sld xmlns:a="http://schemas.openxmlformats.org/drawingml/2006/main" xmlns:r="http://schemas.openxmlformats.org/officeDocument/2006/relationships" xmlns:p="http://schemas.openxmlformats.org/presentationml/2006/main">
+  <p:cSld>
+    <p:spTree>
+      <p:nvGrpSpPr>
+        <p:cNvPr id="1" name=""/>
+        <p:cNvGrpSpPr/>
+        <p:nvPr/>
+      </p:nvGrpSpPr>
+      <p:grpSpPr>
+        <a:xfrm>
+          <a:off x="0" y="0"/>
+          <a:ext cx="0" cy="0"/>
+          <a:chOff x="0" y="0"/>
+          <a:chExt cx="0" cy="0"/>
+        </a:xfrm>
+      </p:grpSpPr>
+      <p:sp>
+        <p:nvSpPr>
+          <p:cNvPr id="7" name="Subtitle 6"/>
+          <p:cNvSpPr>
+            <a:spLocks noGrp="1"/>
+          </p:cNvSpPr>
+          <p:nvPr>
+            <p:ph type="subTitle" idx="1"/>
+          </p:nvPr>
+        </p:nvSpPr>
+        <p:spPr/>
+        <p:txBody>
+          <a:bodyPr/>
+          <a:lstStyle/>
+          <a:p>
+            <a:r>
+              <a:rPr lang="en-US" dirty="0">
+                <a:latin typeface="Arial" charset="0"/>
+              </a:rPr>
+              <a:t>Разработка через </a:t>
+            </a:r>
+            <a:r>
+              <a:rPr lang="en-US" dirty="0" smtClean="0">
+                <a:latin typeface="Arial" charset="0"/>
+              </a:rPr>
+              <a:t>тестирование</a:t>
+            </a:r>
+            <a:r>
+              <a:rPr lang="en-US" dirty="0">
+                <a:latin typeface="Arial" charset="0"/>
+              </a:rPr>
+              <a:t/>
+            </a:r>
+            <a:br>
+              <a:rPr lang="en-US" dirty="0">
+                <a:latin typeface="Arial" charset="0"/>
+              </a:rPr>
+            </a:br>
+            <a:endParaRPr lang="en-US" dirty="0"/>
+          </a:p>
+        </p:txBody>
+      </p:sp>
+      <p:sp>
+        <p:nvSpPr>
+          <p:cNvPr id="8" name="Text Placeholder 7"/>
+          <p:cNvSpPr>
+            <a:spLocks noGrp="1"/>
+          </p:cNvSpPr>
+          <p:nvPr>
+            <p:ph type="body" sz="quarter" idx="11"/>
+          </p:nvPr>
+        </p:nvSpPr>
+        <p:spPr/>
+        <p:txBody>
+          <a:bodyPr>
+            <a:normAutofit/>
+          </a:bodyPr>
+          <a:lstStyle/>
+          <a:p>
+            <a:r>
+              <a:rPr lang="en-US" dirty="0" err="1"/>
+              <a:t>git</a:t>
+            </a:r>
+            <a:r>
+              <a:rPr lang="en-US" dirty="0"/>
+              <a:t> clone </a:t>
+            </a:r>
+            <a:r>
+              <a:rPr lang="en-US" dirty="0" err="1"/>
+              <a:t>git</a:t>
+            </a:r>
+            <a:r>
+              <a:rPr lang="en-US" dirty="0"/>
+              <a:t>://</a:t>
+            </a:r>
+            <a:r>
+              <a:rPr lang="en-US" dirty="0" err="1"/>
+              <a:t>github.com</a:t>
+            </a:r>
+            <a:r>
+              <a:rPr lang="en-US" dirty="0"/>
+              <a:t>/</a:t>
+            </a:r>
+            <a:r>
+              <a:rPr lang="en-US" dirty="0" err="1"/>
+              <a:t>ivan-dyachenko</a:t>
+            </a:r>
+            <a:r>
+              <a:rPr lang="en-US" dirty="0"/>
+              <a:t>/</a:t>
+            </a:r>
+            <a:r>
+              <a:rPr lang="en-US" dirty="0" err="1"/>
+              <a:t>Trainings.git</a:t>
+            </a:r>
+            <a:endParaRPr lang="en-US" dirty="0"/>
+          </a:p>
+        </p:txBody>
+      </p:sp>
+      <p:sp>
+        <p:nvSpPr>
+          <p:cNvPr id="9" name="Text Placeholder 8"/>
+          <p:cNvSpPr>
+            <a:spLocks noGrp="1"/>
+          </p:cNvSpPr>
+          <p:nvPr>
+            <p:ph type="body" sz="quarter" idx="12"/>
+          </p:nvPr>
+        </p:nvSpPr>
+        <p:spPr/>
+        <p:txBody>
+          <a:bodyPr/>
+          <a:lstStyle/>
+          <a:p>
+            <a:r>
+              <a:rPr lang="en-US" dirty="0" err="1" smtClean="0"/>
+              <a:t>IDyachenko@luxoft.com</a:t>
+            </a:r>
+            <a:endParaRPr lang="en-US" dirty="0"/>
+          </a:p>
+        </p:txBody>
+      </p:sp>
+      <p:sp>
+        <p:nvSpPr>
+          <p:cNvPr id="10" name="Text Placeholder 9"/>
+          <p:cNvSpPr>
+            <a:spLocks noGrp="1"/>
+          </p:cNvSpPr>
+          <p:nvPr>
+            <p:ph type="body" sz="quarter" idx="13"/>
+          </p:nvPr>
+        </p:nvSpPr>
+        <p:spPr/>
+        <p:txBody>
+          <a:bodyPr>
+            <a:normAutofit/>
+          </a:bodyPr>
+          <a:lstStyle/>
+          <a:p>
+            <a:r>
+              <a:rPr lang="en-US" dirty="0"/>
+              <a:t>https://</a:t>
+            </a:r>
+            <a:r>
+              <a:rPr lang="en-US" dirty="0" err="1"/>
+              <a:t>github.com</a:t>
+            </a:r>
+            <a:r>
+              <a:rPr lang="en-US" dirty="0"/>
+              <a:t>/</a:t>
+            </a:r>
+            <a:r>
+              <a:rPr lang="en-US" dirty="0" err="1"/>
+              <a:t>ivan-dyachenko</a:t>
+            </a:r>
+            <a:r>
+              <a:rPr lang="en-US" dirty="0"/>
+              <a:t>/</a:t>
+            </a:r>
+            <a:r>
+              <a:rPr lang="en-US" dirty="0" smtClean="0"/>
+              <a:t>Trainings</a:t>
+            </a:r>
+            <a:endParaRPr lang="en-US" dirty="0"/>
+          </a:p>
+        </p:txBody>
+      </p:sp>
+      <p:sp>
+        <p:nvSpPr>
+          <p:cNvPr id="11" name="Text Placeholder 10"/>
+          <p:cNvSpPr>
+            <a:spLocks noGrp="1"/>
+          </p:cNvSpPr>
+          <p:nvPr>
+            <p:ph type="body" sz="quarter" idx="14"/>
+          </p:nvPr>
+        </p:nvSpPr>
+        <p:spPr/>
+        <p:txBody>
+          <a:bodyPr/>
+          <a:lstStyle/>
+          <a:p>
+            <a:endParaRPr lang="en-US"/>
+          </a:p>
+        </p:txBody>
+      </p:sp>
+    </p:spTree>
+    <p:extLst>
+      <p:ext uri="{BB962C8B-B14F-4D97-AF65-F5344CB8AC3E}">
+        <p14:creationId xmlns:p14="http://schemas.microsoft.com/office/powerpoint/2010/main" val="1157964761"/>
+      </p:ext>
+    </p:extLst>
+  </p:cSld>
+  <p:clrMapOvr>
+    <a:masterClrMapping/>
+  </p:clrMapOvr>
+  <p:transition xmlns:p14="http://schemas.microsoft.com/office/powerpoint/2010/main">
+    <p:zoom/>
+  </p:transition>
+</p:sld>
+</file>
+
 <file path=ppt/slides/slide2.xml><?xml version="1.0" encoding="utf-8"?>
 <p:sld xmlns:a="http://schemas.openxmlformats.org/drawingml/2006/main" xmlns:r="http://schemas.openxmlformats.org/officeDocument/2006/relationships" xmlns:p="http://schemas.openxmlformats.org/presentationml/2006/main">
   <p:cSld>
@@ -18605,7 +19786,7 @@
                     <a:srgbClr val="004080"/>
                   </a:solidFill>
                 </a:rPr>
-                <a:t>Тесты на поведение и на состояние</a:t>
+                <a:t>Интеграционные тесты</a:t>
               </a:r>
               <a:endParaRPr lang="ru-RU" dirty="0">
                 <a:solidFill>
@@ -18884,7 +20065,15 @@
                     <a:srgbClr val="004080"/>
                   </a:solidFill>
                 </a:rPr>
-                <a:t>Workshop</a:t>
+                <a:t>Black-box </a:t>
+              </a:r>
+              <a:r>
+                <a:rPr lang="ru-RU" dirty="0" smtClean="0">
+                  <a:solidFill>
+                    <a:srgbClr val="004080"/>
+                  </a:solidFill>
+                </a:rPr>
+                <a:t>тестирование</a:t>
               </a:r>
               <a:endParaRPr lang="en-US" dirty="0">
                 <a:solidFill>
@@ -19158,12 +20347,12 @@
                 <a:buSzPct val="125000"/>
               </a:pPr>
               <a:r>
-                <a:rPr lang="ru-RU" dirty="0" smtClean="0">
+                <a:rPr lang="en-US" dirty="0">
                   <a:solidFill>
                     <a:srgbClr val="004080"/>
                   </a:solidFill>
                 </a:rPr>
-                <a:t>Шаблоны тестов</a:t>
+                <a:t>Test-driving DB layer</a:t>
               </a:r>
               <a:endParaRPr lang="en-US" dirty="0" smtClean="0">
                 <a:solidFill>
@@ -19437,12 +20626,12 @@
                 <a:buSzPct val="125000"/>
               </a:pPr>
               <a:r>
-                <a:rPr lang="ru-RU" dirty="0" smtClean="0">
+                <a:rPr lang="en-US" dirty="0">
                   <a:solidFill>
                     <a:srgbClr val="004080"/>
                   </a:solidFill>
                 </a:rPr>
-                <a:t>Тесты на состояние</a:t>
+                <a:t>Test-driving UI layer</a:t>
               </a:r>
               <a:endParaRPr lang="en-US" dirty="0">
                 <a:solidFill>
@@ -19716,12 +20905,12 @@
                 <a:buSzPct val="125000"/>
               </a:pPr>
               <a:r>
-                <a:rPr lang="ru-RU" dirty="0" err="1" smtClean="0">
+                <a:rPr lang="en-US" dirty="0">
                   <a:solidFill>
                     <a:srgbClr val="004080"/>
                   </a:solidFill>
                 </a:rPr>
-                <a:t>Моки</a:t>
+                <a:t>Workshop</a:t>
               </a:r>
               <a:endParaRPr lang="en-US" dirty="0" smtClean="0">
                 <a:solidFill>
@@ -19995,18 +21184,21 @@
                 <a:buSzPct val="125000"/>
               </a:pPr>
               <a:r>
-                <a:rPr lang="ru-RU" dirty="0" smtClean="0">
+                <a:rPr lang="en-US" dirty="0">
                   <a:solidFill>
                     <a:srgbClr val="004080"/>
                   </a:solidFill>
                 </a:rPr>
-                <a:t>Тесты на поведение</a:t>
+                <a:t>Test-driving </a:t>
               </a:r>
-              <a:endParaRPr lang="en-US" dirty="0" smtClean="0">
-                <a:solidFill>
-                  <a:srgbClr val="004080"/>
-                </a:solidFill>
-              </a:endParaRPr>
+              <a:r>
+                <a:rPr lang="en-US" dirty="0" smtClean="0">
+                  <a:solidFill>
+                    <a:srgbClr val="004080"/>
+                  </a:solidFill>
+                </a:rPr>
+                <a:t>API layer</a:t>
+              </a:r>
             </a:p>
           </p:txBody>
         </p:sp>
@@ -20279,7 +21471,7 @@
                     <a:srgbClr val="004080"/>
                   </a:solidFill>
                 </a:rPr>
-                <a:t>Плюсы и минусы тестов на поведение</a:t>
+                <a:t>Плюсы и минусы интеграционных тестов</a:t>
               </a:r>
               <a:endParaRPr lang="en-US" dirty="0">
                 <a:solidFill>
@@ -20332,52 +21524,119 @@
       </p:grpSpPr>
       <p:sp>
         <p:nvSpPr>
-          <p:cNvPr id="7" name="Text Placeholder 6"/>
+          <p:cNvPr id="2" name="Title 1"/>
           <p:cNvSpPr>
             <a:spLocks noGrp="1"/>
           </p:cNvSpPr>
           <p:nvPr>
-            <p:ph type="body" sz="quarter" idx="20"/>
+            <p:ph type="title"/>
           </p:nvPr>
         </p:nvSpPr>
-        <p:spPr>
-          <a:xfrm>
-            <a:off x="2127250" y="2432649"/>
-            <a:ext cx="6467476" cy="576293"/>
-          </a:xfrm>
-        </p:spPr>
+        <p:spPr/>
         <p:txBody>
           <a:bodyPr/>
           <a:lstStyle/>
           <a:p>
             <a:r>
-              <a:rPr lang="ru-RU" dirty="0" smtClean="0"/>
-              <a:t>Вопросы ?</a:t>
-            </a:r>
-            <a:endParaRPr lang="en-US" dirty="0"/>
+              <a:rPr lang="ru-RU" dirty="0" smtClean="0">
+                <a:solidFill>
+                  <a:schemeClr val="tx2"/>
+                </a:solidFill>
+                <a:latin typeface="Arial"/>
+                <a:cs typeface="Arial"/>
+              </a:rPr>
+              <a:t>Интеграционное тестирование</a:t>
+            </a:r>
+            <a:endParaRPr lang="en-US" dirty="0">
+              <a:solidFill>
+                <a:schemeClr val="tx2"/>
+              </a:solidFill>
+              <a:latin typeface="Arial"/>
+              <a:cs typeface="Arial"/>
+            </a:endParaRPr>
+          </a:p>
+        </p:txBody>
+      </p:sp>
+      <p:sp>
+        <p:nvSpPr>
+          <p:cNvPr id="4" name="Rectangle 3"/>
+          <p:cNvSpPr>
+            <a:spLocks noChangeArrowheads="1"/>
+          </p:cNvSpPr>
+          <p:nvPr>
+            <p:custDataLst>
+              <p:tags r:id="rId1"/>
+            </p:custDataLst>
+          </p:nvPr>
+        </p:nvSpPr>
+        <p:spPr bwMode="auto">
+          <a:xfrm>
+            <a:off x="990600" y="2893695"/>
+            <a:ext cx="7252368" cy="1070610"/>
+          </a:xfrm>
+          <a:prstGeom prst="rect">
+            <a:avLst/>
+          </a:prstGeom>
+          <a:noFill/>
+          <a:ln w="19050">
+            <a:noFill/>
+            <a:miter lim="800000"/>
+            <a:headEnd/>
+            <a:tailEnd/>
+          </a:ln>
+        </p:spPr>
+        <p:txBody>
+          <a:bodyPr wrap="square" lIns="93296" tIns="144000" rIns="93296" bIns="93296">
+            <a:spAutoFit/>
+          </a:bodyPr>
+          <a:lstStyle/>
+          <a:p>
+            <a:pPr defTabSz="803275">
+              <a:buClr>
+                <a:srgbClr val="FF6600"/>
+              </a:buClr>
+              <a:buSzPct val="125000"/>
+            </a:pPr>
+            <a:r>
+              <a:rPr lang="ru-RU" dirty="0" smtClean="0">
+                <a:solidFill>
+                  <a:srgbClr val="004080"/>
+                </a:solidFill>
+                <a:cs typeface="Tahoma" charset="0"/>
+              </a:rPr>
+              <a:t>Интеграционное тестирование — </a:t>
+            </a:r>
+            <a:r>
+              <a:rPr lang="ru-RU" dirty="0">
+                <a:solidFill>
+                  <a:srgbClr val="004080"/>
+                </a:solidFill>
+                <a:cs typeface="Tahoma" charset="0"/>
+              </a:rPr>
+              <a:t>одна из фаз тестирования программного обеспечения, при которой отдельные программные модули объединяются и тестируются в группе.</a:t>
+            </a:r>
+            <a:endParaRPr lang="nb-NO" dirty="0" smtClean="0">
+              <a:solidFill>
+                <a:srgbClr val="004080"/>
+              </a:solidFill>
+              <a:cs typeface="Tahoma" charset="0"/>
+            </a:endParaRPr>
           </a:p>
         </p:txBody>
       </p:sp>
     </p:spTree>
     <p:extLst>
       <p:ext uri="{BB962C8B-B14F-4D97-AF65-F5344CB8AC3E}">
-        <p14:creationId xmlns:p14="http://schemas.microsoft.com/office/powerpoint/2010/main" val="2964007123"/>
+        <p14:creationId xmlns:p14="http://schemas.microsoft.com/office/powerpoint/2010/main" val="510653634"/>
       </p:ext>
     </p:extLst>
   </p:cSld>
   <p:clrMapOvr>
     <a:masterClrMapping/>
   </p:clrMapOvr>
-  <p:transition xmlns:p14="http://schemas.microsoft.com/office/powerpoint/2010/main">
-    <p:zoom/>
+  <p:transition xmlns:p14="http://schemas.microsoft.com/office/powerpoint/2010/main" spd="slow">
+    <p:fade/>
   </p:transition>
-  <p:timing>
-    <p:tnLst>
-      <p:par>
-        <p:cTn xmlns:p14="http://schemas.microsoft.com/office/powerpoint/2010/main" id="1" dur="indefinite" restart="never" nodeType="tmRoot"/>
-      </p:par>
-    </p:tnLst>
-  </p:timing>
 </p:sld>
 </file>
 
@@ -20400,12 +21659,12 @@
       </p:grpSpPr>
       <p:sp>
         <p:nvSpPr>
-          <p:cNvPr id="7" name="Subtitle 6"/>
+          <p:cNvPr id="3" name="Title 2"/>
           <p:cNvSpPr>
             <a:spLocks noGrp="1"/>
           </p:cNvSpPr>
           <p:nvPr>
-            <p:ph type="subTitle" idx="1"/>
+            <p:ph type="title"/>
           </p:nvPr>
         </p:nvSpPr>
         <p:spPr/>
@@ -20414,180 +21673,119 @@
           <a:lstStyle/>
           <a:p>
             <a:r>
-              <a:rPr lang="en-US" dirty="0">
-                <a:latin typeface="Arial" charset="0"/>
-              </a:rPr>
-              <a:t>Разработка через </a:t>
-            </a:r>
-            <a:r>
-              <a:rPr lang="en-US" dirty="0" smtClean="0">
-                <a:latin typeface="Arial" charset="0"/>
-              </a:rPr>
-              <a:t>тестирование</a:t>
-            </a:r>
-            <a:r>
-              <a:rPr lang="en-US" dirty="0">
-                <a:latin typeface="Arial" charset="0"/>
-              </a:rPr>
-              <a:t/>
-            </a:r>
-            <a:br>
-              <a:rPr lang="en-US" dirty="0">
-                <a:latin typeface="Arial" charset="0"/>
-              </a:rPr>
-            </a:br>
+              <a:rPr lang="ru-RU" dirty="0" smtClean="0"/>
+              <a:t>Тестирование </a:t>
+            </a:r>
+            <a:r>
+              <a:rPr lang="ru-RU" dirty="0"/>
+              <a:t>архитектуры системы</a:t>
+            </a:r>
             <a:endParaRPr lang="en-US" dirty="0"/>
           </a:p>
         </p:txBody>
       </p:sp>
       <p:sp>
         <p:nvSpPr>
-          <p:cNvPr id="8" name="Text Placeholder 7"/>
+          <p:cNvPr id="4" name="Rectangle 3"/>
           <p:cNvSpPr>
-            <a:spLocks noGrp="1"/>
+            <a:spLocks noChangeArrowheads="1"/>
           </p:cNvSpPr>
           <p:nvPr>
-            <p:ph type="body" sz="quarter" idx="11"/>
+            <p:custDataLst>
+              <p:tags r:id="rId1"/>
+            </p:custDataLst>
           </p:nvPr>
         </p:nvSpPr>
-        <p:spPr/>
+        <p:spPr bwMode="auto">
+          <a:xfrm>
+            <a:off x="914400" y="2478197"/>
+            <a:ext cx="7252368" cy="2455605"/>
+          </a:xfrm>
+          <a:prstGeom prst="rect">
+            <a:avLst/>
+          </a:prstGeom>
+          <a:noFill/>
+          <a:ln w="19050">
+            <a:noFill/>
+            <a:miter lim="800000"/>
+            <a:headEnd/>
+            <a:tailEnd/>
+          </a:ln>
+        </p:spPr>
         <p:txBody>
-          <a:bodyPr>
-            <a:normAutofit/>
+          <a:bodyPr wrap="square" lIns="93296" tIns="144000" rIns="93296" bIns="93296">
+            <a:spAutoFit/>
           </a:bodyPr>
           <a:lstStyle/>
           <a:p>
-            <a:r>
-              <a:rPr lang="en-US" dirty="0" err="1"/>
-              <a:t>git</a:t>
-            </a:r>
-            <a:r>
-              <a:rPr lang="en-US" dirty="0"/>
-              <a:t> clone </a:t>
-            </a:r>
-            <a:r>
-              <a:rPr lang="en-US" dirty="0" err="1"/>
-              <a:t>git</a:t>
-            </a:r>
-            <a:r>
-              <a:rPr lang="en-US" dirty="0"/>
-              <a:t>://</a:t>
-            </a:r>
-            <a:r>
-              <a:rPr lang="en-US" dirty="0" err="1"/>
-              <a:t>github.com</a:t>
-            </a:r>
-            <a:r>
-              <a:rPr lang="en-US" dirty="0"/>
-              <a:t>/</a:t>
-            </a:r>
-            <a:r>
-              <a:rPr lang="en-US" dirty="0" err="1"/>
-              <a:t>ivan-dyachenko</a:t>
-            </a:r>
-            <a:r>
-              <a:rPr lang="en-US" dirty="0"/>
-              <a:t>/</a:t>
-            </a:r>
-            <a:r>
-              <a:rPr lang="en-US" dirty="0" err="1"/>
-              <a:t>Trainings.git</a:t>
-            </a:r>
-            <a:endParaRPr lang="en-US" dirty="0"/>
-          </a:p>
-        </p:txBody>
-      </p:sp>
-      <p:sp>
-        <p:nvSpPr>
-          <p:cNvPr id="9" name="Text Placeholder 8"/>
-          <p:cNvSpPr>
-            <a:spLocks noGrp="1"/>
-          </p:cNvSpPr>
-          <p:nvPr>
-            <p:ph type="body" sz="quarter" idx="12"/>
-          </p:nvPr>
-        </p:nvSpPr>
-        <p:spPr/>
-        <p:txBody>
-          <a:bodyPr/>
-          <a:lstStyle/>
-          <a:p>
-            <a:r>
-              <a:rPr lang="en-US" dirty="0" err="1" smtClean="0"/>
-              <a:t>IDyachenko@luxoft.com</a:t>
-            </a:r>
-            <a:endParaRPr lang="en-US" dirty="0"/>
-          </a:p>
-        </p:txBody>
-      </p:sp>
-      <p:sp>
-        <p:nvSpPr>
-          <p:cNvPr id="10" name="Text Placeholder 9"/>
-          <p:cNvSpPr>
-            <a:spLocks noGrp="1"/>
-          </p:cNvSpPr>
-          <p:nvPr>
-            <p:ph type="body" sz="quarter" idx="13"/>
-          </p:nvPr>
-        </p:nvSpPr>
-        <p:spPr/>
-        <p:txBody>
-          <a:bodyPr>
-            <a:normAutofit/>
-          </a:bodyPr>
-          <a:lstStyle/>
-          <a:p>
-            <a:r>
-              <a:rPr lang="en-US" dirty="0"/>
-              <a:t>https://</a:t>
-            </a:r>
-            <a:r>
-              <a:rPr lang="en-US" dirty="0" err="1"/>
-              <a:t>github.com</a:t>
-            </a:r>
-            <a:r>
-              <a:rPr lang="en-US" dirty="0"/>
-              <a:t>/</a:t>
-            </a:r>
-            <a:r>
-              <a:rPr lang="en-US" dirty="0" err="1"/>
-              <a:t>ivan-dyachenko</a:t>
-            </a:r>
-            <a:r>
-              <a:rPr lang="en-US" dirty="0"/>
-              <a:t>/</a:t>
-            </a:r>
-            <a:r>
-              <a:rPr lang="en-US" dirty="0" smtClean="0"/>
-              <a:t>Trainings</a:t>
-            </a:r>
-            <a:endParaRPr lang="en-US" dirty="0"/>
-          </a:p>
-        </p:txBody>
-      </p:sp>
-      <p:sp>
-        <p:nvSpPr>
-          <p:cNvPr id="11" name="Text Placeholder 10"/>
-          <p:cNvSpPr>
-            <a:spLocks noGrp="1"/>
-          </p:cNvSpPr>
-          <p:nvPr>
-            <p:ph type="body" sz="quarter" idx="14"/>
-          </p:nvPr>
-        </p:nvSpPr>
-        <p:spPr/>
-        <p:txBody>
-          <a:bodyPr/>
-          <a:lstStyle/>
-          <a:p>
-            <a:endParaRPr lang="en-US"/>
+            <a:pPr defTabSz="803275">
+              <a:buClr>
+                <a:srgbClr val="FF6600"/>
+              </a:buClr>
+              <a:buSzPct val="125000"/>
+            </a:pPr>
+            <a:r>
+              <a:rPr lang="ru-RU" dirty="0">
+                <a:solidFill>
+                  <a:srgbClr val="004080"/>
+                </a:solidFill>
+                <a:cs typeface="Tahoma" charset="0"/>
+              </a:rPr>
+              <a:t>Интеграционное тестирование называют еще тестированием архитектуры системы. </a:t>
+            </a:r>
+            <a:endParaRPr lang="ru-RU" dirty="0" smtClean="0">
+              <a:solidFill>
+                <a:srgbClr val="004080"/>
+              </a:solidFill>
+              <a:cs typeface="Tahoma" charset="0"/>
+            </a:endParaRPr>
+          </a:p>
+          <a:p>
+            <a:pPr defTabSz="803275">
+              <a:buClr>
+                <a:srgbClr val="FF6600"/>
+              </a:buClr>
+              <a:buSzPct val="125000"/>
+            </a:pPr>
+            <a:endParaRPr lang="ru-RU" dirty="0">
+              <a:solidFill>
+                <a:srgbClr val="004080"/>
+              </a:solidFill>
+              <a:cs typeface="Tahoma" charset="0"/>
+            </a:endParaRPr>
+          </a:p>
+          <a:p>
+            <a:pPr defTabSz="803275">
+              <a:buClr>
+                <a:srgbClr val="FF6600"/>
+              </a:buClr>
+              <a:buSzPct val="125000"/>
+            </a:pPr>
+            <a:r>
+              <a:rPr lang="ru-RU" dirty="0" smtClean="0">
+                <a:solidFill>
+                  <a:srgbClr val="004080"/>
+                </a:solidFill>
+                <a:cs typeface="Tahoma" charset="0"/>
+              </a:rPr>
+              <a:t>Результаты </a:t>
+            </a:r>
+            <a:r>
+              <a:rPr lang="ru-RU" dirty="0">
+                <a:solidFill>
+                  <a:srgbClr val="004080"/>
+                </a:solidFill>
+                <a:cs typeface="Tahoma" charset="0"/>
+              </a:rPr>
+              <a:t>выполнения интеграционных тестов – один из основных источников информации для процесса улучшения и уточнения архитектуры системы, межмодульных и межкомпонентных интерфейсов. Т.е. с интеграционные тесты проверяют корректность взаимодействия компонент системы. </a:t>
+            </a:r>
           </a:p>
         </p:txBody>
       </p:sp>
     </p:spTree>
     <p:extLst>
       <p:ext uri="{BB962C8B-B14F-4D97-AF65-F5344CB8AC3E}">
-        <p14:creationId xmlns:p14="http://schemas.microsoft.com/office/powerpoint/2010/main" val="1157964761"/>
+        <p14:creationId xmlns:p14="http://schemas.microsoft.com/office/powerpoint/2010/main" val="3605313394"/>
       </p:ext>
     </p:extLst>
   </p:cSld>
@@ -20598,6 +21796,2605 @@
     <p:zoom/>
   </p:transition>
 </p:sld>
+</file>
+
+<file path=ppt/slides/slide6.xml><?xml version="1.0" encoding="utf-8"?>
+<p:sld xmlns:a="http://schemas.openxmlformats.org/drawingml/2006/main" xmlns:r="http://schemas.openxmlformats.org/officeDocument/2006/relationships" xmlns:p="http://schemas.openxmlformats.org/presentationml/2006/main">
+  <p:cSld>
+    <p:spTree>
+      <p:nvGrpSpPr>
+        <p:cNvPr id="1" name=""/>
+        <p:cNvGrpSpPr/>
+        <p:nvPr/>
+      </p:nvGrpSpPr>
+      <p:grpSpPr>
+        <a:xfrm>
+          <a:off x="0" y="0"/>
+          <a:ext cx="0" cy="0"/>
+          <a:chOff x="0" y="0"/>
+          <a:chExt cx="0" cy="0"/>
+        </a:xfrm>
+      </p:grpSpPr>
+      <p:sp>
+        <p:nvSpPr>
+          <p:cNvPr id="2" name="Title 1"/>
+          <p:cNvSpPr>
+            <a:spLocks noGrp="1"/>
+          </p:cNvSpPr>
+          <p:nvPr>
+            <p:ph type="title"/>
+          </p:nvPr>
+        </p:nvSpPr>
+        <p:spPr/>
+        <p:txBody>
+          <a:bodyPr/>
+          <a:lstStyle/>
+          <a:p>
+            <a:r>
+              <a:rPr lang="ru-RU" dirty="0">
+                <a:solidFill>
+                  <a:schemeClr val="tx2"/>
+                </a:solidFill>
+                <a:latin typeface="Arial"/>
+                <a:cs typeface="Arial"/>
+              </a:rPr>
+              <a:t>И</a:t>
+            </a:r>
+            <a:r>
+              <a:rPr lang="ru-RU" dirty="0" smtClean="0">
+                <a:solidFill>
+                  <a:schemeClr val="tx2"/>
+                </a:solidFill>
+                <a:latin typeface="Arial"/>
+                <a:cs typeface="Arial"/>
+              </a:rPr>
+              <a:t>теративный </a:t>
+            </a:r>
+            <a:r>
+              <a:rPr lang="ru-RU" dirty="0">
+                <a:solidFill>
+                  <a:schemeClr val="tx2"/>
+                </a:solidFill>
+                <a:latin typeface="Arial"/>
+                <a:cs typeface="Arial"/>
+              </a:rPr>
+              <a:t>процесс</a:t>
+            </a:r>
+            <a:endParaRPr lang="en-US" dirty="0">
+              <a:solidFill>
+                <a:schemeClr val="tx2"/>
+              </a:solidFill>
+              <a:latin typeface="Arial"/>
+              <a:cs typeface="Arial"/>
+            </a:endParaRPr>
+          </a:p>
+        </p:txBody>
+      </p:sp>
+      <p:sp>
+        <p:nvSpPr>
+          <p:cNvPr id="4" name="Rectangle 3"/>
+          <p:cNvSpPr>
+            <a:spLocks noChangeArrowheads="1"/>
+          </p:cNvSpPr>
+          <p:nvPr>
+            <p:custDataLst>
+              <p:tags r:id="rId1"/>
+            </p:custDataLst>
+          </p:nvPr>
+        </p:nvSpPr>
+        <p:spPr bwMode="auto">
+          <a:xfrm>
+            <a:off x="990600" y="2893695"/>
+            <a:ext cx="7252368" cy="1347609"/>
+          </a:xfrm>
+          <a:prstGeom prst="rect">
+            <a:avLst/>
+          </a:prstGeom>
+          <a:noFill/>
+          <a:ln w="19050">
+            <a:noFill/>
+            <a:miter lim="800000"/>
+            <a:headEnd/>
+            <a:tailEnd/>
+          </a:ln>
+        </p:spPr>
+        <p:txBody>
+          <a:bodyPr wrap="square" lIns="93296" tIns="144000" rIns="93296" bIns="93296">
+            <a:spAutoFit/>
+          </a:bodyPr>
+          <a:lstStyle/>
+          <a:p>
+            <a:pPr defTabSz="803275">
+              <a:buClr>
+                <a:srgbClr val="FF6600"/>
+              </a:buClr>
+              <a:buSzPct val="125000"/>
+            </a:pPr>
+            <a:r>
+              <a:rPr lang="ru-RU" dirty="0" smtClean="0">
+                <a:solidFill>
+                  <a:srgbClr val="004080"/>
+                </a:solidFill>
+                <a:cs typeface="Tahoma" charset="0"/>
+              </a:rPr>
+              <a:t>Интеграционное тестирование, как правило, представляет собой итеративный процесс, при котором проверяется функциональность все более и более увеличивающейся в размерах совокупности модулей.</a:t>
+            </a:r>
+            <a:endParaRPr lang="nb-NO" dirty="0" smtClean="0">
+              <a:solidFill>
+                <a:srgbClr val="004080"/>
+              </a:solidFill>
+              <a:cs typeface="Tahoma" charset="0"/>
+            </a:endParaRPr>
+          </a:p>
+        </p:txBody>
+      </p:sp>
+    </p:spTree>
+    <p:extLst>
+      <p:ext uri="{BB962C8B-B14F-4D97-AF65-F5344CB8AC3E}">
+        <p14:creationId xmlns:p14="http://schemas.microsoft.com/office/powerpoint/2010/main" val="2127328756"/>
+      </p:ext>
+    </p:extLst>
+  </p:cSld>
+  <p:clrMapOvr>
+    <a:masterClrMapping/>
+  </p:clrMapOvr>
+  <p:transition xmlns:p14="http://schemas.microsoft.com/office/powerpoint/2010/main" spd="slow">
+    <p:fade/>
+  </p:transition>
+</p:sld>
+</file>
+
+<file path=ppt/slides/slide7.xml><?xml version="1.0" encoding="utf-8"?>
+<p:sld xmlns:a="http://schemas.openxmlformats.org/drawingml/2006/main" xmlns:r="http://schemas.openxmlformats.org/officeDocument/2006/relationships" xmlns:p="http://schemas.openxmlformats.org/presentationml/2006/main">
+  <p:cSld>
+    <p:spTree>
+      <p:nvGrpSpPr>
+        <p:cNvPr id="1" name=""/>
+        <p:cNvGrpSpPr/>
+        <p:nvPr/>
+      </p:nvGrpSpPr>
+      <p:grpSpPr>
+        <a:xfrm>
+          <a:off x="0" y="0"/>
+          <a:ext cx="0" cy="0"/>
+          <a:chOff x="0" y="0"/>
+          <a:chExt cx="0" cy="0"/>
+        </a:xfrm>
+      </p:grpSpPr>
+      <p:sp>
+        <p:nvSpPr>
+          <p:cNvPr id="3" name="Title 2"/>
+          <p:cNvSpPr>
+            <a:spLocks noGrp="1"/>
+          </p:cNvSpPr>
+          <p:nvPr>
+            <p:ph type="title"/>
+          </p:nvPr>
+        </p:nvSpPr>
+        <p:spPr/>
+        <p:txBody>
+          <a:bodyPr/>
+          <a:lstStyle/>
+          <a:p>
+            <a:r>
+              <a:rPr lang="ru-RU" dirty="0" smtClean="0"/>
+              <a:t>Пример</a:t>
+            </a:r>
+            <a:endParaRPr lang="en-US" dirty="0"/>
+          </a:p>
+        </p:txBody>
+      </p:sp>
+      <p:pic>
+        <p:nvPicPr>
+          <p:cNvPr id="2" name="Picture 1"/>
+          <p:cNvPicPr>
+            <a:picLocks noChangeAspect="1"/>
+          </p:cNvPicPr>
+          <p:nvPr/>
+        </p:nvPicPr>
+        <p:blipFill>
+          <a:blip r:embed="rId2"/>
+          <a:stretch>
+            <a:fillRect/>
+          </a:stretch>
+        </p:blipFill>
+        <p:spPr>
+          <a:xfrm>
+            <a:off x="4624855" y="6248400"/>
+            <a:ext cx="4203700" cy="368300"/>
+          </a:xfrm>
+          <a:prstGeom prst="rect">
+            <a:avLst/>
+          </a:prstGeom>
+        </p:spPr>
+      </p:pic>
+      <p:grpSp>
+        <p:nvGrpSpPr>
+          <p:cNvPr id="11" name="Group 10"/>
+          <p:cNvGrpSpPr/>
+          <p:nvPr/>
+        </p:nvGrpSpPr>
+        <p:grpSpPr>
+          <a:xfrm>
+            <a:off x="637248" y="1533673"/>
+            <a:ext cx="2827894" cy="1869927"/>
+            <a:chOff x="2184400" y="1384300"/>
+            <a:chExt cx="2641600" cy="1295400"/>
+          </a:xfrm>
+        </p:grpSpPr>
+        <p:grpSp>
+          <p:nvGrpSpPr>
+            <p:cNvPr id="12" name="Group 11"/>
+            <p:cNvGrpSpPr/>
+            <p:nvPr/>
+          </p:nvGrpSpPr>
+          <p:grpSpPr>
+            <a:xfrm>
+              <a:off x="2184400" y="1384300"/>
+              <a:ext cx="2641600" cy="1295400"/>
+              <a:chOff x="2184400" y="1384300"/>
+              <a:chExt cx="2641600" cy="1295400"/>
+            </a:xfrm>
+          </p:grpSpPr>
+          <p:sp>
+            <p:nvSpPr>
+              <p:cNvPr id="15" name="Rectangle 14"/>
+              <p:cNvSpPr/>
+              <p:nvPr/>
+            </p:nvSpPr>
+            <p:spPr>
+              <a:xfrm>
+                <a:off x="2184400" y="1384300"/>
+                <a:ext cx="2641600" cy="1295400"/>
+              </a:xfrm>
+              <a:prstGeom prst="rect">
+                <a:avLst/>
+              </a:prstGeom>
+              <a:ln w="6350" cmpd="sng"/>
+            </p:spPr>
+            <p:style>
+              <a:lnRef idx="2">
+                <a:schemeClr val="accent4"/>
+              </a:lnRef>
+              <a:fillRef idx="1">
+                <a:schemeClr val="lt1"/>
+              </a:fillRef>
+              <a:effectRef idx="0">
+                <a:schemeClr val="accent4"/>
+              </a:effectRef>
+              <a:fontRef idx="minor">
+                <a:schemeClr val="dk1"/>
+              </a:fontRef>
+            </p:style>
+            <p:txBody>
+              <a:bodyPr rtlCol="0" anchor="ctr"/>
+              <a:lstStyle/>
+              <a:p>
+                <a:pPr algn="ctr"/>
+                <a:endParaRPr lang="en-US"/>
+              </a:p>
+            </p:txBody>
+          </p:sp>
+          <p:cxnSp>
+            <p:nvCxnSpPr>
+              <p:cNvPr id="16" name="Straight Connector 15"/>
+              <p:cNvCxnSpPr/>
+              <p:nvPr/>
+            </p:nvCxnSpPr>
+            <p:spPr>
+              <a:xfrm>
+                <a:off x="2184400" y="1703208"/>
+                <a:ext cx="2641600" cy="0"/>
+              </a:xfrm>
+              <a:prstGeom prst="line">
+                <a:avLst/>
+              </a:prstGeom>
+              <a:ln w="6350" cmpd="sng"/>
+            </p:spPr>
+            <p:style>
+              <a:lnRef idx="2">
+                <a:schemeClr val="accent4"/>
+              </a:lnRef>
+              <a:fillRef idx="0">
+                <a:schemeClr val="accent4"/>
+              </a:fillRef>
+              <a:effectRef idx="1">
+                <a:schemeClr val="accent4"/>
+              </a:effectRef>
+              <a:fontRef idx="minor">
+                <a:schemeClr val="tx1"/>
+              </a:fontRef>
+            </p:style>
+          </p:cxnSp>
+        </p:grpSp>
+        <p:sp>
+          <p:nvSpPr>
+            <p:cNvPr id="13" name="Title 1"/>
+            <p:cNvSpPr txBox="1">
+              <a:spLocks/>
+            </p:cNvSpPr>
+            <p:nvPr/>
+          </p:nvSpPr>
+          <p:spPr bwMode="auto">
+            <a:xfrm>
+              <a:off x="2483644" y="1419226"/>
+              <a:ext cx="1999455" cy="226904"/>
+            </a:xfrm>
+            <a:prstGeom prst="rect">
+              <a:avLst/>
+            </a:prstGeom>
+            <a:ln>
+              <a:headEnd/>
+              <a:tailEnd/>
+            </a:ln>
+            <a:extLst>
+              <a:ext uri="{FAA26D3D-D897-4be2-8F04-BA451C77F1D7}">
+                <ma14:placeholderFlag xmlns:ma14="http://schemas.microsoft.com/office/mac/drawingml/2011/main" val="1"/>
+              </a:ext>
+            </a:extLst>
+          </p:spPr>
+          <p:style>
+            <a:lnRef idx="2">
+              <a:schemeClr val="accent1"/>
+            </a:lnRef>
+            <a:fillRef idx="1">
+              <a:schemeClr val="lt1"/>
+            </a:fillRef>
+            <a:effectRef idx="0">
+              <a:schemeClr val="accent1"/>
+            </a:effectRef>
+            <a:fontRef idx="minor">
+              <a:schemeClr val="dk1"/>
+            </a:fontRef>
+          </p:style>
+          <p:txBody>
+            <a:bodyPr vert="horz" wrap="square" lIns="91440" tIns="45720" rIns="91440" bIns="45720" numCol="1" anchor="ctr" anchorCtr="0" compatLnSpc="1">
+              <a:prstTxWarp prst="textNoShape">
+                <a:avLst/>
+              </a:prstTxWarp>
+            </a:bodyPr>
+            <a:lstStyle>
+              <a:lvl1pPr algn="l" rtl="0" eaLnBrk="0" fontAlgn="base" hangingPunct="0">
+                <a:spcBef>
+                  <a:spcPct val="0"/>
+                </a:spcBef>
+                <a:spcAft>
+                  <a:spcPct val="0"/>
+                </a:spcAft>
+                <a:defRPr sz="2400" b="1">
+                  <a:solidFill>
+                    <a:srgbClr val="004080"/>
+                  </a:solidFill>
+                  <a:latin typeface="+mj-lt"/>
+                  <a:ea typeface="ＭＳ Ｐゴシック" charset="0"/>
+                  <a:cs typeface="+mj-cs"/>
+                </a:defRPr>
+              </a:lvl1pPr>
+              <a:lvl2pPr algn="l" rtl="0" eaLnBrk="0" fontAlgn="base" hangingPunct="0">
+                <a:spcBef>
+                  <a:spcPct val="0"/>
+                </a:spcBef>
+                <a:spcAft>
+                  <a:spcPct val="0"/>
+                </a:spcAft>
+                <a:defRPr sz="2400" b="1">
+                  <a:solidFill>
+                    <a:srgbClr val="004080"/>
+                  </a:solidFill>
+                  <a:effectLst>
+                    <a:outerShdw blurRad="38100" dist="38100" dir="2700000" algn="tl">
+                      <a:srgbClr val="C0C0C0"/>
+                    </a:outerShdw>
+                  </a:effectLst>
+                  <a:latin typeface="Arial" charset="0"/>
+                  <a:ea typeface="ＭＳ Ｐゴシック" charset="0"/>
+                </a:defRPr>
+              </a:lvl2pPr>
+              <a:lvl3pPr algn="l" rtl="0" eaLnBrk="0" fontAlgn="base" hangingPunct="0">
+                <a:spcBef>
+                  <a:spcPct val="0"/>
+                </a:spcBef>
+                <a:spcAft>
+                  <a:spcPct val="0"/>
+                </a:spcAft>
+                <a:defRPr sz="2400" b="1">
+                  <a:solidFill>
+                    <a:srgbClr val="004080"/>
+                  </a:solidFill>
+                  <a:effectLst>
+                    <a:outerShdw blurRad="38100" dist="38100" dir="2700000" algn="tl">
+                      <a:srgbClr val="C0C0C0"/>
+                    </a:outerShdw>
+                  </a:effectLst>
+                  <a:latin typeface="Arial" charset="0"/>
+                  <a:ea typeface="ＭＳ Ｐゴシック" charset="0"/>
+                </a:defRPr>
+              </a:lvl3pPr>
+              <a:lvl4pPr algn="l" rtl="0" eaLnBrk="0" fontAlgn="base" hangingPunct="0">
+                <a:spcBef>
+                  <a:spcPct val="0"/>
+                </a:spcBef>
+                <a:spcAft>
+                  <a:spcPct val="0"/>
+                </a:spcAft>
+                <a:defRPr sz="2400" b="1">
+                  <a:solidFill>
+                    <a:srgbClr val="004080"/>
+                  </a:solidFill>
+                  <a:effectLst>
+                    <a:outerShdw blurRad="38100" dist="38100" dir="2700000" algn="tl">
+                      <a:srgbClr val="C0C0C0"/>
+                    </a:outerShdw>
+                  </a:effectLst>
+                  <a:latin typeface="Arial" charset="0"/>
+                  <a:ea typeface="ＭＳ Ｐゴシック" charset="0"/>
+                </a:defRPr>
+              </a:lvl4pPr>
+              <a:lvl5pPr algn="l" rtl="0" eaLnBrk="0" fontAlgn="base" hangingPunct="0">
+                <a:spcBef>
+                  <a:spcPct val="0"/>
+                </a:spcBef>
+                <a:spcAft>
+                  <a:spcPct val="0"/>
+                </a:spcAft>
+                <a:defRPr sz="2400" b="1">
+                  <a:solidFill>
+                    <a:srgbClr val="004080"/>
+                  </a:solidFill>
+                  <a:effectLst>
+                    <a:outerShdw blurRad="38100" dist="38100" dir="2700000" algn="tl">
+                      <a:srgbClr val="C0C0C0"/>
+                    </a:outerShdw>
+                  </a:effectLst>
+                  <a:latin typeface="Arial" charset="0"/>
+                  <a:ea typeface="ＭＳ Ｐゴシック" charset="0"/>
+                </a:defRPr>
+              </a:lvl5pPr>
+              <a:lvl6pPr marL="457200" algn="l" rtl="0" fontAlgn="base">
+                <a:spcBef>
+                  <a:spcPct val="0"/>
+                </a:spcBef>
+                <a:spcAft>
+                  <a:spcPct val="0"/>
+                </a:spcAft>
+                <a:defRPr sz="2400" b="1">
+                  <a:solidFill>
+                    <a:schemeClr val="bg1"/>
+                  </a:solidFill>
+                  <a:effectLst>
+                    <a:outerShdw blurRad="38100" dist="38100" dir="2700000" algn="tl">
+                      <a:srgbClr val="C0C0C0"/>
+                    </a:outerShdw>
+                  </a:effectLst>
+                  <a:latin typeface="Tahoma" pitchFamily="34" charset="0"/>
+                </a:defRPr>
+              </a:lvl6pPr>
+              <a:lvl7pPr marL="914400" algn="l" rtl="0" fontAlgn="base">
+                <a:spcBef>
+                  <a:spcPct val="0"/>
+                </a:spcBef>
+                <a:spcAft>
+                  <a:spcPct val="0"/>
+                </a:spcAft>
+                <a:defRPr sz="2400" b="1">
+                  <a:solidFill>
+                    <a:schemeClr val="bg1"/>
+                  </a:solidFill>
+                  <a:effectLst>
+                    <a:outerShdw blurRad="38100" dist="38100" dir="2700000" algn="tl">
+                      <a:srgbClr val="C0C0C0"/>
+                    </a:outerShdw>
+                  </a:effectLst>
+                  <a:latin typeface="Tahoma" pitchFamily="34" charset="0"/>
+                </a:defRPr>
+              </a:lvl7pPr>
+              <a:lvl8pPr marL="1371600" algn="l" rtl="0" fontAlgn="base">
+                <a:spcBef>
+                  <a:spcPct val="0"/>
+                </a:spcBef>
+                <a:spcAft>
+                  <a:spcPct val="0"/>
+                </a:spcAft>
+                <a:defRPr sz="2400" b="1">
+                  <a:solidFill>
+                    <a:schemeClr val="bg1"/>
+                  </a:solidFill>
+                  <a:effectLst>
+                    <a:outerShdw blurRad="38100" dist="38100" dir="2700000" algn="tl">
+                      <a:srgbClr val="C0C0C0"/>
+                    </a:outerShdw>
+                  </a:effectLst>
+                  <a:latin typeface="Tahoma" pitchFamily="34" charset="0"/>
+                </a:defRPr>
+              </a:lvl8pPr>
+              <a:lvl9pPr marL="1828800" algn="l" rtl="0" fontAlgn="base">
+                <a:spcBef>
+                  <a:spcPct val="0"/>
+                </a:spcBef>
+                <a:spcAft>
+                  <a:spcPct val="0"/>
+                </a:spcAft>
+                <a:defRPr sz="2400" b="1">
+                  <a:solidFill>
+                    <a:schemeClr val="bg1"/>
+                  </a:solidFill>
+                  <a:effectLst>
+                    <a:outerShdw blurRad="38100" dist="38100" dir="2700000" algn="tl">
+                      <a:srgbClr val="C0C0C0"/>
+                    </a:outerShdw>
+                  </a:effectLst>
+                  <a:latin typeface="Tahoma" pitchFamily="34" charset="0"/>
+                </a:defRPr>
+              </a:lvl9pPr>
+            </a:lstStyle>
+            <a:p>
+              <a:pPr algn="ctr"/>
+              <a:r>
+                <a:rPr lang="en-US" sz="1800" b="0" dirty="0" err="1"/>
+                <a:t>AccountRepository</a:t>
+              </a:r>
+              <a:endParaRPr lang="en-US" sz="1800" b="0" dirty="0">
+                <a:latin typeface="+mn-lt"/>
+              </a:endParaRPr>
+            </a:p>
+          </p:txBody>
+        </p:sp>
+        <p:sp>
+          <p:nvSpPr>
+            <p:cNvPr id="14" name="Title 1"/>
+            <p:cNvSpPr txBox="1">
+              <a:spLocks/>
+            </p:cNvSpPr>
+            <p:nvPr/>
+          </p:nvSpPr>
+          <p:spPr bwMode="auto">
+            <a:xfrm>
+              <a:off x="2255580" y="1862354"/>
+              <a:ext cx="2491305" cy="716362"/>
+            </a:xfrm>
+            <a:prstGeom prst="rect">
+              <a:avLst/>
+            </a:prstGeom>
+            <a:ln>
+              <a:headEnd/>
+              <a:tailEnd/>
+            </a:ln>
+            <a:extLst>
+              <a:ext uri="{FAA26D3D-D897-4be2-8F04-BA451C77F1D7}">
+                <ma14:placeholderFlag xmlns:ma14="http://schemas.microsoft.com/office/mac/drawingml/2011/main" val="1"/>
+              </a:ext>
+            </a:extLst>
+          </p:spPr>
+          <p:style>
+            <a:lnRef idx="2">
+              <a:schemeClr val="accent1"/>
+            </a:lnRef>
+            <a:fillRef idx="1">
+              <a:schemeClr val="lt1"/>
+            </a:fillRef>
+            <a:effectRef idx="0">
+              <a:schemeClr val="accent1"/>
+            </a:effectRef>
+            <a:fontRef idx="minor">
+              <a:schemeClr val="dk1"/>
+            </a:fontRef>
+          </p:style>
+          <p:txBody>
+            <a:bodyPr vert="horz" wrap="square" lIns="91440" tIns="45720" rIns="91440" bIns="45720" numCol="1" anchor="ctr" anchorCtr="0" compatLnSpc="1">
+              <a:prstTxWarp prst="textNoShape">
+                <a:avLst/>
+              </a:prstTxWarp>
+            </a:bodyPr>
+            <a:lstStyle>
+              <a:lvl1pPr algn="l" rtl="0" eaLnBrk="0" fontAlgn="base" hangingPunct="0">
+                <a:spcBef>
+                  <a:spcPct val="0"/>
+                </a:spcBef>
+                <a:spcAft>
+                  <a:spcPct val="0"/>
+                </a:spcAft>
+                <a:defRPr sz="2400" b="1">
+                  <a:solidFill>
+                    <a:srgbClr val="004080"/>
+                  </a:solidFill>
+                  <a:latin typeface="+mj-lt"/>
+                  <a:ea typeface="ＭＳ Ｐゴシック" charset="0"/>
+                  <a:cs typeface="+mj-cs"/>
+                </a:defRPr>
+              </a:lvl1pPr>
+              <a:lvl2pPr algn="l" rtl="0" eaLnBrk="0" fontAlgn="base" hangingPunct="0">
+                <a:spcBef>
+                  <a:spcPct val="0"/>
+                </a:spcBef>
+                <a:spcAft>
+                  <a:spcPct val="0"/>
+                </a:spcAft>
+                <a:defRPr sz="2400" b="1">
+                  <a:solidFill>
+                    <a:srgbClr val="004080"/>
+                  </a:solidFill>
+                  <a:effectLst>
+                    <a:outerShdw blurRad="38100" dist="38100" dir="2700000" algn="tl">
+                      <a:srgbClr val="C0C0C0"/>
+                    </a:outerShdw>
+                  </a:effectLst>
+                  <a:latin typeface="Arial" charset="0"/>
+                  <a:ea typeface="ＭＳ Ｐゴシック" charset="0"/>
+                </a:defRPr>
+              </a:lvl2pPr>
+              <a:lvl3pPr algn="l" rtl="0" eaLnBrk="0" fontAlgn="base" hangingPunct="0">
+                <a:spcBef>
+                  <a:spcPct val="0"/>
+                </a:spcBef>
+                <a:spcAft>
+                  <a:spcPct val="0"/>
+                </a:spcAft>
+                <a:defRPr sz="2400" b="1">
+                  <a:solidFill>
+                    <a:srgbClr val="004080"/>
+                  </a:solidFill>
+                  <a:effectLst>
+                    <a:outerShdw blurRad="38100" dist="38100" dir="2700000" algn="tl">
+                      <a:srgbClr val="C0C0C0"/>
+                    </a:outerShdw>
+                  </a:effectLst>
+                  <a:latin typeface="Arial" charset="0"/>
+                  <a:ea typeface="ＭＳ Ｐゴシック" charset="0"/>
+                </a:defRPr>
+              </a:lvl3pPr>
+              <a:lvl4pPr algn="l" rtl="0" eaLnBrk="0" fontAlgn="base" hangingPunct="0">
+                <a:spcBef>
+                  <a:spcPct val="0"/>
+                </a:spcBef>
+                <a:spcAft>
+                  <a:spcPct val="0"/>
+                </a:spcAft>
+                <a:defRPr sz="2400" b="1">
+                  <a:solidFill>
+                    <a:srgbClr val="004080"/>
+                  </a:solidFill>
+                  <a:effectLst>
+                    <a:outerShdw blurRad="38100" dist="38100" dir="2700000" algn="tl">
+                      <a:srgbClr val="C0C0C0"/>
+                    </a:outerShdw>
+                  </a:effectLst>
+                  <a:latin typeface="Arial" charset="0"/>
+                  <a:ea typeface="ＭＳ Ｐゴシック" charset="0"/>
+                </a:defRPr>
+              </a:lvl4pPr>
+              <a:lvl5pPr algn="l" rtl="0" eaLnBrk="0" fontAlgn="base" hangingPunct="0">
+                <a:spcBef>
+                  <a:spcPct val="0"/>
+                </a:spcBef>
+                <a:spcAft>
+                  <a:spcPct val="0"/>
+                </a:spcAft>
+                <a:defRPr sz="2400" b="1">
+                  <a:solidFill>
+                    <a:srgbClr val="004080"/>
+                  </a:solidFill>
+                  <a:effectLst>
+                    <a:outerShdw blurRad="38100" dist="38100" dir="2700000" algn="tl">
+                      <a:srgbClr val="C0C0C0"/>
+                    </a:outerShdw>
+                  </a:effectLst>
+                  <a:latin typeface="Arial" charset="0"/>
+                  <a:ea typeface="ＭＳ Ｐゴシック" charset="0"/>
+                </a:defRPr>
+              </a:lvl5pPr>
+              <a:lvl6pPr marL="457200" algn="l" rtl="0" fontAlgn="base">
+                <a:spcBef>
+                  <a:spcPct val="0"/>
+                </a:spcBef>
+                <a:spcAft>
+                  <a:spcPct val="0"/>
+                </a:spcAft>
+                <a:defRPr sz="2400" b="1">
+                  <a:solidFill>
+                    <a:schemeClr val="bg1"/>
+                  </a:solidFill>
+                  <a:effectLst>
+                    <a:outerShdw blurRad="38100" dist="38100" dir="2700000" algn="tl">
+                      <a:srgbClr val="C0C0C0"/>
+                    </a:outerShdw>
+                  </a:effectLst>
+                  <a:latin typeface="Tahoma" pitchFamily="34" charset="0"/>
+                </a:defRPr>
+              </a:lvl6pPr>
+              <a:lvl7pPr marL="914400" algn="l" rtl="0" fontAlgn="base">
+                <a:spcBef>
+                  <a:spcPct val="0"/>
+                </a:spcBef>
+                <a:spcAft>
+                  <a:spcPct val="0"/>
+                </a:spcAft>
+                <a:defRPr sz="2400" b="1">
+                  <a:solidFill>
+                    <a:schemeClr val="bg1"/>
+                  </a:solidFill>
+                  <a:effectLst>
+                    <a:outerShdw blurRad="38100" dist="38100" dir="2700000" algn="tl">
+                      <a:srgbClr val="C0C0C0"/>
+                    </a:outerShdw>
+                  </a:effectLst>
+                  <a:latin typeface="Tahoma" pitchFamily="34" charset="0"/>
+                </a:defRPr>
+              </a:lvl7pPr>
+              <a:lvl8pPr marL="1371600" algn="l" rtl="0" fontAlgn="base">
+                <a:spcBef>
+                  <a:spcPct val="0"/>
+                </a:spcBef>
+                <a:spcAft>
+                  <a:spcPct val="0"/>
+                </a:spcAft>
+                <a:defRPr sz="2400" b="1">
+                  <a:solidFill>
+                    <a:schemeClr val="bg1"/>
+                  </a:solidFill>
+                  <a:effectLst>
+                    <a:outerShdw blurRad="38100" dist="38100" dir="2700000" algn="tl">
+                      <a:srgbClr val="C0C0C0"/>
+                    </a:outerShdw>
+                  </a:effectLst>
+                  <a:latin typeface="Tahoma" pitchFamily="34" charset="0"/>
+                </a:defRPr>
+              </a:lvl8pPr>
+              <a:lvl9pPr marL="1828800" algn="l" rtl="0" fontAlgn="base">
+                <a:spcBef>
+                  <a:spcPct val="0"/>
+                </a:spcBef>
+                <a:spcAft>
+                  <a:spcPct val="0"/>
+                </a:spcAft>
+                <a:defRPr sz="2400" b="1">
+                  <a:solidFill>
+                    <a:schemeClr val="bg1"/>
+                  </a:solidFill>
+                  <a:effectLst>
+                    <a:outerShdw blurRad="38100" dist="38100" dir="2700000" algn="tl">
+                      <a:srgbClr val="C0C0C0"/>
+                    </a:outerShdw>
+                  </a:effectLst>
+                  <a:latin typeface="Tahoma" pitchFamily="34" charset="0"/>
+                </a:defRPr>
+              </a:lvl9pPr>
+            </a:lstStyle>
+            <a:p>
+              <a:r>
+                <a:rPr lang="da-DK" sz="1800" b="0" dirty="0" err="1"/>
+                <a:t>findById</a:t>
+              </a:r>
+              <a:r>
+                <a:rPr lang="cs-CZ" sz="1800" b="0" dirty="0" smtClean="0"/>
+                <a:t>(</a:t>
+              </a:r>
+              <a:r>
+                <a:rPr lang="it-IT" sz="1800" b="0" dirty="0" err="1" smtClean="0"/>
+                <a:t>String</a:t>
+              </a:r>
+              <a:r>
+                <a:rPr lang="it-IT" sz="1800" b="0" dirty="0" smtClean="0"/>
+                <a:t>):Account</a:t>
+              </a:r>
+              <a:endParaRPr lang="cs-CZ" sz="1800" b="0" dirty="0" smtClean="0"/>
+            </a:p>
+            <a:p>
+              <a:r>
+                <a:rPr lang="en-US" sz="1800" b="0" dirty="0" smtClean="0">
+                  <a:latin typeface="+mn-lt"/>
+                </a:rPr>
+                <a:t>update(Account) a</a:t>
+              </a:r>
+              <a:r>
+                <a:rPr lang="nb-NO" sz="1800" b="0" dirty="0" err="1" smtClean="0">
+                  <a:latin typeface="+mn-lt"/>
+                </a:rPr>
+                <a:t>dd</a:t>
+              </a:r>
+              <a:r>
+                <a:rPr lang="nb-NO" sz="1800" b="0" dirty="0" smtClean="0">
+                  <a:latin typeface="+mn-lt"/>
+                </a:rPr>
+                <a:t>(</a:t>
+              </a:r>
+              <a:r>
+                <a:rPr lang="nb-NO" sz="1800" b="0" dirty="0" err="1" smtClean="0">
+                  <a:latin typeface="+mn-lt"/>
+                </a:rPr>
+                <a:t>Account</a:t>
+              </a:r>
+              <a:r>
+                <a:rPr lang="nb-NO" sz="1800" b="0" dirty="0" smtClean="0">
+                  <a:latin typeface="+mn-lt"/>
+                </a:rPr>
+                <a:t>) </a:t>
+              </a:r>
+            </a:p>
+            <a:p>
+              <a:r>
+                <a:rPr lang="da-DK" sz="1800" b="0" dirty="0" err="1" smtClean="0">
+                  <a:latin typeface="+mn-lt"/>
+                </a:rPr>
+                <a:t>findAll</a:t>
+              </a:r>
+              <a:r>
+                <a:rPr lang="da-DK" sz="1800" b="0" dirty="0" smtClean="0">
+                  <a:latin typeface="+mn-lt"/>
+                </a:rPr>
+                <a:t>():Set&lt;</a:t>
+              </a:r>
+              <a:r>
+                <a:rPr lang="da-DK" sz="1800" b="0" dirty="0" err="1" smtClean="0">
+                  <a:latin typeface="+mn-lt"/>
+                </a:rPr>
+                <a:t>Account</a:t>
+              </a:r>
+              <a:r>
+                <a:rPr lang="da-DK" sz="1800" b="0" dirty="0" smtClean="0">
+                  <a:latin typeface="+mn-lt"/>
+                </a:rPr>
+                <a:t>&gt;</a:t>
+              </a:r>
+              <a:endParaRPr lang="en-US" sz="1800" b="0" dirty="0" smtClean="0">
+                <a:latin typeface="+mn-lt"/>
+              </a:endParaRPr>
+            </a:p>
+          </p:txBody>
+        </p:sp>
+      </p:grpSp>
+      <p:cxnSp>
+        <p:nvCxnSpPr>
+          <p:cNvPr id="17" name="Straight Arrow Connector 16"/>
+          <p:cNvCxnSpPr/>
+          <p:nvPr/>
+        </p:nvCxnSpPr>
+        <p:spPr>
+          <a:xfrm>
+            <a:off x="2085048" y="3400703"/>
+            <a:ext cx="0" cy="984250"/>
+          </a:xfrm>
+          <a:prstGeom prst="straightConnector1">
+            <a:avLst/>
+          </a:prstGeom>
+          <a:ln>
+            <a:tailEnd type="arrow"/>
+          </a:ln>
+        </p:spPr>
+        <p:style>
+          <a:lnRef idx="2">
+            <a:schemeClr val="accent4"/>
+          </a:lnRef>
+          <a:fillRef idx="0">
+            <a:schemeClr val="accent4"/>
+          </a:fillRef>
+          <a:effectRef idx="1">
+            <a:schemeClr val="accent4"/>
+          </a:effectRef>
+          <a:fontRef idx="minor">
+            <a:schemeClr val="tx1"/>
+          </a:fontRef>
+        </p:style>
+      </p:cxnSp>
+      <p:sp>
+        <p:nvSpPr>
+          <p:cNvPr id="18" name="Rectangle 17"/>
+          <p:cNvSpPr/>
+          <p:nvPr/>
+        </p:nvSpPr>
+        <p:spPr>
+          <a:xfrm>
+            <a:off x="2243570" y="3612219"/>
+            <a:ext cx="966931" cy="369332"/>
+          </a:xfrm>
+          <a:prstGeom prst="rect">
+            <a:avLst/>
+          </a:prstGeom>
+        </p:spPr>
+        <p:txBody>
+          <a:bodyPr wrap="none">
+            <a:spAutoFit/>
+          </a:bodyPr>
+          <a:lstStyle/>
+          <a:p>
+            <a:r>
+              <a:rPr lang="en-US" dirty="0" smtClean="0">
+                <a:solidFill>
+                  <a:schemeClr val="accent4"/>
+                </a:solidFill>
+                <a:latin typeface="+mj-lt"/>
+              </a:rPr>
+              <a:t>account</a:t>
+            </a:r>
+            <a:endParaRPr lang="en-US" dirty="0">
+              <a:solidFill>
+                <a:schemeClr val="accent4"/>
+              </a:solidFill>
+              <a:latin typeface="+mj-lt"/>
+            </a:endParaRPr>
+          </a:p>
+        </p:txBody>
+      </p:sp>
+      <p:sp>
+        <p:nvSpPr>
+          <p:cNvPr id="20" name="Rectangle 19"/>
+          <p:cNvSpPr/>
+          <p:nvPr/>
+        </p:nvSpPr>
+        <p:spPr>
+          <a:xfrm>
+            <a:off x="1626293" y="3981551"/>
+            <a:ext cx="280461" cy="369332"/>
+          </a:xfrm>
+          <a:prstGeom prst="rect">
+            <a:avLst/>
+          </a:prstGeom>
+        </p:spPr>
+        <p:txBody>
+          <a:bodyPr wrap="none">
+            <a:spAutoFit/>
+          </a:bodyPr>
+          <a:lstStyle/>
+          <a:p>
+            <a:r>
+              <a:rPr lang="en-US" dirty="0" smtClean="0">
+                <a:solidFill>
+                  <a:schemeClr val="accent4"/>
+                </a:solidFill>
+                <a:latin typeface="+mj-lt"/>
+              </a:rPr>
+              <a:t>*</a:t>
+            </a:r>
+            <a:endParaRPr lang="en-US" dirty="0">
+              <a:solidFill>
+                <a:schemeClr val="accent4"/>
+              </a:solidFill>
+              <a:latin typeface="+mj-lt"/>
+            </a:endParaRPr>
+          </a:p>
+        </p:txBody>
+      </p:sp>
+      <p:grpSp>
+        <p:nvGrpSpPr>
+          <p:cNvPr id="26" name="Group 25"/>
+          <p:cNvGrpSpPr/>
+          <p:nvPr/>
+        </p:nvGrpSpPr>
+        <p:grpSpPr>
+          <a:xfrm>
+            <a:off x="652975" y="4400164"/>
+            <a:ext cx="2865994" cy="1713142"/>
+            <a:chOff x="2184400" y="1384299"/>
+            <a:chExt cx="2641600" cy="1713142"/>
+          </a:xfrm>
+        </p:grpSpPr>
+        <p:grpSp>
+          <p:nvGrpSpPr>
+            <p:cNvPr id="27" name="Group 26"/>
+            <p:cNvGrpSpPr/>
+            <p:nvPr/>
+          </p:nvGrpSpPr>
+          <p:grpSpPr>
+            <a:xfrm>
+              <a:off x="2184400" y="1384299"/>
+              <a:ext cx="2641600" cy="1713142"/>
+              <a:chOff x="2184400" y="1384299"/>
+              <a:chExt cx="2641600" cy="1713142"/>
+            </a:xfrm>
+          </p:grpSpPr>
+          <p:sp>
+            <p:nvSpPr>
+              <p:cNvPr id="30" name="Rectangle 29"/>
+              <p:cNvSpPr/>
+              <p:nvPr/>
+            </p:nvSpPr>
+            <p:spPr>
+              <a:xfrm>
+                <a:off x="2184400" y="1384299"/>
+                <a:ext cx="2641600" cy="1713142"/>
+              </a:xfrm>
+              <a:prstGeom prst="rect">
+                <a:avLst/>
+              </a:prstGeom>
+              <a:ln w="6350" cmpd="sng"/>
+            </p:spPr>
+            <p:style>
+              <a:lnRef idx="2">
+                <a:schemeClr val="accent4"/>
+              </a:lnRef>
+              <a:fillRef idx="1">
+                <a:schemeClr val="lt1"/>
+              </a:fillRef>
+              <a:effectRef idx="0">
+                <a:schemeClr val="accent4"/>
+              </a:effectRef>
+              <a:fontRef idx="minor">
+                <a:schemeClr val="dk1"/>
+              </a:fontRef>
+            </p:style>
+            <p:txBody>
+              <a:bodyPr rtlCol="0" anchor="ctr"/>
+              <a:lstStyle/>
+              <a:p>
+                <a:pPr algn="ctr"/>
+                <a:endParaRPr lang="en-US"/>
+              </a:p>
+            </p:txBody>
+          </p:sp>
+          <p:cxnSp>
+            <p:nvCxnSpPr>
+              <p:cNvPr id="31" name="Straight Connector 30"/>
+              <p:cNvCxnSpPr/>
+              <p:nvPr/>
+            </p:nvCxnSpPr>
+            <p:spPr>
+              <a:xfrm>
+                <a:off x="2184400" y="1790700"/>
+                <a:ext cx="2641600" cy="0"/>
+              </a:xfrm>
+              <a:prstGeom prst="line">
+                <a:avLst/>
+              </a:prstGeom>
+              <a:ln w="6350" cmpd="sng"/>
+            </p:spPr>
+            <p:style>
+              <a:lnRef idx="2">
+                <a:schemeClr val="accent4"/>
+              </a:lnRef>
+              <a:fillRef idx="0">
+                <a:schemeClr val="accent4"/>
+              </a:fillRef>
+              <a:effectRef idx="1">
+                <a:schemeClr val="accent4"/>
+              </a:effectRef>
+              <a:fontRef idx="minor">
+                <a:schemeClr val="tx1"/>
+              </a:fontRef>
+            </p:style>
+          </p:cxnSp>
+        </p:grpSp>
+        <p:sp>
+          <p:nvSpPr>
+            <p:cNvPr id="28" name="Title 1"/>
+            <p:cNvSpPr txBox="1">
+              <a:spLocks/>
+            </p:cNvSpPr>
+            <p:nvPr/>
+          </p:nvSpPr>
+          <p:spPr bwMode="auto">
+            <a:xfrm>
+              <a:off x="2483644" y="1419226"/>
+              <a:ext cx="1999455" cy="312737"/>
+            </a:xfrm>
+            <a:prstGeom prst="rect">
+              <a:avLst/>
+            </a:prstGeom>
+            <a:ln>
+              <a:headEnd/>
+              <a:tailEnd/>
+            </a:ln>
+            <a:extLst>
+              <a:ext uri="{FAA26D3D-D897-4be2-8F04-BA451C77F1D7}">
+                <ma14:placeholderFlag xmlns:ma14="http://schemas.microsoft.com/office/mac/drawingml/2011/main" val="1"/>
+              </a:ext>
+            </a:extLst>
+          </p:spPr>
+          <p:style>
+            <a:lnRef idx="2">
+              <a:schemeClr val="accent1"/>
+            </a:lnRef>
+            <a:fillRef idx="1">
+              <a:schemeClr val="lt1"/>
+            </a:fillRef>
+            <a:effectRef idx="0">
+              <a:schemeClr val="accent1"/>
+            </a:effectRef>
+            <a:fontRef idx="minor">
+              <a:schemeClr val="dk1"/>
+            </a:fontRef>
+          </p:style>
+          <p:txBody>
+            <a:bodyPr vert="horz" wrap="square" lIns="91440" tIns="45720" rIns="91440" bIns="45720" numCol="1" anchor="ctr" anchorCtr="0" compatLnSpc="1">
+              <a:prstTxWarp prst="textNoShape">
+                <a:avLst/>
+              </a:prstTxWarp>
+            </a:bodyPr>
+            <a:lstStyle>
+              <a:lvl1pPr algn="l" rtl="0" eaLnBrk="0" fontAlgn="base" hangingPunct="0">
+                <a:spcBef>
+                  <a:spcPct val="0"/>
+                </a:spcBef>
+                <a:spcAft>
+                  <a:spcPct val="0"/>
+                </a:spcAft>
+                <a:defRPr sz="2400" b="1">
+                  <a:solidFill>
+                    <a:srgbClr val="004080"/>
+                  </a:solidFill>
+                  <a:latin typeface="+mj-lt"/>
+                  <a:ea typeface="ＭＳ Ｐゴシック" charset="0"/>
+                  <a:cs typeface="+mj-cs"/>
+                </a:defRPr>
+              </a:lvl1pPr>
+              <a:lvl2pPr algn="l" rtl="0" eaLnBrk="0" fontAlgn="base" hangingPunct="0">
+                <a:spcBef>
+                  <a:spcPct val="0"/>
+                </a:spcBef>
+                <a:spcAft>
+                  <a:spcPct val="0"/>
+                </a:spcAft>
+                <a:defRPr sz="2400" b="1">
+                  <a:solidFill>
+                    <a:srgbClr val="004080"/>
+                  </a:solidFill>
+                  <a:effectLst>
+                    <a:outerShdw blurRad="38100" dist="38100" dir="2700000" algn="tl">
+                      <a:srgbClr val="C0C0C0"/>
+                    </a:outerShdw>
+                  </a:effectLst>
+                  <a:latin typeface="Arial" charset="0"/>
+                  <a:ea typeface="ＭＳ Ｐゴシック" charset="0"/>
+                </a:defRPr>
+              </a:lvl2pPr>
+              <a:lvl3pPr algn="l" rtl="0" eaLnBrk="0" fontAlgn="base" hangingPunct="0">
+                <a:spcBef>
+                  <a:spcPct val="0"/>
+                </a:spcBef>
+                <a:spcAft>
+                  <a:spcPct val="0"/>
+                </a:spcAft>
+                <a:defRPr sz="2400" b="1">
+                  <a:solidFill>
+                    <a:srgbClr val="004080"/>
+                  </a:solidFill>
+                  <a:effectLst>
+                    <a:outerShdw blurRad="38100" dist="38100" dir="2700000" algn="tl">
+                      <a:srgbClr val="C0C0C0"/>
+                    </a:outerShdw>
+                  </a:effectLst>
+                  <a:latin typeface="Arial" charset="0"/>
+                  <a:ea typeface="ＭＳ Ｐゴシック" charset="0"/>
+                </a:defRPr>
+              </a:lvl3pPr>
+              <a:lvl4pPr algn="l" rtl="0" eaLnBrk="0" fontAlgn="base" hangingPunct="0">
+                <a:spcBef>
+                  <a:spcPct val="0"/>
+                </a:spcBef>
+                <a:spcAft>
+                  <a:spcPct val="0"/>
+                </a:spcAft>
+                <a:defRPr sz="2400" b="1">
+                  <a:solidFill>
+                    <a:srgbClr val="004080"/>
+                  </a:solidFill>
+                  <a:effectLst>
+                    <a:outerShdw blurRad="38100" dist="38100" dir="2700000" algn="tl">
+                      <a:srgbClr val="C0C0C0"/>
+                    </a:outerShdw>
+                  </a:effectLst>
+                  <a:latin typeface="Arial" charset="0"/>
+                  <a:ea typeface="ＭＳ Ｐゴシック" charset="0"/>
+                </a:defRPr>
+              </a:lvl4pPr>
+              <a:lvl5pPr algn="l" rtl="0" eaLnBrk="0" fontAlgn="base" hangingPunct="0">
+                <a:spcBef>
+                  <a:spcPct val="0"/>
+                </a:spcBef>
+                <a:spcAft>
+                  <a:spcPct val="0"/>
+                </a:spcAft>
+                <a:defRPr sz="2400" b="1">
+                  <a:solidFill>
+                    <a:srgbClr val="004080"/>
+                  </a:solidFill>
+                  <a:effectLst>
+                    <a:outerShdw blurRad="38100" dist="38100" dir="2700000" algn="tl">
+                      <a:srgbClr val="C0C0C0"/>
+                    </a:outerShdw>
+                  </a:effectLst>
+                  <a:latin typeface="Arial" charset="0"/>
+                  <a:ea typeface="ＭＳ Ｐゴシック" charset="0"/>
+                </a:defRPr>
+              </a:lvl5pPr>
+              <a:lvl6pPr marL="457200" algn="l" rtl="0" fontAlgn="base">
+                <a:spcBef>
+                  <a:spcPct val="0"/>
+                </a:spcBef>
+                <a:spcAft>
+                  <a:spcPct val="0"/>
+                </a:spcAft>
+                <a:defRPr sz="2400" b="1">
+                  <a:solidFill>
+                    <a:schemeClr val="bg1"/>
+                  </a:solidFill>
+                  <a:effectLst>
+                    <a:outerShdw blurRad="38100" dist="38100" dir="2700000" algn="tl">
+                      <a:srgbClr val="C0C0C0"/>
+                    </a:outerShdw>
+                  </a:effectLst>
+                  <a:latin typeface="Tahoma" pitchFamily="34" charset="0"/>
+                </a:defRPr>
+              </a:lvl6pPr>
+              <a:lvl7pPr marL="914400" algn="l" rtl="0" fontAlgn="base">
+                <a:spcBef>
+                  <a:spcPct val="0"/>
+                </a:spcBef>
+                <a:spcAft>
+                  <a:spcPct val="0"/>
+                </a:spcAft>
+                <a:defRPr sz="2400" b="1">
+                  <a:solidFill>
+                    <a:schemeClr val="bg1"/>
+                  </a:solidFill>
+                  <a:effectLst>
+                    <a:outerShdw blurRad="38100" dist="38100" dir="2700000" algn="tl">
+                      <a:srgbClr val="C0C0C0"/>
+                    </a:outerShdw>
+                  </a:effectLst>
+                  <a:latin typeface="Tahoma" pitchFamily="34" charset="0"/>
+                </a:defRPr>
+              </a:lvl7pPr>
+              <a:lvl8pPr marL="1371600" algn="l" rtl="0" fontAlgn="base">
+                <a:spcBef>
+                  <a:spcPct val="0"/>
+                </a:spcBef>
+                <a:spcAft>
+                  <a:spcPct val="0"/>
+                </a:spcAft>
+                <a:defRPr sz="2400" b="1">
+                  <a:solidFill>
+                    <a:schemeClr val="bg1"/>
+                  </a:solidFill>
+                  <a:effectLst>
+                    <a:outerShdw blurRad="38100" dist="38100" dir="2700000" algn="tl">
+                      <a:srgbClr val="C0C0C0"/>
+                    </a:outerShdw>
+                  </a:effectLst>
+                  <a:latin typeface="Tahoma" pitchFamily="34" charset="0"/>
+                </a:defRPr>
+              </a:lvl8pPr>
+              <a:lvl9pPr marL="1828800" algn="l" rtl="0" fontAlgn="base">
+                <a:spcBef>
+                  <a:spcPct val="0"/>
+                </a:spcBef>
+                <a:spcAft>
+                  <a:spcPct val="0"/>
+                </a:spcAft>
+                <a:defRPr sz="2400" b="1">
+                  <a:solidFill>
+                    <a:schemeClr val="bg1"/>
+                  </a:solidFill>
+                  <a:effectLst>
+                    <a:outerShdw blurRad="38100" dist="38100" dir="2700000" algn="tl">
+                      <a:srgbClr val="C0C0C0"/>
+                    </a:outerShdw>
+                  </a:effectLst>
+                  <a:latin typeface="Tahoma" pitchFamily="34" charset="0"/>
+                </a:defRPr>
+              </a:lvl9pPr>
+            </a:lstStyle>
+            <a:p>
+              <a:pPr algn="ctr"/>
+              <a:r>
+                <a:rPr lang="da-DK" sz="1800" b="0" dirty="0" err="1" smtClean="0"/>
+                <a:t>Account</a:t>
+              </a:r>
+              <a:endParaRPr lang="en-US" sz="1800" b="0" dirty="0">
+                <a:latin typeface="+mn-lt"/>
+              </a:endParaRPr>
+            </a:p>
+          </p:txBody>
+        </p:sp>
+        <p:sp>
+          <p:nvSpPr>
+            <p:cNvPr id="29" name="Title 1"/>
+            <p:cNvSpPr txBox="1">
+              <a:spLocks/>
+            </p:cNvSpPr>
+            <p:nvPr/>
+          </p:nvSpPr>
+          <p:spPr bwMode="auto">
+            <a:xfrm>
+              <a:off x="2295922" y="2009632"/>
+              <a:ext cx="2113755" cy="852715"/>
+            </a:xfrm>
+            <a:prstGeom prst="rect">
+              <a:avLst/>
+            </a:prstGeom>
+            <a:ln>
+              <a:headEnd/>
+              <a:tailEnd/>
+            </a:ln>
+            <a:extLst>
+              <a:ext uri="{FAA26D3D-D897-4be2-8F04-BA451C77F1D7}">
+                <ma14:placeholderFlag xmlns:ma14="http://schemas.microsoft.com/office/mac/drawingml/2011/main" val="1"/>
+              </a:ext>
+            </a:extLst>
+          </p:spPr>
+          <p:style>
+            <a:lnRef idx="2">
+              <a:schemeClr val="accent1"/>
+            </a:lnRef>
+            <a:fillRef idx="1">
+              <a:schemeClr val="lt1"/>
+            </a:fillRef>
+            <a:effectRef idx="0">
+              <a:schemeClr val="accent1"/>
+            </a:effectRef>
+            <a:fontRef idx="minor">
+              <a:schemeClr val="dk1"/>
+            </a:fontRef>
+          </p:style>
+          <p:txBody>
+            <a:bodyPr vert="horz" wrap="square" lIns="91440" tIns="45720" rIns="91440" bIns="45720" numCol="1" anchor="ctr" anchorCtr="0" compatLnSpc="1">
+              <a:prstTxWarp prst="textNoShape">
+                <a:avLst/>
+              </a:prstTxWarp>
+            </a:bodyPr>
+            <a:lstStyle>
+              <a:lvl1pPr algn="l" rtl="0" eaLnBrk="0" fontAlgn="base" hangingPunct="0">
+                <a:spcBef>
+                  <a:spcPct val="0"/>
+                </a:spcBef>
+                <a:spcAft>
+                  <a:spcPct val="0"/>
+                </a:spcAft>
+                <a:defRPr sz="2400" b="1">
+                  <a:solidFill>
+                    <a:srgbClr val="004080"/>
+                  </a:solidFill>
+                  <a:latin typeface="+mj-lt"/>
+                  <a:ea typeface="ＭＳ Ｐゴシック" charset="0"/>
+                  <a:cs typeface="+mj-cs"/>
+                </a:defRPr>
+              </a:lvl1pPr>
+              <a:lvl2pPr algn="l" rtl="0" eaLnBrk="0" fontAlgn="base" hangingPunct="0">
+                <a:spcBef>
+                  <a:spcPct val="0"/>
+                </a:spcBef>
+                <a:spcAft>
+                  <a:spcPct val="0"/>
+                </a:spcAft>
+                <a:defRPr sz="2400" b="1">
+                  <a:solidFill>
+                    <a:srgbClr val="004080"/>
+                  </a:solidFill>
+                  <a:effectLst>
+                    <a:outerShdw blurRad="38100" dist="38100" dir="2700000" algn="tl">
+                      <a:srgbClr val="C0C0C0"/>
+                    </a:outerShdw>
+                  </a:effectLst>
+                  <a:latin typeface="Arial" charset="0"/>
+                  <a:ea typeface="ＭＳ Ｐゴシック" charset="0"/>
+                </a:defRPr>
+              </a:lvl2pPr>
+              <a:lvl3pPr algn="l" rtl="0" eaLnBrk="0" fontAlgn="base" hangingPunct="0">
+                <a:spcBef>
+                  <a:spcPct val="0"/>
+                </a:spcBef>
+                <a:spcAft>
+                  <a:spcPct val="0"/>
+                </a:spcAft>
+                <a:defRPr sz="2400" b="1">
+                  <a:solidFill>
+                    <a:srgbClr val="004080"/>
+                  </a:solidFill>
+                  <a:effectLst>
+                    <a:outerShdw blurRad="38100" dist="38100" dir="2700000" algn="tl">
+                      <a:srgbClr val="C0C0C0"/>
+                    </a:outerShdw>
+                  </a:effectLst>
+                  <a:latin typeface="Arial" charset="0"/>
+                  <a:ea typeface="ＭＳ Ｐゴシック" charset="0"/>
+                </a:defRPr>
+              </a:lvl3pPr>
+              <a:lvl4pPr algn="l" rtl="0" eaLnBrk="0" fontAlgn="base" hangingPunct="0">
+                <a:spcBef>
+                  <a:spcPct val="0"/>
+                </a:spcBef>
+                <a:spcAft>
+                  <a:spcPct val="0"/>
+                </a:spcAft>
+                <a:defRPr sz="2400" b="1">
+                  <a:solidFill>
+                    <a:srgbClr val="004080"/>
+                  </a:solidFill>
+                  <a:effectLst>
+                    <a:outerShdw blurRad="38100" dist="38100" dir="2700000" algn="tl">
+                      <a:srgbClr val="C0C0C0"/>
+                    </a:outerShdw>
+                  </a:effectLst>
+                  <a:latin typeface="Arial" charset="0"/>
+                  <a:ea typeface="ＭＳ Ｐゴシック" charset="0"/>
+                </a:defRPr>
+              </a:lvl4pPr>
+              <a:lvl5pPr algn="l" rtl="0" eaLnBrk="0" fontAlgn="base" hangingPunct="0">
+                <a:spcBef>
+                  <a:spcPct val="0"/>
+                </a:spcBef>
+                <a:spcAft>
+                  <a:spcPct val="0"/>
+                </a:spcAft>
+                <a:defRPr sz="2400" b="1">
+                  <a:solidFill>
+                    <a:srgbClr val="004080"/>
+                  </a:solidFill>
+                  <a:effectLst>
+                    <a:outerShdw blurRad="38100" dist="38100" dir="2700000" algn="tl">
+                      <a:srgbClr val="C0C0C0"/>
+                    </a:outerShdw>
+                  </a:effectLst>
+                  <a:latin typeface="Arial" charset="0"/>
+                  <a:ea typeface="ＭＳ Ｐゴシック" charset="0"/>
+                </a:defRPr>
+              </a:lvl5pPr>
+              <a:lvl6pPr marL="457200" algn="l" rtl="0" fontAlgn="base">
+                <a:spcBef>
+                  <a:spcPct val="0"/>
+                </a:spcBef>
+                <a:spcAft>
+                  <a:spcPct val="0"/>
+                </a:spcAft>
+                <a:defRPr sz="2400" b="1">
+                  <a:solidFill>
+                    <a:schemeClr val="bg1"/>
+                  </a:solidFill>
+                  <a:effectLst>
+                    <a:outerShdw blurRad="38100" dist="38100" dir="2700000" algn="tl">
+                      <a:srgbClr val="C0C0C0"/>
+                    </a:outerShdw>
+                  </a:effectLst>
+                  <a:latin typeface="Tahoma" pitchFamily="34" charset="0"/>
+                </a:defRPr>
+              </a:lvl6pPr>
+              <a:lvl7pPr marL="914400" algn="l" rtl="0" fontAlgn="base">
+                <a:spcBef>
+                  <a:spcPct val="0"/>
+                </a:spcBef>
+                <a:spcAft>
+                  <a:spcPct val="0"/>
+                </a:spcAft>
+                <a:defRPr sz="2400" b="1">
+                  <a:solidFill>
+                    <a:schemeClr val="bg1"/>
+                  </a:solidFill>
+                  <a:effectLst>
+                    <a:outerShdw blurRad="38100" dist="38100" dir="2700000" algn="tl">
+                      <a:srgbClr val="C0C0C0"/>
+                    </a:outerShdw>
+                  </a:effectLst>
+                  <a:latin typeface="Tahoma" pitchFamily="34" charset="0"/>
+                </a:defRPr>
+              </a:lvl7pPr>
+              <a:lvl8pPr marL="1371600" algn="l" rtl="0" fontAlgn="base">
+                <a:spcBef>
+                  <a:spcPct val="0"/>
+                </a:spcBef>
+                <a:spcAft>
+                  <a:spcPct val="0"/>
+                </a:spcAft>
+                <a:defRPr sz="2400" b="1">
+                  <a:solidFill>
+                    <a:schemeClr val="bg1"/>
+                  </a:solidFill>
+                  <a:effectLst>
+                    <a:outerShdw blurRad="38100" dist="38100" dir="2700000" algn="tl">
+                      <a:srgbClr val="C0C0C0"/>
+                    </a:outerShdw>
+                  </a:effectLst>
+                  <a:latin typeface="Tahoma" pitchFamily="34" charset="0"/>
+                </a:defRPr>
+              </a:lvl8pPr>
+              <a:lvl9pPr marL="1828800" algn="l" rtl="0" fontAlgn="base">
+                <a:spcBef>
+                  <a:spcPct val="0"/>
+                </a:spcBef>
+                <a:spcAft>
+                  <a:spcPct val="0"/>
+                </a:spcAft>
+                <a:defRPr sz="2400" b="1">
+                  <a:solidFill>
+                    <a:schemeClr val="bg1"/>
+                  </a:solidFill>
+                  <a:effectLst>
+                    <a:outerShdw blurRad="38100" dist="38100" dir="2700000" algn="tl">
+                      <a:srgbClr val="C0C0C0"/>
+                    </a:outerShdw>
+                  </a:effectLst>
+                  <a:latin typeface="Tahoma" pitchFamily="34" charset="0"/>
+                </a:defRPr>
+              </a:lvl9pPr>
+            </a:lstStyle>
+            <a:p>
+              <a:r>
+                <a:rPr lang="de-DE" sz="1800" b="0" dirty="0" err="1" smtClean="0"/>
+                <a:t>getId</a:t>
+              </a:r>
+              <a:r>
+                <a:rPr lang="de-DE" sz="1800" b="0" dirty="0" smtClean="0"/>
+                <a:t>():String</a:t>
+              </a:r>
+            </a:p>
+            <a:p>
+              <a:r>
+                <a:rPr lang="de-DE" sz="1800" b="0" dirty="0" err="1" smtClean="0"/>
+                <a:t>getBalance</a:t>
+              </a:r>
+              <a:r>
+                <a:rPr lang="de-DE" sz="1800" b="0" dirty="0" smtClean="0"/>
+                <a:t>():double</a:t>
+              </a:r>
+            </a:p>
+            <a:p>
+              <a:r>
+                <a:rPr lang="de-DE" sz="1800" b="0" dirty="0" err="1" smtClean="0"/>
+                <a:t>debit</a:t>
+              </a:r>
+              <a:r>
+                <a:rPr lang="de-DE" sz="1800" b="0" dirty="0" smtClean="0"/>
+                <a:t>(double) </a:t>
+              </a:r>
+              <a:r>
+                <a:rPr lang="de-DE" sz="1800" b="0" dirty="0" err="1" smtClean="0"/>
+                <a:t>credit</a:t>
+              </a:r>
+              <a:r>
+                <a:rPr lang="de-DE" sz="1800" b="0" dirty="0" smtClean="0"/>
+                <a:t>(double)</a:t>
+              </a:r>
+              <a:endParaRPr lang="de-DE" sz="1800" b="0" dirty="0"/>
+            </a:p>
+          </p:txBody>
+        </p:sp>
+      </p:grpSp>
+      <p:grpSp>
+        <p:nvGrpSpPr>
+          <p:cNvPr id="32" name="Group 31"/>
+          <p:cNvGrpSpPr/>
+          <p:nvPr/>
+        </p:nvGrpSpPr>
+        <p:grpSpPr>
+          <a:xfrm>
+            <a:off x="4866156" y="1524000"/>
+            <a:ext cx="3962399" cy="1295400"/>
+            <a:chOff x="2184400" y="1384300"/>
+            <a:chExt cx="2641600" cy="1295400"/>
+          </a:xfrm>
+        </p:grpSpPr>
+        <p:grpSp>
+          <p:nvGrpSpPr>
+            <p:cNvPr id="33" name="Group 32"/>
+            <p:cNvGrpSpPr/>
+            <p:nvPr/>
+          </p:nvGrpSpPr>
+          <p:grpSpPr>
+            <a:xfrm>
+              <a:off x="2184400" y="1384300"/>
+              <a:ext cx="2641600" cy="1295400"/>
+              <a:chOff x="2184400" y="1384300"/>
+              <a:chExt cx="2641600" cy="1295400"/>
+            </a:xfrm>
+          </p:grpSpPr>
+          <p:sp>
+            <p:nvSpPr>
+              <p:cNvPr id="36" name="Rectangle 35"/>
+              <p:cNvSpPr/>
+              <p:nvPr/>
+            </p:nvSpPr>
+            <p:spPr>
+              <a:xfrm>
+                <a:off x="2184400" y="1384300"/>
+                <a:ext cx="2641600" cy="1295400"/>
+              </a:xfrm>
+              <a:prstGeom prst="rect">
+                <a:avLst/>
+              </a:prstGeom>
+              <a:ln w="6350" cmpd="sng"/>
+            </p:spPr>
+            <p:style>
+              <a:lnRef idx="2">
+                <a:schemeClr val="accent4"/>
+              </a:lnRef>
+              <a:fillRef idx="1">
+                <a:schemeClr val="lt1"/>
+              </a:fillRef>
+              <a:effectRef idx="0">
+                <a:schemeClr val="accent4"/>
+              </a:effectRef>
+              <a:fontRef idx="minor">
+                <a:schemeClr val="dk1"/>
+              </a:fontRef>
+            </p:style>
+            <p:txBody>
+              <a:bodyPr rtlCol="0" anchor="ctr"/>
+              <a:lstStyle/>
+              <a:p>
+                <a:pPr algn="ctr"/>
+                <a:endParaRPr lang="en-US"/>
+              </a:p>
+            </p:txBody>
+          </p:sp>
+          <p:cxnSp>
+            <p:nvCxnSpPr>
+              <p:cNvPr id="37" name="Straight Connector 36"/>
+              <p:cNvCxnSpPr/>
+              <p:nvPr/>
+            </p:nvCxnSpPr>
+            <p:spPr>
+              <a:xfrm>
+                <a:off x="2184400" y="1790700"/>
+                <a:ext cx="2641600" cy="0"/>
+              </a:xfrm>
+              <a:prstGeom prst="line">
+                <a:avLst/>
+              </a:prstGeom>
+              <a:ln w="6350" cmpd="sng"/>
+            </p:spPr>
+            <p:style>
+              <a:lnRef idx="2">
+                <a:schemeClr val="accent4"/>
+              </a:lnRef>
+              <a:fillRef idx="0">
+                <a:schemeClr val="accent4"/>
+              </a:fillRef>
+              <a:effectRef idx="1">
+                <a:schemeClr val="accent4"/>
+              </a:effectRef>
+              <a:fontRef idx="minor">
+                <a:schemeClr val="tx1"/>
+              </a:fontRef>
+            </p:style>
+          </p:cxnSp>
+        </p:grpSp>
+        <p:sp>
+          <p:nvSpPr>
+            <p:cNvPr id="34" name="Title 1"/>
+            <p:cNvSpPr txBox="1">
+              <a:spLocks/>
+            </p:cNvSpPr>
+            <p:nvPr/>
+          </p:nvSpPr>
+          <p:spPr bwMode="auto">
+            <a:xfrm>
+              <a:off x="2483644" y="1419226"/>
+              <a:ext cx="1999455" cy="312737"/>
+            </a:xfrm>
+            <a:prstGeom prst="rect">
+              <a:avLst/>
+            </a:prstGeom>
+            <a:ln>
+              <a:headEnd/>
+              <a:tailEnd/>
+            </a:ln>
+            <a:extLst>
+              <a:ext uri="{FAA26D3D-D897-4be2-8F04-BA451C77F1D7}">
+                <ma14:placeholderFlag xmlns:ma14="http://schemas.microsoft.com/office/mac/drawingml/2011/main" val="1"/>
+              </a:ext>
+            </a:extLst>
+          </p:spPr>
+          <p:style>
+            <a:lnRef idx="2">
+              <a:schemeClr val="accent1"/>
+            </a:lnRef>
+            <a:fillRef idx="1">
+              <a:schemeClr val="lt1"/>
+            </a:fillRef>
+            <a:effectRef idx="0">
+              <a:schemeClr val="accent1"/>
+            </a:effectRef>
+            <a:fontRef idx="minor">
+              <a:schemeClr val="dk1"/>
+            </a:fontRef>
+          </p:style>
+          <p:txBody>
+            <a:bodyPr vert="horz" wrap="square" lIns="91440" tIns="45720" rIns="91440" bIns="45720" numCol="1" anchor="ctr" anchorCtr="0" compatLnSpc="1">
+              <a:prstTxWarp prst="textNoShape">
+                <a:avLst/>
+              </a:prstTxWarp>
+            </a:bodyPr>
+            <a:lstStyle>
+              <a:lvl1pPr algn="l" rtl="0" eaLnBrk="0" fontAlgn="base" hangingPunct="0">
+                <a:spcBef>
+                  <a:spcPct val="0"/>
+                </a:spcBef>
+                <a:spcAft>
+                  <a:spcPct val="0"/>
+                </a:spcAft>
+                <a:defRPr sz="2400" b="1">
+                  <a:solidFill>
+                    <a:srgbClr val="004080"/>
+                  </a:solidFill>
+                  <a:latin typeface="+mj-lt"/>
+                  <a:ea typeface="ＭＳ Ｐゴシック" charset="0"/>
+                  <a:cs typeface="+mj-cs"/>
+                </a:defRPr>
+              </a:lvl1pPr>
+              <a:lvl2pPr algn="l" rtl="0" eaLnBrk="0" fontAlgn="base" hangingPunct="0">
+                <a:spcBef>
+                  <a:spcPct val="0"/>
+                </a:spcBef>
+                <a:spcAft>
+                  <a:spcPct val="0"/>
+                </a:spcAft>
+                <a:defRPr sz="2400" b="1">
+                  <a:solidFill>
+                    <a:srgbClr val="004080"/>
+                  </a:solidFill>
+                  <a:effectLst>
+                    <a:outerShdw blurRad="38100" dist="38100" dir="2700000" algn="tl">
+                      <a:srgbClr val="C0C0C0"/>
+                    </a:outerShdw>
+                  </a:effectLst>
+                  <a:latin typeface="Arial" charset="0"/>
+                  <a:ea typeface="ＭＳ Ｐゴシック" charset="0"/>
+                </a:defRPr>
+              </a:lvl2pPr>
+              <a:lvl3pPr algn="l" rtl="0" eaLnBrk="0" fontAlgn="base" hangingPunct="0">
+                <a:spcBef>
+                  <a:spcPct val="0"/>
+                </a:spcBef>
+                <a:spcAft>
+                  <a:spcPct val="0"/>
+                </a:spcAft>
+                <a:defRPr sz="2400" b="1">
+                  <a:solidFill>
+                    <a:srgbClr val="004080"/>
+                  </a:solidFill>
+                  <a:effectLst>
+                    <a:outerShdw blurRad="38100" dist="38100" dir="2700000" algn="tl">
+                      <a:srgbClr val="C0C0C0"/>
+                    </a:outerShdw>
+                  </a:effectLst>
+                  <a:latin typeface="Arial" charset="0"/>
+                  <a:ea typeface="ＭＳ Ｐゴシック" charset="0"/>
+                </a:defRPr>
+              </a:lvl3pPr>
+              <a:lvl4pPr algn="l" rtl="0" eaLnBrk="0" fontAlgn="base" hangingPunct="0">
+                <a:spcBef>
+                  <a:spcPct val="0"/>
+                </a:spcBef>
+                <a:spcAft>
+                  <a:spcPct val="0"/>
+                </a:spcAft>
+                <a:defRPr sz="2400" b="1">
+                  <a:solidFill>
+                    <a:srgbClr val="004080"/>
+                  </a:solidFill>
+                  <a:effectLst>
+                    <a:outerShdw blurRad="38100" dist="38100" dir="2700000" algn="tl">
+                      <a:srgbClr val="C0C0C0"/>
+                    </a:outerShdw>
+                  </a:effectLst>
+                  <a:latin typeface="Arial" charset="0"/>
+                  <a:ea typeface="ＭＳ Ｐゴシック" charset="0"/>
+                </a:defRPr>
+              </a:lvl4pPr>
+              <a:lvl5pPr algn="l" rtl="0" eaLnBrk="0" fontAlgn="base" hangingPunct="0">
+                <a:spcBef>
+                  <a:spcPct val="0"/>
+                </a:spcBef>
+                <a:spcAft>
+                  <a:spcPct val="0"/>
+                </a:spcAft>
+                <a:defRPr sz="2400" b="1">
+                  <a:solidFill>
+                    <a:srgbClr val="004080"/>
+                  </a:solidFill>
+                  <a:effectLst>
+                    <a:outerShdw blurRad="38100" dist="38100" dir="2700000" algn="tl">
+                      <a:srgbClr val="C0C0C0"/>
+                    </a:outerShdw>
+                  </a:effectLst>
+                  <a:latin typeface="Arial" charset="0"/>
+                  <a:ea typeface="ＭＳ Ｐゴシック" charset="0"/>
+                </a:defRPr>
+              </a:lvl5pPr>
+              <a:lvl6pPr marL="457200" algn="l" rtl="0" fontAlgn="base">
+                <a:spcBef>
+                  <a:spcPct val="0"/>
+                </a:spcBef>
+                <a:spcAft>
+                  <a:spcPct val="0"/>
+                </a:spcAft>
+                <a:defRPr sz="2400" b="1">
+                  <a:solidFill>
+                    <a:schemeClr val="bg1"/>
+                  </a:solidFill>
+                  <a:effectLst>
+                    <a:outerShdw blurRad="38100" dist="38100" dir="2700000" algn="tl">
+                      <a:srgbClr val="C0C0C0"/>
+                    </a:outerShdw>
+                  </a:effectLst>
+                  <a:latin typeface="Tahoma" pitchFamily="34" charset="0"/>
+                </a:defRPr>
+              </a:lvl6pPr>
+              <a:lvl7pPr marL="914400" algn="l" rtl="0" fontAlgn="base">
+                <a:spcBef>
+                  <a:spcPct val="0"/>
+                </a:spcBef>
+                <a:spcAft>
+                  <a:spcPct val="0"/>
+                </a:spcAft>
+                <a:defRPr sz="2400" b="1">
+                  <a:solidFill>
+                    <a:schemeClr val="bg1"/>
+                  </a:solidFill>
+                  <a:effectLst>
+                    <a:outerShdw blurRad="38100" dist="38100" dir="2700000" algn="tl">
+                      <a:srgbClr val="C0C0C0"/>
+                    </a:outerShdw>
+                  </a:effectLst>
+                  <a:latin typeface="Tahoma" pitchFamily="34" charset="0"/>
+                </a:defRPr>
+              </a:lvl7pPr>
+              <a:lvl8pPr marL="1371600" algn="l" rtl="0" fontAlgn="base">
+                <a:spcBef>
+                  <a:spcPct val="0"/>
+                </a:spcBef>
+                <a:spcAft>
+                  <a:spcPct val="0"/>
+                </a:spcAft>
+                <a:defRPr sz="2400" b="1">
+                  <a:solidFill>
+                    <a:schemeClr val="bg1"/>
+                  </a:solidFill>
+                  <a:effectLst>
+                    <a:outerShdw blurRad="38100" dist="38100" dir="2700000" algn="tl">
+                      <a:srgbClr val="C0C0C0"/>
+                    </a:outerShdw>
+                  </a:effectLst>
+                  <a:latin typeface="Tahoma" pitchFamily="34" charset="0"/>
+                </a:defRPr>
+              </a:lvl8pPr>
+              <a:lvl9pPr marL="1828800" algn="l" rtl="0" fontAlgn="base">
+                <a:spcBef>
+                  <a:spcPct val="0"/>
+                </a:spcBef>
+                <a:spcAft>
+                  <a:spcPct val="0"/>
+                </a:spcAft>
+                <a:defRPr sz="2400" b="1">
+                  <a:solidFill>
+                    <a:schemeClr val="bg1"/>
+                  </a:solidFill>
+                  <a:effectLst>
+                    <a:outerShdw blurRad="38100" dist="38100" dir="2700000" algn="tl">
+                      <a:srgbClr val="C0C0C0"/>
+                    </a:outerShdw>
+                  </a:effectLst>
+                  <a:latin typeface="Tahoma" pitchFamily="34" charset="0"/>
+                </a:defRPr>
+              </a:lvl9pPr>
+            </a:lstStyle>
+            <a:p>
+              <a:pPr algn="ctr"/>
+              <a:r>
+                <a:rPr lang="en-US" sz="1800" b="0" dirty="0" err="1"/>
+                <a:t>TransferService</a:t>
+              </a:r>
+              <a:endParaRPr lang="en-US" sz="1800" b="0" dirty="0">
+                <a:latin typeface="+mn-lt"/>
+              </a:endParaRPr>
+            </a:p>
+          </p:txBody>
+        </p:sp>
+        <p:sp>
+          <p:nvSpPr>
+            <p:cNvPr id="35" name="Title 1"/>
+            <p:cNvSpPr txBox="1">
+              <a:spLocks/>
+            </p:cNvSpPr>
+            <p:nvPr/>
+          </p:nvSpPr>
+          <p:spPr bwMode="auto">
+            <a:xfrm>
+              <a:off x="2483644" y="2016126"/>
+              <a:ext cx="2113755" cy="312737"/>
+            </a:xfrm>
+            <a:prstGeom prst="rect">
+              <a:avLst/>
+            </a:prstGeom>
+            <a:ln>
+              <a:headEnd/>
+              <a:tailEnd/>
+            </a:ln>
+            <a:extLst>
+              <a:ext uri="{FAA26D3D-D897-4be2-8F04-BA451C77F1D7}">
+                <ma14:placeholderFlag xmlns:ma14="http://schemas.microsoft.com/office/mac/drawingml/2011/main" val="1"/>
+              </a:ext>
+            </a:extLst>
+          </p:spPr>
+          <p:style>
+            <a:lnRef idx="2">
+              <a:schemeClr val="accent1"/>
+            </a:lnRef>
+            <a:fillRef idx="1">
+              <a:schemeClr val="lt1"/>
+            </a:fillRef>
+            <a:effectRef idx="0">
+              <a:schemeClr val="accent1"/>
+            </a:effectRef>
+            <a:fontRef idx="minor">
+              <a:schemeClr val="dk1"/>
+            </a:fontRef>
+          </p:style>
+          <p:txBody>
+            <a:bodyPr vert="horz" wrap="square" lIns="91440" tIns="45720" rIns="91440" bIns="45720" numCol="1" anchor="ctr" anchorCtr="0" compatLnSpc="1">
+              <a:prstTxWarp prst="textNoShape">
+                <a:avLst/>
+              </a:prstTxWarp>
+            </a:bodyPr>
+            <a:lstStyle>
+              <a:lvl1pPr algn="l" rtl="0" eaLnBrk="0" fontAlgn="base" hangingPunct="0">
+                <a:spcBef>
+                  <a:spcPct val="0"/>
+                </a:spcBef>
+                <a:spcAft>
+                  <a:spcPct val="0"/>
+                </a:spcAft>
+                <a:defRPr sz="2400" b="1">
+                  <a:solidFill>
+                    <a:srgbClr val="004080"/>
+                  </a:solidFill>
+                  <a:latin typeface="+mj-lt"/>
+                  <a:ea typeface="ＭＳ Ｐゴシック" charset="0"/>
+                  <a:cs typeface="+mj-cs"/>
+                </a:defRPr>
+              </a:lvl1pPr>
+              <a:lvl2pPr algn="l" rtl="0" eaLnBrk="0" fontAlgn="base" hangingPunct="0">
+                <a:spcBef>
+                  <a:spcPct val="0"/>
+                </a:spcBef>
+                <a:spcAft>
+                  <a:spcPct val="0"/>
+                </a:spcAft>
+                <a:defRPr sz="2400" b="1">
+                  <a:solidFill>
+                    <a:srgbClr val="004080"/>
+                  </a:solidFill>
+                  <a:effectLst>
+                    <a:outerShdw blurRad="38100" dist="38100" dir="2700000" algn="tl">
+                      <a:srgbClr val="C0C0C0"/>
+                    </a:outerShdw>
+                  </a:effectLst>
+                  <a:latin typeface="Arial" charset="0"/>
+                  <a:ea typeface="ＭＳ Ｐゴシック" charset="0"/>
+                </a:defRPr>
+              </a:lvl2pPr>
+              <a:lvl3pPr algn="l" rtl="0" eaLnBrk="0" fontAlgn="base" hangingPunct="0">
+                <a:spcBef>
+                  <a:spcPct val="0"/>
+                </a:spcBef>
+                <a:spcAft>
+                  <a:spcPct val="0"/>
+                </a:spcAft>
+                <a:defRPr sz="2400" b="1">
+                  <a:solidFill>
+                    <a:srgbClr val="004080"/>
+                  </a:solidFill>
+                  <a:effectLst>
+                    <a:outerShdw blurRad="38100" dist="38100" dir="2700000" algn="tl">
+                      <a:srgbClr val="C0C0C0"/>
+                    </a:outerShdw>
+                  </a:effectLst>
+                  <a:latin typeface="Arial" charset="0"/>
+                  <a:ea typeface="ＭＳ Ｐゴシック" charset="0"/>
+                </a:defRPr>
+              </a:lvl3pPr>
+              <a:lvl4pPr algn="l" rtl="0" eaLnBrk="0" fontAlgn="base" hangingPunct="0">
+                <a:spcBef>
+                  <a:spcPct val="0"/>
+                </a:spcBef>
+                <a:spcAft>
+                  <a:spcPct val="0"/>
+                </a:spcAft>
+                <a:defRPr sz="2400" b="1">
+                  <a:solidFill>
+                    <a:srgbClr val="004080"/>
+                  </a:solidFill>
+                  <a:effectLst>
+                    <a:outerShdw blurRad="38100" dist="38100" dir="2700000" algn="tl">
+                      <a:srgbClr val="C0C0C0"/>
+                    </a:outerShdw>
+                  </a:effectLst>
+                  <a:latin typeface="Arial" charset="0"/>
+                  <a:ea typeface="ＭＳ Ｐゴシック" charset="0"/>
+                </a:defRPr>
+              </a:lvl4pPr>
+              <a:lvl5pPr algn="l" rtl="0" eaLnBrk="0" fontAlgn="base" hangingPunct="0">
+                <a:spcBef>
+                  <a:spcPct val="0"/>
+                </a:spcBef>
+                <a:spcAft>
+                  <a:spcPct val="0"/>
+                </a:spcAft>
+                <a:defRPr sz="2400" b="1">
+                  <a:solidFill>
+                    <a:srgbClr val="004080"/>
+                  </a:solidFill>
+                  <a:effectLst>
+                    <a:outerShdw blurRad="38100" dist="38100" dir="2700000" algn="tl">
+                      <a:srgbClr val="C0C0C0"/>
+                    </a:outerShdw>
+                  </a:effectLst>
+                  <a:latin typeface="Arial" charset="0"/>
+                  <a:ea typeface="ＭＳ Ｐゴシック" charset="0"/>
+                </a:defRPr>
+              </a:lvl5pPr>
+              <a:lvl6pPr marL="457200" algn="l" rtl="0" fontAlgn="base">
+                <a:spcBef>
+                  <a:spcPct val="0"/>
+                </a:spcBef>
+                <a:spcAft>
+                  <a:spcPct val="0"/>
+                </a:spcAft>
+                <a:defRPr sz="2400" b="1">
+                  <a:solidFill>
+                    <a:schemeClr val="bg1"/>
+                  </a:solidFill>
+                  <a:effectLst>
+                    <a:outerShdw blurRad="38100" dist="38100" dir="2700000" algn="tl">
+                      <a:srgbClr val="C0C0C0"/>
+                    </a:outerShdw>
+                  </a:effectLst>
+                  <a:latin typeface="Tahoma" pitchFamily="34" charset="0"/>
+                </a:defRPr>
+              </a:lvl6pPr>
+              <a:lvl7pPr marL="914400" algn="l" rtl="0" fontAlgn="base">
+                <a:spcBef>
+                  <a:spcPct val="0"/>
+                </a:spcBef>
+                <a:spcAft>
+                  <a:spcPct val="0"/>
+                </a:spcAft>
+                <a:defRPr sz="2400" b="1">
+                  <a:solidFill>
+                    <a:schemeClr val="bg1"/>
+                  </a:solidFill>
+                  <a:effectLst>
+                    <a:outerShdw blurRad="38100" dist="38100" dir="2700000" algn="tl">
+                      <a:srgbClr val="C0C0C0"/>
+                    </a:outerShdw>
+                  </a:effectLst>
+                  <a:latin typeface="Tahoma" pitchFamily="34" charset="0"/>
+                </a:defRPr>
+              </a:lvl7pPr>
+              <a:lvl8pPr marL="1371600" algn="l" rtl="0" fontAlgn="base">
+                <a:spcBef>
+                  <a:spcPct val="0"/>
+                </a:spcBef>
+                <a:spcAft>
+                  <a:spcPct val="0"/>
+                </a:spcAft>
+                <a:defRPr sz="2400" b="1">
+                  <a:solidFill>
+                    <a:schemeClr val="bg1"/>
+                  </a:solidFill>
+                  <a:effectLst>
+                    <a:outerShdw blurRad="38100" dist="38100" dir="2700000" algn="tl">
+                      <a:srgbClr val="C0C0C0"/>
+                    </a:outerShdw>
+                  </a:effectLst>
+                  <a:latin typeface="Tahoma" pitchFamily="34" charset="0"/>
+                </a:defRPr>
+              </a:lvl8pPr>
+              <a:lvl9pPr marL="1828800" algn="l" rtl="0" fontAlgn="base">
+                <a:spcBef>
+                  <a:spcPct val="0"/>
+                </a:spcBef>
+                <a:spcAft>
+                  <a:spcPct val="0"/>
+                </a:spcAft>
+                <a:defRPr sz="2400" b="1">
+                  <a:solidFill>
+                    <a:schemeClr val="bg1"/>
+                  </a:solidFill>
+                  <a:effectLst>
+                    <a:outerShdw blurRad="38100" dist="38100" dir="2700000" algn="tl">
+                      <a:srgbClr val="C0C0C0"/>
+                    </a:outerShdw>
+                  </a:effectLst>
+                  <a:latin typeface="Tahoma" pitchFamily="34" charset="0"/>
+                </a:defRPr>
+              </a:lvl9pPr>
+            </a:lstStyle>
+            <a:p>
+              <a:r>
+                <a:rPr lang="en-US" sz="1800" b="0" dirty="0" smtClean="0"/>
+                <a:t>Transfer(double, String, String)</a:t>
+              </a:r>
+              <a:endParaRPr lang="en-US" sz="1800" b="0" dirty="0"/>
+            </a:p>
+          </p:txBody>
+        </p:sp>
+      </p:grpSp>
+      <p:cxnSp>
+        <p:nvCxnSpPr>
+          <p:cNvPr id="38" name="Straight Arrow Connector 37"/>
+          <p:cNvCxnSpPr/>
+          <p:nvPr/>
+        </p:nvCxnSpPr>
+        <p:spPr>
+          <a:xfrm flipV="1">
+            <a:off x="3465142" y="2311271"/>
+            <a:ext cx="1384300" cy="12699"/>
+          </a:xfrm>
+          <a:prstGeom prst="straightConnector1">
+            <a:avLst/>
+          </a:prstGeom>
+          <a:ln>
+            <a:tailEnd type="arrow"/>
+          </a:ln>
+        </p:spPr>
+        <p:style>
+          <a:lnRef idx="2">
+            <a:schemeClr val="accent4"/>
+          </a:lnRef>
+          <a:fillRef idx="0">
+            <a:schemeClr val="accent4"/>
+          </a:fillRef>
+          <a:effectRef idx="1">
+            <a:schemeClr val="accent4"/>
+          </a:effectRef>
+          <a:fontRef idx="minor">
+            <a:schemeClr val="tx1"/>
+          </a:fontRef>
+        </p:style>
+      </p:cxnSp>
+    </p:spTree>
+    <p:extLst>
+      <p:ext uri="{BB962C8B-B14F-4D97-AF65-F5344CB8AC3E}">
+        <p14:creationId xmlns:p14="http://schemas.microsoft.com/office/powerpoint/2010/main" val="4004188516"/>
+      </p:ext>
+    </p:extLst>
+  </p:cSld>
+  <p:clrMapOvr>
+    <a:masterClrMapping/>
+  </p:clrMapOvr>
+  <p:transition xmlns:p14="http://schemas.microsoft.com/office/powerpoint/2010/main">
+    <p:zoom/>
+  </p:transition>
+</p:sld>
+</file>
+
+<file path=ppt/slides/slide8.xml><?xml version="1.0" encoding="utf-8"?>
+<p:sld xmlns:a="http://schemas.openxmlformats.org/drawingml/2006/main" xmlns:r="http://schemas.openxmlformats.org/officeDocument/2006/relationships" xmlns:p="http://schemas.openxmlformats.org/presentationml/2006/main">
+  <p:cSld>
+    <p:spTree>
+      <p:nvGrpSpPr>
+        <p:cNvPr id="1" name=""/>
+        <p:cNvGrpSpPr/>
+        <p:nvPr/>
+      </p:nvGrpSpPr>
+      <p:grpSpPr>
+        <a:xfrm>
+          <a:off x="0" y="0"/>
+          <a:ext cx="0" cy="0"/>
+          <a:chOff x="0" y="0"/>
+          <a:chExt cx="0" cy="0"/>
+        </a:xfrm>
+      </p:grpSpPr>
+      <p:sp>
+        <p:nvSpPr>
+          <p:cNvPr id="3" name="Title 2"/>
+          <p:cNvSpPr>
+            <a:spLocks noGrp="1"/>
+          </p:cNvSpPr>
+          <p:nvPr>
+            <p:ph type="title"/>
+          </p:nvPr>
+        </p:nvSpPr>
+        <p:spPr/>
+        <p:txBody>
+          <a:bodyPr/>
+          <a:lstStyle/>
+          <a:p>
+            <a:r>
+              <a:rPr lang="en-US" dirty="0" err="1" smtClean="0"/>
+              <a:t>JUnit</a:t>
+            </a:r>
+            <a:endParaRPr lang="en-US" dirty="0"/>
+          </a:p>
+        </p:txBody>
+      </p:sp>
+      <p:sp>
+        <p:nvSpPr>
+          <p:cNvPr id="4" name="Rectangle 3"/>
+          <p:cNvSpPr>
+            <a:spLocks noChangeArrowheads="1"/>
+          </p:cNvSpPr>
+          <p:nvPr>
+            <p:custDataLst>
+              <p:tags r:id="rId1"/>
+            </p:custDataLst>
+          </p:nvPr>
+        </p:nvSpPr>
+        <p:spPr bwMode="auto">
+          <a:xfrm>
+            <a:off x="955174" y="2654082"/>
+            <a:ext cx="7252368" cy="516612"/>
+          </a:xfrm>
+          <a:prstGeom prst="rect">
+            <a:avLst/>
+          </a:prstGeom>
+          <a:noFill/>
+          <a:ln w="19050">
+            <a:noFill/>
+            <a:miter lim="800000"/>
+            <a:headEnd/>
+            <a:tailEnd/>
+          </a:ln>
+        </p:spPr>
+        <p:txBody>
+          <a:bodyPr wrap="square" lIns="93296" tIns="144000" rIns="93296" bIns="93296">
+            <a:spAutoFit/>
+          </a:bodyPr>
+          <a:lstStyle/>
+          <a:p>
+            <a:pPr algn="ctr" defTabSz="803275">
+              <a:buClr>
+                <a:srgbClr val="FF6600"/>
+              </a:buClr>
+              <a:buSzPct val="125000"/>
+            </a:pPr>
+            <a:r>
+              <a:rPr lang="ru-RU" dirty="0" smtClean="0">
+                <a:solidFill>
+                  <a:srgbClr val="004080"/>
+                </a:solidFill>
+                <a:cs typeface="Tahoma" charset="0"/>
+              </a:rPr>
+              <a:t>В качестве инструмента мы все еще используем </a:t>
+            </a:r>
+            <a:r>
+              <a:rPr lang="en-US" dirty="0" err="1" smtClean="0">
+                <a:solidFill>
+                  <a:srgbClr val="004080"/>
+                </a:solidFill>
+                <a:cs typeface="Tahoma" charset="0"/>
+              </a:rPr>
+              <a:t>JUnit</a:t>
+            </a:r>
+            <a:r>
+              <a:rPr lang="en-US" dirty="0" smtClean="0">
+                <a:solidFill>
+                  <a:srgbClr val="004080"/>
+                </a:solidFill>
+                <a:cs typeface="Tahoma" charset="0"/>
+              </a:rPr>
+              <a:t>!</a:t>
+            </a:r>
+            <a:endParaRPr lang="ru-RU" dirty="0">
+              <a:solidFill>
+                <a:srgbClr val="004080"/>
+              </a:solidFill>
+              <a:cs typeface="Tahoma" charset="0"/>
+            </a:endParaRPr>
+          </a:p>
+        </p:txBody>
+      </p:sp>
+      <p:sp>
+        <p:nvSpPr>
+          <p:cNvPr id="5" name="Rectangle 4"/>
+          <p:cNvSpPr>
+            <a:spLocks noChangeArrowheads="1"/>
+          </p:cNvSpPr>
+          <p:nvPr>
+            <p:custDataLst>
+              <p:tags r:id="rId2"/>
+            </p:custDataLst>
+          </p:nvPr>
+        </p:nvSpPr>
+        <p:spPr bwMode="auto">
+          <a:xfrm>
+            <a:off x="948490" y="3240505"/>
+            <a:ext cx="7252368" cy="793611"/>
+          </a:xfrm>
+          <a:prstGeom prst="rect">
+            <a:avLst/>
+          </a:prstGeom>
+          <a:noFill/>
+          <a:ln w="19050">
+            <a:noFill/>
+            <a:miter lim="800000"/>
+            <a:headEnd/>
+            <a:tailEnd/>
+          </a:ln>
+        </p:spPr>
+        <p:txBody>
+          <a:bodyPr wrap="square" lIns="93296" tIns="144000" rIns="93296" bIns="93296">
+            <a:spAutoFit/>
+          </a:bodyPr>
+          <a:lstStyle/>
+          <a:p>
+            <a:pPr algn="ctr" defTabSz="803275">
+              <a:buClr>
+                <a:srgbClr val="FF6600"/>
+              </a:buClr>
+              <a:buSzPct val="125000"/>
+            </a:pPr>
+            <a:r>
+              <a:rPr lang="ru-RU" dirty="0">
+                <a:solidFill>
+                  <a:srgbClr val="004080"/>
+                </a:solidFill>
+                <a:cs typeface="Tahoma" charset="0"/>
+              </a:rPr>
+              <a:t>Ч</a:t>
+            </a:r>
+            <a:r>
+              <a:rPr lang="ru-RU" dirty="0" smtClean="0">
+                <a:solidFill>
+                  <a:srgbClr val="004080"/>
+                </a:solidFill>
+                <a:cs typeface="Tahoma" charset="0"/>
+              </a:rPr>
+              <a:t>аще </a:t>
+            </a:r>
+            <a:r>
+              <a:rPr lang="ru-RU" dirty="0">
+                <a:solidFill>
+                  <a:srgbClr val="004080"/>
+                </a:solidFill>
+                <a:cs typeface="Tahoma" charset="0"/>
+              </a:rPr>
+              <a:t>всего </a:t>
+            </a:r>
+            <a:r>
+              <a:rPr lang="ru-RU" dirty="0" smtClean="0">
+                <a:solidFill>
+                  <a:srgbClr val="004080"/>
+                </a:solidFill>
+                <a:cs typeface="Tahoma" charset="0"/>
+              </a:rPr>
+              <a:t>для написания интеграционных тестов используются те </a:t>
+            </a:r>
+            <a:r>
+              <a:rPr lang="ru-RU" dirty="0">
+                <a:solidFill>
+                  <a:srgbClr val="004080"/>
+                </a:solidFill>
+                <a:cs typeface="Tahoma" charset="0"/>
+              </a:rPr>
+              <a:t>же библиотеки для </a:t>
+            </a:r>
+            <a:r>
+              <a:rPr lang="ru-RU" dirty="0" smtClean="0">
+                <a:solidFill>
+                  <a:srgbClr val="004080"/>
+                </a:solidFill>
+                <a:cs typeface="Tahoma" charset="0"/>
+              </a:rPr>
+              <a:t>тестирования, </a:t>
+            </a:r>
+            <a:r>
+              <a:rPr lang="ru-RU" dirty="0">
+                <a:solidFill>
+                  <a:srgbClr val="004080"/>
+                </a:solidFill>
+                <a:cs typeface="Tahoma" charset="0"/>
+              </a:rPr>
+              <a:t>что </a:t>
+            </a:r>
+            <a:r>
+              <a:rPr lang="ru-RU" dirty="0" smtClean="0">
+                <a:solidFill>
+                  <a:srgbClr val="004080"/>
+                </a:solidFill>
+                <a:cs typeface="Tahoma" charset="0"/>
+              </a:rPr>
+              <a:t>и для модульных тестов.</a:t>
+            </a:r>
+            <a:endParaRPr lang="ru-RU" dirty="0">
+              <a:solidFill>
+                <a:srgbClr val="004080"/>
+              </a:solidFill>
+              <a:cs typeface="Tahoma" charset="0"/>
+            </a:endParaRPr>
+          </a:p>
+        </p:txBody>
+      </p:sp>
+    </p:spTree>
+    <p:extLst>
+      <p:ext uri="{BB962C8B-B14F-4D97-AF65-F5344CB8AC3E}">
+        <p14:creationId xmlns:p14="http://schemas.microsoft.com/office/powerpoint/2010/main" val="4204857334"/>
+      </p:ext>
+    </p:extLst>
+  </p:cSld>
+  <p:clrMapOvr>
+    <a:masterClrMapping/>
+  </p:clrMapOvr>
+  <p:transition xmlns:p14="http://schemas.microsoft.com/office/powerpoint/2010/main">
+    <p:zoom/>
+  </p:transition>
+</p:sld>
+</file>
+
+<file path=ppt/slides/slide9.xml><?xml version="1.0" encoding="utf-8"?>
+<p:sld xmlns:a="http://schemas.openxmlformats.org/drawingml/2006/main" xmlns:r="http://schemas.openxmlformats.org/officeDocument/2006/relationships" xmlns:p="http://schemas.openxmlformats.org/presentationml/2006/main">
+  <p:cSld>
+    <p:spTree>
+      <p:nvGrpSpPr>
+        <p:cNvPr id="1" name=""/>
+        <p:cNvGrpSpPr/>
+        <p:nvPr/>
+      </p:nvGrpSpPr>
+      <p:grpSpPr>
+        <a:xfrm>
+          <a:off x="0" y="0"/>
+          <a:ext cx="0" cy="0"/>
+          <a:chOff x="0" y="0"/>
+          <a:chExt cx="0" cy="0"/>
+        </a:xfrm>
+      </p:grpSpPr>
+      <p:sp>
+        <p:nvSpPr>
+          <p:cNvPr id="3" name="Title 2"/>
+          <p:cNvSpPr>
+            <a:spLocks noGrp="1"/>
+          </p:cNvSpPr>
+          <p:nvPr>
+            <p:ph type="title"/>
+          </p:nvPr>
+        </p:nvSpPr>
+        <p:spPr/>
+        <p:txBody>
+          <a:bodyPr/>
+          <a:lstStyle/>
+          <a:p>
+            <a:r>
+              <a:rPr lang="en-US" dirty="0" smtClean="0"/>
+              <a:t>Black Box </a:t>
+            </a:r>
+            <a:r>
+              <a:rPr lang="en-US" dirty="0" err="1" smtClean="0"/>
+              <a:t>Tesitng</a:t>
+            </a:r>
+            <a:endParaRPr lang="en-US" dirty="0"/>
+          </a:p>
+        </p:txBody>
+      </p:sp>
+      <p:sp>
+        <p:nvSpPr>
+          <p:cNvPr id="4" name="Rectangle 3"/>
+          <p:cNvSpPr>
+            <a:spLocks noChangeArrowheads="1"/>
+          </p:cNvSpPr>
+          <p:nvPr>
+            <p:custDataLst>
+              <p:tags r:id="rId1"/>
+            </p:custDataLst>
+          </p:nvPr>
+        </p:nvSpPr>
+        <p:spPr bwMode="auto">
+          <a:xfrm>
+            <a:off x="945816" y="2755196"/>
+            <a:ext cx="7252368" cy="1347609"/>
+          </a:xfrm>
+          <a:prstGeom prst="rect">
+            <a:avLst/>
+          </a:prstGeom>
+          <a:noFill/>
+          <a:ln w="19050">
+            <a:noFill/>
+            <a:miter lim="800000"/>
+            <a:headEnd/>
+            <a:tailEnd/>
+          </a:ln>
+        </p:spPr>
+        <p:txBody>
+          <a:bodyPr wrap="square" lIns="93296" tIns="144000" rIns="93296" bIns="93296">
+            <a:spAutoFit/>
+          </a:bodyPr>
+          <a:lstStyle/>
+          <a:p>
+            <a:pPr defTabSz="803275">
+              <a:buClr>
+                <a:srgbClr val="FF6600"/>
+              </a:buClr>
+              <a:buSzPct val="125000"/>
+            </a:pPr>
+            <a:r>
+              <a:rPr lang="ru-RU" dirty="0">
+                <a:solidFill>
+                  <a:srgbClr val="004080"/>
+                </a:solidFill>
+                <a:cs typeface="Tahoma" charset="0"/>
+              </a:rPr>
+              <a:t>Тестирование чёрного ящика или поведенческое тестирование — стратегия (метод) тестирования функционального поведения объекта (программы, системы) с точки зрения внешнего мира, при котором не используется знание о внутреннем устройстве тестируемого объекта.</a:t>
+            </a:r>
+            <a:endParaRPr lang="ru-RU" dirty="0">
+              <a:solidFill>
+                <a:srgbClr val="004080"/>
+              </a:solidFill>
+              <a:cs typeface="Tahoma" charset="0"/>
+            </a:endParaRPr>
+          </a:p>
+        </p:txBody>
+      </p:sp>
+    </p:spTree>
+    <p:extLst>
+      <p:ext uri="{BB962C8B-B14F-4D97-AF65-F5344CB8AC3E}">
+        <p14:creationId xmlns:p14="http://schemas.microsoft.com/office/powerpoint/2010/main" val="1782406591"/>
+      </p:ext>
+    </p:extLst>
+  </p:cSld>
+  <p:clrMapOvr>
+    <a:masterClrMapping/>
+  </p:clrMapOvr>
+  <p:transition xmlns:p14="http://schemas.microsoft.com/office/powerpoint/2010/main">
+    <p:zoom/>
+  </p:transition>
+</p:sld>
+</file>
+
+<file path=ppt/tags/tag1.xml><?xml version="1.0" encoding="utf-8"?>
+<p:tagLst xmlns:a="http://schemas.openxmlformats.org/drawingml/2006/main" xmlns:r="http://schemas.openxmlformats.org/officeDocument/2006/relationships" xmlns:p="http://schemas.openxmlformats.org/presentationml/2006/main">
+  <p:tag name="LTOP" val=" 238.25"/>
+  <p:tag name="LLEFT" val=" 144.125"/>
+</p:tagLst>
+</file>
+
+<file path=ppt/tags/tag10.xml><?xml version="1.0" encoding="utf-8"?>
+<p:tagLst xmlns:a="http://schemas.openxmlformats.org/drawingml/2006/main" xmlns:r="http://schemas.openxmlformats.org/officeDocument/2006/relationships" xmlns:p="http://schemas.openxmlformats.org/presentationml/2006/main">
+  <p:tag name="LTOP" val=" 238.25"/>
+  <p:tag name="LLEFT" val=" 144.125"/>
+</p:tagLst>
+</file>
+
+<file path=ppt/tags/tag2.xml><?xml version="1.0" encoding="utf-8"?>
+<p:tagLst xmlns:a="http://schemas.openxmlformats.org/drawingml/2006/main" xmlns:r="http://schemas.openxmlformats.org/officeDocument/2006/relationships" xmlns:p="http://schemas.openxmlformats.org/presentationml/2006/main">
+  <p:tag name="LTOP" val=" 238.25"/>
+  <p:tag name="LLEFT" val=" 144.125"/>
+</p:tagLst>
+</file>
+
+<file path=ppt/tags/tag3.xml><?xml version="1.0" encoding="utf-8"?>
+<p:tagLst xmlns:a="http://schemas.openxmlformats.org/drawingml/2006/main" xmlns:r="http://schemas.openxmlformats.org/officeDocument/2006/relationships" xmlns:p="http://schemas.openxmlformats.org/presentationml/2006/main">
+  <p:tag name="LTOP" val=" 238.25"/>
+  <p:tag name="LLEFT" val=" 144.125"/>
+</p:tagLst>
+</file>
+
+<file path=ppt/tags/tag4.xml><?xml version="1.0" encoding="utf-8"?>
+<p:tagLst xmlns:a="http://schemas.openxmlformats.org/drawingml/2006/main" xmlns:r="http://schemas.openxmlformats.org/officeDocument/2006/relationships" xmlns:p="http://schemas.openxmlformats.org/presentationml/2006/main">
+  <p:tag name="LTOP" val=" 238.25"/>
+  <p:tag name="LLEFT" val=" 144.125"/>
+</p:tagLst>
+</file>
+
+<file path=ppt/tags/tag5.xml><?xml version="1.0" encoding="utf-8"?>
+<p:tagLst xmlns:a="http://schemas.openxmlformats.org/drawingml/2006/main" xmlns:r="http://schemas.openxmlformats.org/officeDocument/2006/relationships" xmlns:p="http://schemas.openxmlformats.org/presentationml/2006/main">
+  <p:tag name="LTOP" val=" 238.25"/>
+  <p:tag name="LLEFT" val=" 144.125"/>
+</p:tagLst>
+</file>
+
+<file path=ppt/tags/tag6.xml><?xml version="1.0" encoding="utf-8"?>
+<p:tagLst xmlns:a="http://schemas.openxmlformats.org/drawingml/2006/main" xmlns:r="http://schemas.openxmlformats.org/officeDocument/2006/relationships" xmlns:p="http://schemas.openxmlformats.org/presentationml/2006/main">
+  <p:tag name="LTOP" val=" 238.25"/>
+  <p:tag name="LLEFT" val=" 144.125"/>
+</p:tagLst>
+</file>
+
+<file path=ppt/tags/tag7.xml><?xml version="1.0" encoding="utf-8"?>
+<p:tagLst xmlns:a="http://schemas.openxmlformats.org/drawingml/2006/main" xmlns:r="http://schemas.openxmlformats.org/officeDocument/2006/relationships" xmlns:p="http://schemas.openxmlformats.org/presentationml/2006/main">
+  <p:tag name="LTOP" val=" 238.25"/>
+  <p:tag name="LLEFT" val=" 144.125"/>
+</p:tagLst>
+</file>
+
+<file path=ppt/tags/tag8.xml><?xml version="1.0" encoding="utf-8"?>
+<p:tagLst xmlns:a="http://schemas.openxmlformats.org/drawingml/2006/main" xmlns:r="http://schemas.openxmlformats.org/officeDocument/2006/relationships" xmlns:p="http://schemas.openxmlformats.org/presentationml/2006/main">
+  <p:tag name="LTOP" val=" 238.25"/>
+  <p:tag name="LLEFT" val=" 144.125"/>
+</p:tagLst>
+</file>
+
+<file path=ppt/tags/tag9.xml><?xml version="1.0" encoding="utf-8"?>
+<p:tagLst xmlns:a="http://schemas.openxmlformats.org/drawingml/2006/main" xmlns:r="http://schemas.openxmlformats.org/officeDocument/2006/relationships" xmlns:p="http://schemas.openxmlformats.org/presentationml/2006/main">
+  <p:tag name="LTOP" val=" 238.25"/>
+  <p:tag name="LLEFT" val=" 144.125"/>
+</p:tagLst>
 </file>
 
 <file path=ppt/theme/theme1.xml><?xml version="1.0" encoding="utf-8"?>

</xml_diff>

<commit_message>
merge all branches into master
</commit_message>
<xml_diff>
--- a/Test Driven Development/materials/pptx/3. TDD-Integration.pptx
+++ b/Test Driven Development/materials/pptx/3. TDD-Integration.pptx
@@ -643,6 +643,74 @@
           <a:bodyPr/>
           <a:lstStyle/>
           <a:p>
+            <a:r>
+              <a:rPr lang="ru-RU" dirty="0" smtClean="0"/>
+              <a:t>Итак, у нас стоит цель: протестировать поведение класса в </a:t>
+            </a:r>
+            <a:r>
+              <a:rPr lang="ru-RU" dirty="0" err="1" smtClean="0"/>
+              <a:t>spring</a:t>
+            </a:r>
+            <a:r>
+              <a:rPr lang="ru-RU" dirty="0" smtClean="0"/>
+              <a:t>-приложении, дополнительно необходимо вручную управлять транзакциями. Для этого мы создадим простое </a:t>
+            </a:r>
+            <a:r>
+              <a:rPr lang="ru-RU" dirty="0" err="1" smtClean="0"/>
+              <a:t>spring</a:t>
+            </a:r>
+            <a:r>
+              <a:rPr lang="ru-RU" dirty="0" smtClean="0"/>
+              <a:t>-приложение и напишем </a:t>
+            </a:r>
+            <a:r>
+              <a:rPr lang="ru-RU" dirty="0" err="1" smtClean="0"/>
+              <a:t>unit</a:t>
+            </a:r>
+            <a:r>
+              <a:rPr lang="ru-RU" dirty="0" smtClean="0"/>
+              <a:t>-тест. Наш </a:t>
+            </a:r>
+            <a:r>
+              <a:rPr lang="ru-RU" dirty="0" err="1" smtClean="0"/>
+              <a:t>unit</a:t>
+            </a:r>
+            <a:r>
+              <a:rPr lang="ru-RU" dirty="0" smtClean="0"/>
+              <a:t>-тест при запуске будет инициализировать </a:t>
+            </a:r>
+            <a:r>
+              <a:rPr lang="ru-RU" dirty="0" err="1" smtClean="0"/>
+              <a:t>application</a:t>
+            </a:r>
+            <a:r>
+              <a:rPr lang="ru-RU" dirty="0" smtClean="0"/>
+              <a:t> </a:t>
+            </a:r>
+            <a:r>
+              <a:rPr lang="ru-RU" dirty="0" err="1" smtClean="0"/>
+              <a:t>context</a:t>
+            </a:r>
+            <a:r>
+              <a:rPr lang="ru-RU" dirty="0" smtClean="0"/>
+              <a:t> </a:t>
+            </a:r>
+            <a:r>
+              <a:rPr lang="ru-RU" dirty="0" err="1" smtClean="0"/>
+              <a:t>config</a:t>
+            </a:r>
+            <a:r>
+              <a:rPr lang="ru-RU" dirty="0" smtClean="0"/>
+              <a:t> нашего </a:t>
+            </a:r>
+            <a:r>
+              <a:rPr lang="ru-RU" dirty="0" err="1" smtClean="0"/>
+              <a:t>spring</a:t>
+            </a:r>
+            <a:r>
+              <a:rPr lang="ru-RU" dirty="0" smtClean="0"/>
+              <a:t> приложения и после этого вызывать методы у тестируемого нами класса. Также мы разработаем отдельный тест, в котором будем управлять транзакциями вручную.</a:t>
+            </a:r>
             <a:endParaRPr lang="en-US" dirty="0"/>
           </a:p>
         </p:txBody>
@@ -727,6 +795,78 @@
           <a:bodyPr/>
           <a:lstStyle/>
           <a:p>
+            <a:r>
+              <a:rPr lang="ru-RU" dirty="0" smtClean="0"/>
+              <a:t>Итак, у нас стоит цель: протестировать поведение класса в </a:t>
+            </a:r>
+            <a:r>
+              <a:rPr lang="ru-RU" dirty="0" err="1" smtClean="0"/>
+              <a:t>spring</a:t>
+            </a:r>
+            <a:r>
+              <a:rPr lang="ru-RU" dirty="0" smtClean="0"/>
+              <a:t>-приложении, дополнительно необходимо вручную управлять транзакциями. Для этого мы создадим простое </a:t>
+            </a:r>
+            <a:r>
+              <a:rPr lang="ru-RU" dirty="0" err="1" smtClean="0"/>
+              <a:t>spring</a:t>
+            </a:r>
+            <a:r>
+              <a:rPr lang="ru-RU" dirty="0" smtClean="0"/>
+              <a:t>-приложение и напишем </a:t>
+            </a:r>
+            <a:r>
+              <a:rPr lang="ru-RU" dirty="0" err="1" smtClean="0"/>
+              <a:t>unit</a:t>
+            </a:r>
+            <a:r>
+              <a:rPr lang="ru-RU" dirty="0" smtClean="0"/>
+              <a:t>-тест. Наш </a:t>
+            </a:r>
+            <a:r>
+              <a:rPr lang="ru-RU" dirty="0" err="1" smtClean="0"/>
+              <a:t>unit</a:t>
+            </a:r>
+            <a:r>
+              <a:rPr lang="ru-RU" dirty="0" smtClean="0"/>
+              <a:t>-тест при запуске будет инициализировать </a:t>
+            </a:r>
+            <a:r>
+              <a:rPr lang="ru-RU" dirty="0" err="1" smtClean="0"/>
+              <a:t>application</a:t>
+            </a:r>
+            <a:r>
+              <a:rPr lang="ru-RU" dirty="0" smtClean="0"/>
+              <a:t> </a:t>
+            </a:r>
+            <a:r>
+              <a:rPr lang="ru-RU" dirty="0" err="1" smtClean="0"/>
+              <a:t>context</a:t>
+            </a:r>
+            <a:r>
+              <a:rPr lang="ru-RU" dirty="0" smtClean="0"/>
+              <a:t> </a:t>
+            </a:r>
+            <a:r>
+              <a:rPr lang="ru-RU" dirty="0" err="1" smtClean="0"/>
+              <a:t>config</a:t>
+            </a:r>
+            <a:r>
+              <a:rPr lang="ru-RU" dirty="0" smtClean="0"/>
+              <a:t> нашего </a:t>
+            </a:r>
+            <a:r>
+              <a:rPr lang="ru-RU" dirty="0" err="1" smtClean="0"/>
+              <a:t>spring</a:t>
+            </a:r>
+            <a:r>
+              <a:rPr lang="ru-RU" dirty="0" smtClean="0"/>
+              <a:t> приложения и после этого вызывать методы у тестируемого нами класса. </a:t>
+            </a:r>
+            <a:r>
+              <a:rPr lang="ru-RU" smtClean="0"/>
+              <a:t>Также мы разработаем отдельный тест, в котором будем управлять транзакциями вручную.</a:t>
+            </a:r>
             <a:endParaRPr lang="en-US" dirty="0"/>
           </a:p>
         </p:txBody>
@@ -811,6 +951,78 @@
           <a:bodyPr/>
           <a:lstStyle/>
           <a:p>
+            <a:r>
+              <a:rPr lang="ru-RU" dirty="0" smtClean="0"/>
+              <a:t>Итак, у нас стоит цель: протестировать поведение класса в </a:t>
+            </a:r>
+            <a:r>
+              <a:rPr lang="ru-RU" dirty="0" err="1" smtClean="0"/>
+              <a:t>spring</a:t>
+            </a:r>
+            <a:r>
+              <a:rPr lang="ru-RU" dirty="0" smtClean="0"/>
+              <a:t>-приложении, дополнительно необходимо вручную управлять транзакциями. Для этого мы создадим простое </a:t>
+            </a:r>
+            <a:r>
+              <a:rPr lang="ru-RU" dirty="0" err="1" smtClean="0"/>
+              <a:t>spring</a:t>
+            </a:r>
+            <a:r>
+              <a:rPr lang="ru-RU" dirty="0" smtClean="0"/>
+              <a:t>-приложение и напишем </a:t>
+            </a:r>
+            <a:r>
+              <a:rPr lang="ru-RU" dirty="0" err="1" smtClean="0"/>
+              <a:t>unit</a:t>
+            </a:r>
+            <a:r>
+              <a:rPr lang="ru-RU" dirty="0" smtClean="0"/>
+              <a:t>-тест. Наш </a:t>
+            </a:r>
+            <a:r>
+              <a:rPr lang="ru-RU" dirty="0" err="1" smtClean="0"/>
+              <a:t>unit</a:t>
+            </a:r>
+            <a:r>
+              <a:rPr lang="ru-RU" dirty="0" smtClean="0"/>
+              <a:t>-тест при запуске будет инициализировать </a:t>
+            </a:r>
+            <a:r>
+              <a:rPr lang="ru-RU" dirty="0" err="1" smtClean="0"/>
+              <a:t>application</a:t>
+            </a:r>
+            <a:r>
+              <a:rPr lang="ru-RU" dirty="0" smtClean="0"/>
+              <a:t> </a:t>
+            </a:r>
+            <a:r>
+              <a:rPr lang="ru-RU" dirty="0" err="1" smtClean="0"/>
+              <a:t>context</a:t>
+            </a:r>
+            <a:r>
+              <a:rPr lang="ru-RU" dirty="0" smtClean="0"/>
+              <a:t> </a:t>
+            </a:r>
+            <a:r>
+              <a:rPr lang="ru-RU" dirty="0" err="1" smtClean="0"/>
+              <a:t>config</a:t>
+            </a:r>
+            <a:r>
+              <a:rPr lang="ru-RU" dirty="0" smtClean="0"/>
+              <a:t> нашего </a:t>
+            </a:r>
+            <a:r>
+              <a:rPr lang="ru-RU" dirty="0" err="1" smtClean="0"/>
+              <a:t>spring</a:t>
+            </a:r>
+            <a:r>
+              <a:rPr lang="ru-RU" dirty="0" smtClean="0"/>
+              <a:t> приложения и после этого вызывать методы у тестируемого нами класса. </a:t>
+            </a:r>
+            <a:r>
+              <a:rPr lang="ru-RU" smtClean="0"/>
+              <a:t>Также мы разработаем отдельный тест, в котором будем управлять транзакциями вручную.</a:t>
+            </a:r>
             <a:endParaRPr lang="en-US" dirty="0"/>
           </a:p>
         </p:txBody>
@@ -39832,13 +40044,22 @@
               <a:t> </a:t>
             </a:r>
             <a:r>
-              <a:rPr lang="en-US" dirty="0" smtClean="0">
+              <a:rPr lang="ru-RU" dirty="0" err="1" smtClean="0">
                 <a:solidFill>
                   <a:srgbClr val="004080"/>
                 </a:solidFill>
                 <a:cs typeface="Tahoma" charset="0"/>
               </a:rPr>
-              <a:t>C</a:t>
+              <a:t>catch</a:t>
+            </a:r>
+            <a:r>
+              <a:rPr lang="ru-RU" dirty="0" smtClean="0">
+                <a:solidFill>
+                  <a:srgbClr val="004080"/>
+                </a:solidFill>
+                <a:cs typeface="Tahoma" charset="0"/>
+              </a:rPr>
+              <a:t> - </a:t>
             </a:r>
             <a:r>
               <a:rPr lang="ru-RU" dirty="0" err="1" smtClean="0">
@@ -39847,43 +40068,7 @@
                 </a:solidFill>
                 <a:cs typeface="Tahoma" charset="0"/>
               </a:rPr>
-              <a:t>atch</a:t>
-            </a:r>
-            <a:r>
-              <a:rPr lang="ru-RU" dirty="0" smtClean="0">
-                <a:solidFill>
-                  <a:srgbClr val="004080"/>
-                </a:solidFill>
-                <a:cs typeface="Tahoma" charset="0"/>
-              </a:rPr>
-              <a:t> </a:t>
-            </a:r>
-            <a:r>
-              <a:rPr lang="ru-RU" dirty="0" smtClean="0">
-                <a:solidFill>
-                  <a:srgbClr val="004080"/>
-                </a:solidFill>
-                <a:cs typeface="Tahoma" charset="0"/>
-              </a:rPr>
-              <a:t>- </a:t>
-            </a:r>
-            <a:r>
-              <a:rPr lang="en-US" dirty="0" smtClean="0">
-                <a:solidFill>
-                  <a:srgbClr val="004080"/>
-                </a:solidFill>
-                <a:cs typeface="Tahoma" charset="0"/>
-              </a:rPr>
-              <a:t>Fi</a:t>
-            </a:r>
-            <a:r>
-              <a:rPr lang="ru-RU" dirty="0" err="1" smtClean="0">
-                <a:solidFill>
-                  <a:srgbClr val="004080"/>
-                </a:solidFill>
-                <a:cs typeface="Tahoma" charset="0"/>
-              </a:rPr>
-              <a:t>nally</a:t>
+              <a:t>finally</a:t>
             </a:r>
             <a:r>
               <a:rPr lang="ru-RU" dirty="0" smtClean="0">
@@ -40725,7 +40910,7 @@
         <p:spPr bwMode="auto">
           <a:xfrm>
             <a:off x="381000" y="1647200"/>
-            <a:ext cx="8534400" cy="3009603"/>
+            <a:ext cx="8534400" cy="3563601"/>
           </a:xfrm>
           <a:prstGeom prst="rect">
             <a:avLst/>
@@ -40753,16 +40938,16 @@
               <a:buChar char="§"/>
             </a:pPr>
             <a:r>
-              <a:rPr lang="en-US" dirty="0" err="1">
+              <a:rPr lang="ru-RU" b="1" dirty="0" err="1">
                 <a:solidFill>
                   <a:srgbClr val="004080"/>
                 </a:solidFill>
                 <a:cs typeface="Tahoma" charset="0"/>
               </a:rPr>
-              <a:t>Средство</a:t>
-            </a:r>
-            <a:r>
-              <a:rPr lang="en-US" dirty="0">
+              <a:t>Application</a:t>
+            </a:r>
+            <a:r>
+              <a:rPr lang="ru-RU" b="1" dirty="0">
                 <a:solidFill>
                   <a:srgbClr val="004080"/>
                 </a:solidFill>
@@ -40771,16 +40956,16 @@
               <a:t> </a:t>
             </a:r>
             <a:r>
-              <a:rPr lang="en-US" dirty="0" err="1">
+              <a:rPr lang="ru-RU" b="1" dirty="0" err="1">
                 <a:solidFill>
                   <a:srgbClr val="004080"/>
                 </a:solidFill>
                 <a:cs typeface="Tahoma" charset="0"/>
               </a:rPr>
-              <a:t>сборки</a:t>
-            </a:r>
-            <a:r>
-              <a:rPr lang="en-US" dirty="0">
+              <a:t>context</a:t>
+            </a:r>
+            <a:r>
+              <a:rPr lang="ru-RU" b="1" dirty="0">
                 <a:solidFill>
                   <a:srgbClr val="004080"/>
                 </a:solidFill>
@@ -40789,16 +40974,16 @@
               <a:t> </a:t>
             </a:r>
             <a:r>
-              <a:rPr lang="en-US" dirty="0" err="1">
+              <a:rPr lang="ru-RU" b="1" dirty="0" err="1">
                 <a:solidFill>
                   <a:srgbClr val="004080"/>
                 </a:solidFill>
                 <a:cs typeface="Tahoma" charset="0"/>
               </a:rPr>
-              <a:t>и</a:t>
-            </a:r>
-            <a:r>
-              <a:rPr lang="en-US" dirty="0">
+              <a:t>config</a:t>
+            </a:r>
+            <a:r>
+              <a:rPr lang="ru-RU" b="1" dirty="0">
                 <a:solidFill>
                   <a:srgbClr val="004080"/>
                 </a:solidFill>
@@ -40807,45 +40992,65 @@
               <a:t> </a:t>
             </a:r>
             <a:r>
-              <a:rPr lang="en-US" dirty="0" err="1">
+              <a:rPr lang="ru-RU" dirty="0">
                 <a:solidFill>
                   <a:srgbClr val="004080"/>
                 </a:solidFill>
                 <a:cs typeface="Tahoma" charset="0"/>
               </a:rPr>
-              <a:t>компиляции</a:t>
-            </a:r>
-            <a:r>
-              <a:rPr lang="en-US" dirty="0">
+              <a:t>— конфигурационный файл в </a:t>
+            </a:r>
+            <a:r>
+              <a:rPr lang="en-US" dirty="0" smtClean="0">
                 <a:solidFill>
                   <a:srgbClr val="004080"/>
                 </a:solidFill>
                 <a:cs typeface="Tahoma" charset="0"/>
               </a:rPr>
-              <a:t> — </a:t>
-            </a:r>
-            <a:r>
-              <a:rPr lang="en-US" dirty="0">
-                <a:solidFill>
-                  <a:schemeClr val="accent4">
-                    <a:lumMod val="60000"/>
-                    <a:lumOff val="40000"/>
-                  </a:schemeClr>
+              <a:t>XML </a:t>
+            </a:r>
+            <a:r>
+              <a:rPr lang="ru-RU" dirty="0" smtClean="0">
+                <a:solidFill>
+                  <a:srgbClr val="004080"/>
                 </a:solidFill>
                 <a:cs typeface="Tahoma" charset="0"/>
-                <a:hlinkClick r:id="rId4"/>
-              </a:rPr>
-              <a:t>Apache Maven</a:t>
-            </a:r>
-            <a:r>
-              <a:rPr lang="en-US" dirty="0" smtClean="0">
+              </a:rPr>
+              <a:t>формате </a:t>
+            </a:r>
+            <a:r>
+              <a:rPr lang="ru-RU" dirty="0">
                 <a:solidFill>
                   <a:srgbClr val="004080"/>
                 </a:solidFill>
                 <a:cs typeface="Tahoma" charset="0"/>
               </a:rPr>
-              <a:t>.</a:t>
-            </a:r>
+              <a:t>для описания структуры </a:t>
+            </a:r>
+            <a:r>
+              <a:rPr lang="ru-RU" dirty="0" err="1">
+                <a:solidFill>
+                  <a:srgbClr val="004080"/>
+                </a:solidFill>
+                <a:cs typeface="Tahoma" charset="0"/>
+              </a:rPr>
+              <a:t>spring</a:t>
+            </a:r>
+            <a:r>
+              <a:rPr lang="ru-RU" dirty="0">
+                <a:solidFill>
+                  <a:srgbClr val="004080"/>
+                </a:solidFill>
+                <a:cs typeface="Tahoma" charset="0"/>
+              </a:rPr>
+              <a:t> приложения. </a:t>
+            </a:r>
+            <a:endParaRPr lang="ru-RU" dirty="0" smtClean="0">
+              <a:solidFill>
+                <a:srgbClr val="004080"/>
+              </a:solidFill>
+              <a:cs typeface="Tahoma" charset="0"/>
+            </a:endParaRPr>
           </a:p>
           <a:p>
             <a:pPr marL="287338" indent="-287338" defTabSz="803275">
@@ -40856,7 +41061,7 @@
               <a:buFont typeface="Wingdings" charset="0"/>
               <a:buChar char="§"/>
             </a:pPr>
-            <a:endParaRPr lang="en-US" dirty="0">
+            <a:endParaRPr lang="ru-RU" dirty="0">
               <a:solidFill>
                 <a:srgbClr val="004080"/>
               </a:solidFill>
@@ -40873,50 +41078,76 @@
               <a:buChar char="§"/>
             </a:pPr>
             <a:r>
-              <a:rPr lang="en-US" dirty="0" err="1">
+              <a:rPr lang="ru-RU" b="1" dirty="0">
                 <a:solidFill>
                   <a:srgbClr val="004080"/>
                 </a:solidFill>
                 <a:cs typeface="Tahoma" charset="0"/>
               </a:rPr>
-              <a:t>База</a:t>
-            </a:r>
-            <a:r>
-              <a:rPr lang="en-US" dirty="0">
+              <a:t>DAO</a:t>
+            </a:r>
+            <a:r>
+              <a:rPr lang="ru-RU" dirty="0">
                 <a:solidFill>
                   <a:srgbClr val="004080"/>
                 </a:solidFill>
                 <a:cs typeface="Tahoma" charset="0"/>
               </a:rPr>
+              <a:t> — объект доступа к данным или </a:t>
+            </a:r>
+            <a:r>
+              <a:rPr lang="en-US" dirty="0" smtClean="0">
+                <a:solidFill>
+                  <a:srgbClr val="004080"/>
+                </a:solidFill>
+                <a:cs typeface="Tahoma" charset="0"/>
+              </a:rPr>
+              <a:t>D</a:t>
+            </a:r>
+            <a:r>
+              <a:rPr lang="ru-RU" dirty="0" err="1" smtClean="0">
+                <a:solidFill>
+                  <a:srgbClr val="004080"/>
+                </a:solidFill>
+                <a:cs typeface="Tahoma" charset="0"/>
+              </a:rPr>
+              <a:t>ata</a:t>
+            </a:r>
+            <a:r>
+              <a:rPr lang="ru-RU" dirty="0" smtClean="0">
+                <a:solidFill>
+                  <a:srgbClr val="004080"/>
+                </a:solidFill>
+                <a:cs typeface="Tahoma" charset="0"/>
+              </a:rPr>
               <a:t> </a:t>
             </a:r>
             <a:r>
-              <a:rPr lang="en-US" dirty="0" err="1">
+              <a:rPr lang="en-US" dirty="0" smtClean="0">
                 <a:solidFill>
                   <a:srgbClr val="004080"/>
                 </a:solidFill>
                 <a:cs typeface="Tahoma" charset="0"/>
               </a:rPr>
-              <a:t>данных</a:t>
-            </a:r>
-            <a:r>
-              <a:rPr lang="en-US" dirty="0">
+              <a:t>A</a:t>
+            </a:r>
+            <a:r>
+              <a:rPr lang="ru-RU" dirty="0" err="1" smtClean="0">
                 <a:solidFill>
                   <a:srgbClr val="004080"/>
                 </a:solidFill>
                 <a:cs typeface="Tahoma" charset="0"/>
               </a:rPr>
-              <a:t> — </a:t>
-            </a:r>
-            <a:r>
-              <a:rPr lang="en-US" dirty="0">
+              <a:t>cess</a:t>
+            </a:r>
+            <a:r>
+              <a:rPr lang="ru-RU" dirty="0" smtClean="0">
                 <a:solidFill>
                   <a:srgbClr val="004080"/>
                 </a:solidFill>
                 <a:cs typeface="Tahoma" charset="0"/>
-                <a:hlinkClick r:id="rId5"/>
-              </a:rPr>
-              <a:t>HSQLDB</a:t>
+              </a:rPr>
+              <a:t> </a:t>
             </a:r>
             <a:r>
               <a:rPr lang="en-US" dirty="0" smtClean="0">
@@ -40925,8 +41156,32 @@
                 </a:solidFill>
                 <a:cs typeface="Tahoma" charset="0"/>
               </a:rPr>
-              <a:t>.</a:t>
-            </a:r>
+              <a:t>O</a:t>
+            </a:r>
+            <a:r>
+              <a:rPr lang="ru-RU" dirty="0" err="1" smtClean="0">
+                <a:solidFill>
+                  <a:srgbClr val="004080"/>
+                </a:solidFill>
+                <a:cs typeface="Tahoma" charset="0"/>
+              </a:rPr>
+              <a:t>bject</a:t>
+            </a:r>
+            <a:r>
+              <a:rPr lang="ru-RU" dirty="0">
+                <a:solidFill>
+                  <a:srgbClr val="004080"/>
+                </a:solidFill>
+                <a:cs typeface="Tahoma" charset="0"/>
+              </a:rPr>
+              <a:t>. Основное предназначение этого шаблона проектирования: связать вместе БД и наше приложение. </a:t>
+            </a:r>
+            <a:endParaRPr lang="ru-RU" dirty="0" smtClean="0">
+              <a:solidFill>
+                <a:srgbClr val="004080"/>
+              </a:solidFill>
+              <a:cs typeface="Tahoma" charset="0"/>
+            </a:endParaRPr>
           </a:p>
           <a:p>
             <a:pPr marL="287338" indent="-287338" defTabSz="803275">
@@ -40937,7 +41192,7 @@
               <a:buFont typeface="Wingdings" charset="0"/>
               <a:buChar char="§"/>
             </a:pPr>
-            <a:endParaRPr lang="en-US" dirty="0">
+            <a:endParaRPr lang="ru-RU" dirty="0">
               <a:solidFill>
                 <a:srgbClr val="004080"/>
               </a:solidFill>
@@ -40954,411 +41209,22 @@
               <a:buChar char="§"/>
             </a:pPr>
             <a:r>
-              <a:rPr lang="en-US" dirty="0" err="1">
+              <a:rPr lang="ru-RU" b="1" dirty="0" smtClean="0">
                 <a:solidFill>
                   <a:srgbClr val="004080"/>
                 </a:solidFill>
                 <a:cs typeface="Tahoma" charset="0"/>
               </a:rPr>
-              <a:t>Средство</a:t>
-            </a:r>
-            <a:r>
-              <a:rPr lang="en-US" dirty="0">
+              <a:t>Транзакция </a:t>
+            </a:r>
+            <a:r>
+              <a:rPr lang="ru-RU" dirty="0">
                 <a:solidFill>
                   <a:srgbClr val="004080"/>
                 </a:solidFill>
                 <a:cs typeface="Tahoma" charset="0"/>
               </a:rPr>
-              <a:t> </a:t>
-            </a:r>
-            <a:r>
-              <a:rPr lang="en-US" dirty="0" err="1">
-                <a:solidFill>
-                  <a:srgbClr val="004080"/>
-                </a:solidFill>
-                <a:cs typeface="Tahoma" charset="0"/>
-              </a:rPr>
-              <a:t>для</a:t>
-            </a:r>
-            <a:r>
-              <a:rPr lang="en-US" dirty="0">
-                <a:solidFill>
-                  <a:srgbClr val="004080"/>
-                </a:solidFill>
-                <a:cs typeface="Tahoma" charset="0"/>
-              </a:rPr>
-              <a:t> </a:t>
-            </a:r>
-            <a:r>
-              <a:rPr lang="en-US" dirty="0" err="1">
-                <a:solidFill>
-                  <a:srgbClr val="004080"/>
-                </a:solidFill>
-                <a:cs typeface="Tahoma" charset="0"/>
-              </a:rPr>
-              <a:t>отображения</a:t>
-            </a:r>
-            <a:r>
-              <a:rPr lang="en-US" dirty="0">
-                <a:solidFill>
-                  <a:srgbClr val="004080"/>
-                </a:solidFill>
-                <a:cs typeface="Tahoma" charset="0"/>
-              </a:rPr>
-              <a:t> </a:t>
-            </a:r>
-            <a:r>
-              <a:rPr lang="en-US" dirty="0" err="1">
-                <a:solidFill>
-                  <a:srgbClr val="004080"/>
-                </a:solidFill>
-                <a:cs typeface="Tahoma" charset="0"/>
-              </a:rPr>
-              <a:t>классов</a:t>
-            </a:r>
-            <a:r>
-              <a:rPr lang="en-US" dirty="0">
-                <a:solidFill>
-                  <a:srgbClr val="004080"/>
-                </a:solidFill>
-                <a:cs typeface="Tahoma" charset="0"/>
-              </a:rPr>
-              <a:t> </a:t>
-            </a:r>
-            <a:r>
-              <a:rPr lang="en-US" dirty="0" err="1">
-                <a:solidFill>
-                  <a:srgbClr val="004080"/>
-                </a:solidFill>
-                <a:cs typeface="Tahoma" charset="0"/>
-              </a:rPr>
-              <a:t>в</a:t>
-            </a:r>
-            <a:r>
-              <a:rPr lang="en-US" dirty="0">
-                <a:solidFill>
-                  <a:srgbClr val="004080"/>
-                </a:solidFill>
-                <a:cs typeface="Tahoma" charset="0"/>
-              </a:rPr>
-              <a:t> </a:t>
-            </a:r>
-            <a:r>
-              <a:rPr lang="en-US" dirty="0" err="1">
-                <a:solidFill>
-                  <a:srgbClr val="004080"/>
-                </a:solidFill>
-                <a:cs typeface="Tahoma" charset="0"/>
-              </a:rPr>
-              <a:t>базу</a:t>
-            </a:r>
-            <a:r>
-              <a:rPr lang="en-US" dirty="0">
-                <a:solidFill>
-                  <a:srgbClr val="004080"/>
-                </a:solidFill>
-                <a:cs typeface="Tahoma" charset="0"/>
-              </a:rPr>
-              <a:t> </a:t>
-            </a:r>
-            <a:r>
-              <a:rPr lang="en-US" dirty="0" err="1">
-                <a:solidFill>
-                  <a:srgbClr val="004080"/>
-                </a:solidFill>
-                <a:cs typeface="Tahoma" charset="0"/>
-              </a:rPr>
-              <a:t>данных</a:t>
-            </a:r>
-            <a:r>
-              <a:rPr lang="en-US" dirty="0">
-                <a:solidFill>
-                  <a:srgbClr val="004080"/>
-                </a:solidFill>
-                <a:cs typeface="Tahoma" charset="0"/>
-              </a:rPr>
-              <a:t> (Object </a:t>
-            </a:r>
-            <a:r>
-              <a:rPr lang="en-US" dirty="0" smtClean="0">
-                <a:solidFill>
-                  <a:srgbClr val="004080"/>
-                </a:solidFill>
-                <a:cs typeface="Tahoma" charset="0"/>
-              </a:rPr>
-              <a:t>Relation Mapping</a:t>
-            </a:r>
-            <a:r>
-              <a:rPr lang="en-US" dirty="0">
-                <a:solidFill>
-                  <a:srgbClr val="004080"/>
-                </a:solidFill>
-                <a:cs typeface="Tahoma" charset="0"/>
-              </a:rPr>
-              <a:t>) — </a:t>
-            </a:r>
-            <a:r>
-              <a:rPr lang="en-US" dirty="0">
-                <a:solidFill>
-                  <a:srgbClr val="004080"/>
-                </a:solidFill>
-                <a:cs typeface="Tahoma" charset="0"/>
-                <a:hlinkClick r:id="rId6"/>
-              </a:rPr>
-              <a:t>Hibernate</a:t>
-            </a:r>
-            <a:r>
-              <a:rPr lang="en-US" dirty="0" smtClean="0">
-                <a:solidFill>
-                  <a:srgbClr val="004080"/>
-                </a:solidFill>
-                <a:cs typeface="Tahoma" charset="0"/>
-              </a:rPr>
-              <a:t>.</a:t>
-            </a:r>
-          </a:p>
-          <a:p>
-            <a:pPr marL="287338" indent="-287338" defTabSz="803275">
-              <a:buClr>
-                <a:srgbClr val="FF6600"/>
-              </a:buClr>
-              <a:buSzPct val="125000"/>
-              <a:buFont typeface="Wingdings" charset="0"/>
-              <a:buChar char="§"/>
-            </a:pPr>
-            <a:endParaRPr lang="en-US" dirty="0">
-              <a:solidFill>
-                <a:srgbClr val="004080"/>
-              </a:solidFill>
-              <a:cs typeface="Tahoma" charset="0"/>
-            </a:endParaRPr>
-          </a:p>
-          <a:p>
-            <a:pPr marL="287338" indent="-287338" defTabSz="803275">
-              <a:buClr>
-                <a:srgbClr val="FF6600"/>
-              </a:buClr>
-              <a:buSzPct val="125000"/>
-              <a:buFont typeface="Wingdings" charset="0"/>
-              <a:buChar char="§"/>
-            </a:pPr>
-            <a:r>
-              <a:rPr lang="en-US" dirty="0" err="1">
-                <a:solidFill>
-                  <a:srgbClr val="004080"/>
-                </a:solidFill>
-                <a:cs typeface="Tahoma" charset="0"/>
-              </a:rPr>
-              <a:t>Средство</a:t>
-            </a:r>
-            <a:r>
-              <a:rPr lang="en-US" dirty="0">
-                <a:solidFill>
-                  <a:srgbClr val="004080"/>
-                </a:solidFill>
-                <a:cs typeface="Tahoma" charset="0"/>
-              </a:rPr>
-              <a:t> </a:t>
-            </a:r>
-            <a:r>
-              <a:rPr lang="en-US" dirty="0" err="1">
-                <a:solidFill>
-                  <a:srgbClr val="004080"/>
-                </a:solidFill>
-                <a:cs typeface="Tahoma" charset="0"/>
-              </a:rPr>
-              <a:t>для</a:t>
-            </a:r>
-            <a:r>
-              <a:rPr lang="en-US" dirty="0">
-                <a:solidFill>
-                  <a:srgbClr val="004080"/>
-                </a:solidFill>
-                <a:cs typeface="Tahoma" charset="0"/>
-              </a:rPr>
-              <a:t> </a:t>
-            </a:r>
-            <a:r>
-              <a:rPr lang="en-US" dirty="0" err="1">
-                <a:solidFill>
-                  <a:srgbClr val="004080"/>
-                </a:solidFill>
-                <a:cs typeface="Tahoma" charset="0"/>
-              </a:rPr>
-              <a:t>конфигурирования</a:t>
-            </a:r>
-            <a:r>
-              <a:rPr lang="en-US" dirty="0">
-                <a:solidFill>
-                  <a:srgbClr val="004080"/>
-                </a:solidFill>
-                <a:cs typeface="Tahoma" charset="0"/>
-              </a:rPr>
-              <a:t> </a:t>
-            </a:r>
-            <a:r>
-              <a:rPr lang="en-US" dirty="0" err="1">
-                <a:solidFill>
-                  <a:srgbClr val="004080"/>
-                </a:solidFill>
-                <a:cs typeface="Tahoma" charset="0"/>
-              </a:rPr>
-              <a:t>приложения</a:t>
-            </a:r>
-            <a:r>
-              <a:rPr lang="en-US" dirty="0">
-                <a:solidFill>
-                  <a:srgbClr val="004080"/>
-                </a:solidFill>
-                <a:cs typeface="Tahoma" charset="0"/>
-              </a:rPr>
-              <a:t> — </a:t>
-            </a:r>
-            <a:r>
-              <a:rPr lang="en-US" dirty="0">
-                <a:solidFill>
-                  <a:srgbClr val="004080"/>
-                </a:solidFill>
-                <a:cs typeface="Tahoma" charset="0"/>
-                <a:hlinkClick r:id="rId7"/>
-              </a:rPr>
-              <a:t>Spring </a:t>
-            </a:r>
-            <a:r>
-              <a:rPr lang="en-US" dirty="0" smtClean="0">
-                <a:solidFill>
-                  <a:srgbClr val="004080"/>
-                </a:solidFill>
-                <a:cs typeface="Tahoma" charset="0"/>
-                <a:hlinkClick r:id="rId7"/>
-              </a:rPr>
-              <a:t>Framework</a:t>
-            </a:r>
-            <a:r>
-              <a:rPr lang="en-US" dirty="0" smtClean="0">
-                <a:solidFill>
-                  <a:srgbClr val="004080"/>
-                </a:solidFill>
-                <a:cs typeface="Tahoma" charset="0"/>
-              </a:rPr>
-              <a:t>.</a:t>
-            </a:r>
-          </a:p>
-          <a:p>
-            <a:pPr marL="287338" indent="-287338" defTabSz="803275">
-              <a:buClr>
-                <a:srgbClr val="FF6600"/>
-              </a:buClr>
-              <a:buSzPct val="125000"/>
-              <a:buFont typeface="Wingdings" charset="0"/>
-              <a:buChar char="§"/>
-            </a:pPr>
-            <a:endParaRPr lang="en-US" dirty="0">
-              <a:solidFill>
-                <a:srgbClr val="004080"/>
-              </a:solidFill>
-              <a:cs typeface="Tahoma" charset="0"/>
-            </a:endParaRPr>
-          </a:p>
-          <a:p>
-            <a:pPr marL="287338" indent="-287338" defTabSz="803275">
-              <a:buClr>
-                <a:srgbClr val="FF6600"/>
-              </a:buClr>
-              <a:buSzPct val="125000"/>
-              <a:buFont typeface="Wingdings" charset="0"/>
-              <a:buChar char="§"/>
-            </a:pPr>
-            <a:r>
-              <a:rPr lang="en-US" dirty="0" err="1">
-                <a:solidFill>
-                  <a:srgbClr val="004080"/>
-                </a:solidFill>
-                <a:cs typeface="Tahoma" charset="0"/>
-              </a:rPr>
-              <a:t>Средство</a:t>
-            </a:r>
-            <a:r>
-              <a:rPr lang="en-US" dirty="0">
-                <a:solidFill>
-                  <a:srgbClr val="004080"/>
-                </a:solidFill>
-                <a:cs typeface="Tahoma" charset="0"/>
-              </a:rPr>
-              <a:t> </a:t>
-            </a:r>
-            <a:r>
-              <a:rPr lang="en-US" dirty="0" err="1">
-                <a:solidFill>
-                  <a:srgbClr val="004080"/>
-                </a:solidFill>
-                <a:cs typeface="Tahoma" charset="0"/>
-              </a:rPr>
-              <a:t>для</a:t>
-            </a:r>
-            <a:r>
-              <a:rPr lang="en-US" dirty="0">
-                <a:solidFill>
-                  <a:srgbClr val="004080"/>
-                </a:solidFill>
-                <a:cs typeface="Tahoma" charset="0"/>
-              </a:rPr>
-              <a:t> </a:t>
-            </a:r>
-            <a:r>
-              <a:rPr lang="en-US" dirty="0" err="1">
-                <a:solidFill>
-                  <a:srgbClr val="004080"/>
-                </a:solidFill>
-                <a:cs typeface="Tahoma" charset="0"/>
-              </a:rPr>
-              <a:t>создания</a:t>
-            </a:r>
-            <a:r>
-              <a:rPr lang="en-US" dirty="0">
-                <a:solidFill>
-                  <a:srgbClr val="004080"/>
-                </a:solidFill>
-                <a:cs typeface="Tahoma" charset="0"/>
-              </a:rPr>
-              <a:t> unit-</a:t>
-            </a:r>
-            <a:r>
-              <a:rPr lang="en-US" dirty="0" err="1">
-                <a:solidFill>
-                  <a:srgbClr val="004080"/>
-                </a:solidFill>
-                <a:cs typeface="Tahoma" charset="0"/>
-              </a:rPr>
-              <a:t>тестов</a:t>
-            </a:r>
-            <a:r>
-              <a:rPr lang="en-US" dirty="0">
-                <a:solidFill>
-                  <a:srgbClr val="004080"/>
-                </a:solidFill>
-                <a:cs typeface="Tahoma" charset="0"/>
-              </a:rPr>
-              <a:t> — </a:t>
-            </a:r>
-            <a:r>
-              <a:rPr lang="en-US" dirty="0" err="1">
-                <a:solidFill>
-                  <a:srgbClr val="004080"/>
-                </a:solidFill>
-                <a:cs typeface="Tahoma" charset="0"/>
-                <a:hlinkClick r:id="rId8"/>
-              </a:rPr>
-              <a:t>JUnit</a:t>
-            </a:r>
-            <a:r>
-              <a:rPr lang="en-US" dirty="0">
-                <a:solidFill>
-                  <a:srgbClr val="004080"/>
-                </a:solidFill>
-                <a:cs typeface="Tahoma" charset="0"/>
-              </a:rPr>
-              <a:t>.</a:t>
+              <a:t>— группа последовательных операций, которая представляет собой логическую единицу работы с данными. Транзакция может быть выполнена либо целиком и успешно, соблюдая целостность данных и независимо от параллельно идущих других транзакций, либо не выполнена вообще и тогда она не должна произвести никакого эффекта. </a:t>
             </a:r>
             <a:endParaRPr lang="ru-RU" dirty="0">
               <a:solidFill>

</xml_diff>